<commit_message>
WIP Individual presentation - Accessibility
</commit_message>
<xml_diff>
--- a/docs/Accessibility a22908.pptx
+++ b/docs/Accessibility a22908.pptx
@@ -4,14 +4,19 @@
   <p:sldMasterIdLst>
     <p:sldMasterId id="2147483648" r:id="rId1"/>
   </p:sldMasterIdLst>
+  <p:notesMasterIdLst>
+    <p:notesMasterId r:id="rId11"/>
+  </p:notesMasterIdLst>
   <p:sldIdLst>
     <p:sldId id="256" r:id="rId2"/>
-    <p:sldId id="257" r:id="rId3"/>
-    <p:sldId id="258" r:id="rId4"/>
-    <p:sldId id="259" r:id="rId5"/>
-    <p:sldId id="260" r:id="rId6"/>
-    <p:sldId id="261" r:id="rId7"/>
-    <p:sldId id="262" r:id="rId8"/>
+    <p:sldId id="263" r:id="rId3"/>
+    <p:sldId id="257" r:id="rId4"/>
+    <p:sldId id="264" r:id="rId5"/>
+    <p:sldId id="259" r:id="rId6"/>
+    <p:sldId id="258" r:id="rId7"/>
+    <p:sldId id="260" r:id="rId8"/>
+    <p:sldId id="261" r:id="rId9"/>
+    <p:sldId id="262" r:id="rId10"/>
   </p:sldIdLst>
   <p:sldSz cx="12192000" cy="6858000"/>
   <p:notesSz cx="6858000" cy="9144000"/>
@@ -110,7 +115,450 @@
       </a:defRPr>
     </a:lvl9pPr>
   </p:defaultTextStyle>
+  <p:extLst>
+    <p:ext uri="{EFAFB233-063F-42B5-8137-9DF3F51BA10A}">
+      <p15:sldGuideLst xmlns:p15="http://schemas.microsoft.com/office/powerpoint/2012/main"/>
+    </p:ext>
+  </p:extLst>
 </p:presentation>
+</file>
+
+<file path=ppt/notesMasters/notesMaster1.xml><?xml version="1.0" encoding="utf-8"?>
+<p:notesMaster xmlns:a="http://schemas.openxmlformats.org/drawingml/2006/main" xmlns:r="http://schemas.openxmlformats.org/officeDocument/2006/relationships" xmlns:p="http://schemas.openxmlformats.org/presentationml/2006/main">
+  <p:cSld>
+    <p:bg>
+      <p:bgRef idx="1001">
+        <a:schemeClr val="bg1"/>
+      </p:bgRef>
+    </p:bg>
+    <p:spTree>
+      <p:nvGrpSpPr>
+        <p:cNvPr id="1" name=""/>
+        <p:cNvGrpSpPr/>
+        <p:nvPr/>
+      </p:nvGrpSpPr>
+      <p:grpSpPr>
+        <a:xfrm>
+          <a:off x="0" y="0"/>
+          <a:ext cx="0" cy="0"/>
+          <a:chOff x="0" y="0"/>
+          <a:chExt cx="0" cy="0"/>
+        </a:xfrm>
+      </p:grpSpPr>
+      <p:sp>
+        <p:nvSpPr>
+          <p:cNvPr id="2" name="Header Placeholder 1"/>
+          <p:cNvSpPr>
+            <a:spLocks noGrp="1"/>
+          </p:cNvSpPr>
+          <p:nvPr>
+            <p:ph type="hdr" sz="quarter"/>
+          </p:nvPr>
+        </p:nvSpPr>
+        <p:spPr>
+          <a:xfrm>
+            <a:off x="0" y="0"/>
+            <a:ext cx="2971800" cy="458788"/>
+          </a:xfrm>
+          <a:prstGeom prst="rect">
+            <a:avLst/>
+          </a:prstGeom>
+        </p:spPr>
+        <p:txBody>
+          <a:bodyPr vert="horz" lIns="91440" tIns="45720" rIns="91440" bIns="45720" rtlCol="0"/>
+          <a:lstStyle>
+            <a:lvl1pPr algn="l">
+              <a:defRPr sz="1200"/>
+            </a:lvl1pPr>
+          </a:lstStyle>
+          <a:p>
+            <a:endParaRPr lang="pt-PT"/>
+          </a:p>
+        </p:txBody>
+      </p:sp>
+      <p:sp>
+        <p:nvSpPr>
+          <p:cNvPr id="3" name="Date Placeholder 2"/>
+          <p:cNvSpPr>
+            <a:spLocks noGrp="1"/>
+          </p:cNvSpPr>
+          <p:nvPr>
+            <p:ph type="dt" idx="1"/>
+          </p:nvPr>
+        </p:nvSpPr>
+        <p:spPr>
+          <a:xfrm>
+            <a:off x="3884613" y="0"/>
+            <a:ext cx="2971800" cy="458788"/>
+          </a:xfrm>
+          <a:prstGeom prst="rect">
+            <a:avLst/>
+          </a:prstGeom>
+        </p:spPr>
+        <p:txBody>
+          <a:bodyPr vert="horz" lIns="91440" tIns="45720" rIns="91440" bIns="45720" rtlCol="0"/>
+          <a:lstStyle>
+            <a:lvl1pPr algn="r">
+              <a:defRPr sz="1200"/>
+            </a:lvl1pPr>
+          </a:lstStyle>
+          <a:p>
+            <a:fld id="{3DA6DE8F-1BE5-412F-968A-A00033B87462}" type="datetimeFigureOut">
+              <a:rPr lang="pt-PT" smtClean="0"/>
+              <a:t>2016/04/13</a:t>
+            </a:fld>
+            <a:endParaRPr lang="pt-PT"/>
+          </a:p>
+        </p:txBody>
+      </p:sp>
+      <p:sp>
+        <p:nvSpPr>
+          <p:cNvPr id="4" name="Slide Image Placeholder 3"/>
+          <p:cNvSpPr>
+            <a:spLocks noGrp="1" noRot="1" noChangeAspect="1"/>
+          </p:cNvSpPr>
+          <p:nvPr>
+            <p:ph type="sldImg" idx="2"/>
+          </p:nvPr>
+        </p:nvSpPr>
+        <p:spPr>
+          <a:xfrm>
+            <a:off x="685800" y="1143000"/>
+            <a:ext cx="5486400" cy="3086100"/>
+          </a:xfrm>
+          <a:prstGeom prst="rect">
+            <a:avLst/>
+          </a:prstGeom>
+          <a:noFill/>
+          <a:ln w="12700">
+            <a:solidFill>
+              <a:prstClr val="black"/>
+            </a:solidFill>
+          </a:ln>
+        </p:spPr>
+        <p:txBody>
+          <a:bodyPr vert="horz" lIns="91440" tIns="45720" rIns="91440" bIns="45720" rtlCol="0" anchor="ctr"/>
+          <a:lstStyle/>
+          <a:p>
+            <a:endParaRPr lang="pt-PT"/>
+          </a:p>
+        </p:txBody>
+      </p:sp>
+      <p:sp>
+        <p:nvSpPr>
+          <p:cNvPr id="5" name="Notes Placeholder 4"/>
+          <p:cNvSpPr>
+            <a:spLocks noGrp="1"/>
+          </p:cNvSpPr>
+          <p:nvPr>
+            <p:ph type="body" sz="quarter" idx="3"/>
+          </p:nvPr>
+        </p:nvSpPr>
+        <p:spPr>
+          <a:xfrm>
+            <a:off x="685800" y="4400550"/>
+            <a:ext cx="5486400" cy="3600450"/>
+          </a:xfrm>
+          <a:prstGeom prst="rect">
+            <a:avLst/>
+          </a:prstGeom>
+        </p:spPr>
+        <p:txBody>
+          <a:bodyPr vert="horz" lIns="91440" tIns="45720" rIns="91440" bIns="45720" rtlCol="0"/>
+          <a:lstStyle/>
+          <a:p>
+            <a:pPr lvl="0"/>
+            <a:r>
+              <a:rPr lang="en-US" smtClean="0"/>
+              <a:t>Edit Master text styles</a:t>
+            </a:r>
+          </a:p>
+          <a:p>
+            <a:pPr lvl="1"/>
+            <a:r>
+              <a:rPr lang="en-US" smtClean="0"/>
+              <a:t>Second level</a:t>
+            </a:r>
+          </a:p>
+          <a:p>
+            <a:pPr lvl="2"/>
+            <a:r>
+              <a:rPr lang="en-US" smtClean="0"/>
+              <a:t>Third level</a:t>
+            </a:r>
+          </a:p>
+          <a:p>
+            <a:pPr lvl="3"/>
+            <a:r>
+              <a:rPr lang="en-US" smtClean="0"/>
+              <a:t>Fourth level</a:t>
+            </a:r>
+          </a:p>
+          <a:p>
+            <a:pPr lvl="4"/>
+            <a:r>
+              <a:rPr lang="en-US" smtClean="0"/>
+              <a:t>Fifth level</a:t>
+            </a:r>
+            <a:endParaRPr lang="pt-PT"/>
+          </a:p>
+        </p:txBody>
+      </p:sp>
+      <p:sp>
+        <p:nvSpPr>
+          <p:cNvPr id="6" name="Footer Placeholder 5"/>
+          <p:cNvSpPr>
+            <a:spLocks noGrp="1"/>
+          </p:cNvSpPr>
+          <p:nvPr>
+            <p:ph type="ftr" sz="quarter" idx="4"/>
+          </p:nvPr>
+        </p:nvSpPr>
+        <p:spPr>
+          <a:xfrm>
+            <a:off x="0" y="8685213"/>
+            <a:ext cx="2971800" cy="458787"/>
+          </a:xfrm>
+          <a:prstGeom prst="rect">
+            <a:avLst/>
+          </a:prstGeom>
+        </p:spPr>
+        <p:txBody>
+          <a:bodyPr vert="horz" lIns="91440" tIns="45720" rIns="91440" bIns="45720" rtlCol="0" anchor="b"/>
+          <a:lstStyle>
+            <a:lvl1pPr algn="l">
+              <a:defRPr sz="1200"/>
+            </a:lvl1pPr>
+          </a:lstStyle>
+          <a:p>
+            <a:endParaRPr lang="pt-PT"/>
+          </a:p>
+        </p:txBody>
+      </p:sp>
+      <p:sp>
+        <p:nvSpPr>
+          <p:cNvPr id="7" name="Slide Number Placeholder 6"/>
+          <p:cNvSpPr>
+            <a:spLocks noGrp="1"/>
+          </p:cNvSpPr>
+          <p:nvPr>
+            <p:ph type="sldNum" sz="quarter" idx="5"/>
+          </p:nvPr>
+        </p:nvSpPr>
+        <p:spPr>
+          <a:xfrm>
+            <a:off x="3884613" y="8685213"/>
+            <a:ext cx="2971800" cy="458787"/>
+          </a:xfrm>
+          <a:prstGeom prst="rect">
+            <a:avLst/>
+          </a:prstGeom>
+        </p:spPr>
+        <p:txBody>
+          <a:bodyPr vert="horz" lIns="91440" tIns="45720" rIns="91440" bIns="45720" rtlCol="0" anchor="b"/>
+          <a:lstStyle>
+            <a:lvl1pPr algn="r">
+              <a:defRPr sz="1200"/>
+            </a:lvl1pPr>
+          </a:lstStyle>
+          <a:p>
+            <a:fld id="{94A2E280-44B8-42CB-8147-6E1BA11A84E2}" type="slidenum">
+              <a:rPr lang="pt-PT" smtClean="0"/>
+              <a:t>‹#›</a:t>
+            </a:fld>
+            <a:endParaRPr lang="pt-PT"/>
+          </a:p>
+        </p:txBody>
+      </p:sp>
+    </p:spTree>
+    <p:extLst>
+      <p:ext uri="{BB962C8B-B14F-4D97-AF65-F5344CB8AC3E}">
+        <p14:creationId xmlns:p14="http://schemas.microsoft.com/office/powerpoint/2010/main" val="2172655395"/>
+      </p:ext>
+    </p:extLst>
+  </p:cSld>
+  <p:clrMap bg1="lt1" tx1="dk1" bg2="lt2" tx2="dk2" accent1="accent1" accent2="accent2" accent3="accent3" accent4="accent4" accent5="accent5" accent6="accent6" hlink="hlink" folHlink="folHlink"/>
+  <p:notesStyle>
+    <a:lvl1pPr marL="0" algn="l" defTabSz="914400" rtl="0" eaLnBrk="1" latinLnBrk="0" hangingPunct="1">
+      <a:defRPr sz="1200" kern="1200">
+        <a:solidFill>
+          <a:schemeClr val="tx1"/>
+        </a:solidFill>
+        <a:latin typeface="+mn-lt"/>
+        <a:ea typeface="+mn-ea"/>
+        <a:cs typeface="+mn-cs"/>
+      </a:defRPr>
+    </a:lvl1pPr>
+    <a:lvl2pPr marL="457200" algn="l" defTabSz="914400" rtl="0" eaLnBrk="1" latinLnBrk="0" hangingPunct="1">
+      <a:defRPr sz="1200" kern="1200">
+        <a:solidFill>
+          <a:schemeClr val="tx1"/>
+        </a:solidFill>
+        <a:latin typeface="+mn-lt"/>
+        <a:ea typeface="+mn-ea"/>
+        <a:cs typeface="+mn-cs"/>
+      </a:defRPr>
+    </a:lvl2pPr>
+    <a:lvl3pPr marL="914400" algn="l" defTabSz="914400" rtl="0" eaLnBrk="1" latinLnBrk="0" hangingPunct="1">
+      <a:defRPr sz="1200" kern="1200">
+        <a:solidFill>
+          <a:schemeClr val="tx1"/>
+        </a:solidFill>
+        <a:latin typeface="+mn-lt"/>
+        <a:ea typeface="+mn-ea"/>
+        <a:cs typeface="+mn-cs"/>
+      </a:defRPr>
+    </a:lvl3pPr>
+    <a:lvl4pPr marL="1371600" algn="l" defTabSz="914400" rtl="0" eaLnBrk="1" latinLnBrk="0" hangingPunct="1">
+      <a:defRPr sz="1200" kern="1200">
+        <a:solidFill>
+          <a:schemeClr val="tx1"/>
+        </a:solidFill>
+        <a:latin typeface="+mn-lt"/>
+        <a:ea typeface="+mn-ea"/>
+        <a:cs typeface="+mn-cs"/>
+      </a:defRPr>
+    </a:lvl4pPr>
+    <a:lvl5pPr marL="1828800" algn="l" defTabSz="914400" rtl="0" eaLnBrk="1" latinLnBrk="0" hangingPunct="1">
+      <a:defRPr sz="1200" kern="1200">
+        <a:solidFill>
+          <a:schemeClr val="tx1"/>
+        </a:solidFill>
+        <a:latin typeface="+mn-lt"/>
+        <a:ea typeface="+mn-ea"/>
+        <a:cs typeface="+mn-cs"/>
+      </a:defRPr>
+    </a:lvl5pPr>
+    <a:lvl6pPr marL="2286000" algn="l" defTabSz="914400" rtl="0" eaLnBrk="1" latinLnBrk="0" hangingPunct="1">
+      <a:defRPr sz="1200" kern="1200">
+        <a:solidFill>
+          <a:schemeClr val="tx1"/>
+        </a:solidFill>
+        <a:latin typeface="+mn-lt"/>
+        <a:ea typeface="+mn-ea"/>
+        <a:cs typeface="+mn-cs"/>
+      </a:defRPr>
+    </a:lvl6pPr>
+    <a:lvl7pPr marL="2743200" algn="l" defTabSz="914400" rtl="0" eaLnBrk="1" latinLnBrk="0" hangingPunct="1">
+      <a:defRPr sz="1200" kern="1200">
+        <a:solidFill>
+          <a:schemeClr val="tx1"/>
+        </a:solidFill>
+        <a:latin typeface="+mn-lt"/>
+        <a:ea typeface="+mn-ea"/>
+        <a:cs typeface="+mn-cs"/>
+      </a:defRPr>
+    </a:lvl7pPr>
+    <a:lvl8pPr marL="3200400" algn="l" defTabSz="914400" rtl="0" eaLnBrk="1" latinLnBrk="0" hangingPunct="1">
+      <a:defRPr sz="1200" kern="1200">
+        <a:solidFill>
+          <a:schemeClr val="tx1"/>
+        </a:solidFill>
+        <a:latin typeface="+mn-lt"/>
+        <a:ea typeface="+mn-ea"/>
+        <a:cs typeface="+mn-cs"/>
+      </a:defRPr>
+    </a:lvl8pPr>
+    <a:lvl9pPr marL="3657600" algn="l" defTabSz="914400" rtl="0" eaLnBrk="1" latinLnBrk="0" hangingPunct="1">
+      <a:defRPr sz="1200" kern="1200">
+        <a:solidFill>
+          <a:schemeClr val="tx1"/>
+        </a:solidFill>
+        <a:latin typeface="+mn-lt"/>
+        <a:ea typeface="+mn-ea"/>
+        <a:cs typeface="+mn-cs"/>
+      </a:defRPr>
+    </a:lvl9pPr>
+  </p:notesStyle>
+</p:notesMaster>
+</file>
+
+<file path=ppt/notesSlides/notesSlide1.xml><?xml version="1.0" encoding="utf-8"?>
+<p:notes xmlns:a="http://schemas.openxmlformats.org/drawingml/2006/main" xmlns:r="http://schemas.openxmlformats.org/officeDocument/2006/relationships" xmlns:p="http://schemas.openxmlformats.org/presentationml/2006/main">
+  <p:cSld>
+    <p:spTree>
+      <p:nvGrpSpPr>
+        <p:cNvPr id="1" name=""/>
+        <p:cNvGrpSpPr/>
+        <p:nvPr/>
+      </p:nvGrpSpPr>
+      <p:grpSpPr>
+        <a:xfrm>
+          <a:off x="0" y="0"/>
+          <a:ext cx="0" cy="0"/>
+          <a:chOff x="0" y="0"/>
+          <a:chExt cx="0" cy="0"/>
+        </a:xfrm>
+      </p:grpSpPr>
+      <p:sp>
+        <p:nvSpPr>
+          <p:cNvPr id="2" name="Slide Image Placeholder 1"/>
+          <p:cNvSpPr>
+            <a:spLocks noGrp="1" noRot="1" noChangeAspect="1"/>
+          </p:cNvSpPr>
+          <p:nvPr>
+            <p:ph type="sldImg"/>
+          </p:nvPr>
+        </p:nvSpPr>
+        <p:spPr/>
+      </p:sp>
+      <p:sp>
+        <p:nvSpPr>
+          <p:cNvPr id="3" name="Notes Placeholder 2"/>
+          <p:cNvSpPr>
+            <a:spLocks noGrp="1"/>
+          </p:cNvSpPr>
+          <p:nvPr>
+            <p:ph type="body" idx="1"/>
+          </p:nvPr>
+        </p:nvSpPr>
+        <p:spPr/>
+        <p:txBody>
+          <a:bodyPr/>
+          <a:lstStyle/>
+          <a:p>
+            <a:r>
+              <a:rPr lang="en-US" dirty="0" smtClean="0"/>
+              <a:t>3 min</a:t>
+            </a:r>
+            <a:endParaRPr lang="pt-PT" dirty="0"/>
+          </a:p>
+        </p:txBody>
+      </p:sp>
+      <p:sp>
+        <p:nvSpPr>
+          <p:cNvPr id="4" name="Slide Number Placeholder 3"/>
+          <p:cNvSpPr>
+            <a:spLocks noGrp="1"/>
+          </p:cNvSpPr>
+          <p:nvPr>
+            <p:ph type="sldNum" sz="quarter" idx="10"/>
+          </p:nvPr>
+        </p:nvSpPr>
+        <p:spPr/>
+        <p:txBody>
+          <a:bodyPr/>
+          <a:lstStyle/>
+          <a:p>
+            <a:fld id="{94A2E280-44B8-42CB-8147-6E1BA11A84E2}" type="slidenum">
+              <a:rPr lang="pt-PT" smtClean="0"/>
+              <a:t>6</a:t>
+            </a:fld>
+            <a:endParaRPr lang="pt-PT"/>
+          </a:p>
+        </p:txBody>
+      </p:sp>
+    </p:spTree>
+    <p:extLst>
+      <p:ext uri="{BB962C8B-B14F-4D97-AF65-F5344CB8AC3E}">
+        <p14:creationId xmlns:p14="http://schemas.microsoft.com/office/powerpoint/2010/main" val="3451408510"/>
+      </p:ext>
+    </p:extLst>
+  </p:cSld>
+  <p:clrMapOvr>
+    <a:masterClrMapping/>
+  </p:clrMapOvr>
+</p:notes>
 </file>
 
 <file path=ppt/slideLayouts/slideLayout1.xml><?xml version="1.0" encoding="utf-8"?>
@@ -2980,16 +3428,21 @@
             <p:ph type="ctrTitle"/>
           </p:nvPr>
         </p:nvSpPr>
-        <p:spPr/>
-        <p:txBody>
-          <a:bodyPr/>
-          <a:lstStyle/>
-          <a:p>
-            <a:r>
-              <a:rPr lang="en-US" dirty="0" err="1" smtClean="0"/>
+        <p:spPr>
+          <a:xfrm>
+            <a:off x="1524000" y="1122363"/>
+            <a:ext cx="9144000" cy="1011237"/>
+          </a:xfrm>
+        </p:spPr>
+        <p:txBody>
+          <a:bodyPr/>
+          <a:lstStyle/>
+          <a:p>
+            <a:r>
+              <a:rPr lang="pt-PT" noProof="0" dirty="0" smtClean="0"/>
               <a:t>Acessibilidade</a:t>
             </a:r>
-            <a:endParaRPr lang="pt-PT" dirty="0"/>
+            <a:endParaRPr lang="pt-PT" noProof="0" dirty="0"/>
           </a:p>
         </p:txBody>
       </p:sp>
@@ -3003,24 +3456,326 @@
             <p:ph type="subTitle" idx="1"/>
           </p:nvPr>
         </p:nvSpPr>
-        <p:spPr/>
-        <p:txBody>
-          <a:bodyPr/>
-          <a:lstStyle/>
-          <a:p>
-            <a:r>
-              <a:rPr lang="pt-PT" sz="2400" kern="1200" dirty="0" smtClean="0">
+        <p:spPr>
+          <a:xfrm>
+            <a:off x="1524000" y="2401824"/>
+            <a:ext cx="9144000" cy="3608832"/>
+          </a:xfrm>
+        </p:spPr>
+        <p:txBody>
+          <a:bodyPr>
+            <a:normAutofit/>
+          </a:bodyPr>
+          <a:lstStyle/>
+          <a:p>
+            <a:pPr algn="l"/>
+            <a:r>
+              <a:rPr lang="pt-PT" noProof="0" dirty="0" smtClean="0">
                 <a:solidFill>
-                  <a:schemeClr val="tx1"/>
+                  <a:srgbClr val="000000"/>
                 </a:solidFill>
-                <a:effectLst/>
-                <a:latin typeface="+mn-lt"/>
-                <a:ea typeface="+mn-ea"/>
-                <a:cs typeface="+mn-cs"/>
+                <a:latin typeface="Arial" panose="020B0604020202020204" pitchFamily="34" charset="0"/>
               </a:rPr>
-              <a:t>* Definição de acessibilidade</a:t>
-            </a:r>
-            <a:endParaRPr lang="pt-PT" dirty="0"/>
+              <a:t>…O </a:t>
+            </a:r>
+            <a:r>
+              <a:rPr lang="pt-PT" noProof="0" dirty="0">
+                <a:solidFill>
+                  <a:srgbClr val="000000"/>
+                </a:solidFill>
+                <a:latin typeface="Arial" panose="020B0604020202020204" pitchFamily="34" charset="0"/>
+              </a:rPr>
+              <a:t>cumprimento </a:t>
+            </a:r>
+            <a:r>
+              <a:rPr lang="pt-PT" noProof="0" dirty="0" smtClean="0">
+                <a:solidFill>
+                  <a:srgbClr val="000000"/>
+                </a:solidFill>
+                <a:latin typeface="Arial" panose="020B0604020202020204" pitchFamily="34" charset="0"/>
+              </a:rPr>
+              <a:t>… [das] … diretrizes </a:t>
+            </a:r>
+            <a:r>
+              <a:rPr lang="pt-PT" noProof="0" dirty="0">
+                <a:solidFill>
+                  <a:srgbClr val="000000"/>
+                </a:solidFill>
+                <a:latin typeface="Arial" panose="020B0604020202020204" pitchFamily="34" charset="0"/>
+              </a:rPr>
+              <a:t>fará com que os conteúdos fiquem acessíveis a um maior número de pessoas com incapacidades, incluindo </a:t>
+            </a:r>
+            <a:r>
+              <a:rPr lang="pt-PT" u="sng" noProof="0" dirty="0">
+                <a:solidFill>
+                  <a:srgbClr val="000000"/>
+                </a:solidFill>
+                <a:latin typeface="Arial" panose="020B0604020202020204" pitchFamily="34" charset="0"/>
+              </a:rPr>
+              <a:t>cegueira</a:t>
+            </a:r>
+            <a:r>
+              <a:rPr lang="pt-PT" noProof="0" dirty="0">
+                <a:solidFill>
+                  <a:srgbClr val="000000"/>
+                </a:solidFill>
+                <a:latin typeface="Arial" panose="020B0604020202020204" pitchFamily="34" charset="0"/>
+              </a:rPr>
+              <a:t> e </a:t>
+            </a:r>
+            <a:r>
+              <a:rPr lang="pt-PT" u="sng" noProof="0" dirty="0">
+                <a:solidFill>
+                  <a:srgbClr val="000000"/>
+                </a:solidFill>
+                <a:latin typeface="Arial" panose="020B0604020202020204" pitchFamily="34" charset="0"/>
+              </a:rPr>
+              <a:t>baixa visão</a:t>
+            </a:r>
+            <a:r>
+              <a:rPr lang="pt-PT" noProof="0" dirty="0">
+                <a:solidFill>
+                  <a:srgbClr val="000000"/>
+                </a:solidFill>
+                <a:latin typeface="Arial" panose="020B0604020202020204" pitchFamily="34" charset="0"/>
+              </a:rPr>
+              <a:t>, </a:t>
+            </a:r>
+            <a:r>
+              <a:rPr lang="pt-PT" u="sng" noProof="0" dirty="0">
+                <a:solidFill>
+                  <a:srgbClr val="000000"/>
+                </a:solidFill>
+                <a:latin typeface="Arial" panose="020B0604020202020204" pitchFamily="34" charset="0"/>
+              </a:rPr>
+              <a:t>surdez</a:t>
+            </a:r>
+            <a:r>
+              <a:rPr lang="pt-PT" noProof="0" dirty="0">
+                <a:solidFill>
+                  <a:srgbClr val="000000"/>
+                </a:solidFill>
+                <a:latin typeface="Arial" panose="020B0604020202020204" pitchFamily="34" charset="0"/>
+              </a:rPr>
+              <a:t> e </a:t>
+            </a:r>
+            <a:r>
+              <a:rPr lang="pt-PT" u="sng" noProof="0" dirty="0">
+                <a:solidFill>
+                  <a:srgbClr val="000000"/>
+                </a:solidFill>
+                <a:latin typeface="Arial" panose="020B0604020202020204" pitchFamily="34" charset="0"/>
+              </a:rPr>
+              <a:t>perda de audição</a:t>
+            </a:r>
+            <a:r>
+              <a:rPr lang="pt-PT" noProof="0" dirty="0">
+                <a:solidFill>
+                  <a:srgbClr val="000000"/>
+                </a:solidFill>
+                <a:latin typeface="Arial" panose="020B0604020202020204" pitchFamily="34" charset="0"/>
+              </a:rPr>
+              <a:t>, </a:t>
+            </a:r>
+            <a:r>
+              <a:rPr lang="pt-PT" u="sng" noProof="0" dirty="0">
+                <a:solidFill>
+                  <a:srgbClr val="000000"/>
+                </a:solidFill>
+                <a:latin typeface="Arial" panose="020B0604020202020204" pitchFamily="34" charset="0"/>
+              </a:rPr>
+              <a:t>incapacidades ao nível da aprendizagem</a:t>
+            </a:r>
+            <a:r>
+              <a:rPr lang="pt-PT" noProof="0" dirty="0">
+                <a:solidFill>
+                  <a:srgbClr val="000000"/>
+                </a:solidFill>
+                <a:latin typeface="Arial" panose="020B0604020202020204" pitchFamily="34" charset="0"/>
+              </a:rPr>
+              <a:t>, </a:t>
+            </a:r>
+            <a:r>
+              <a:rPr lang="pt-PT" u="sng" noProof="0" dirty="0">
+                <a:solidFill>
+                  <a:srgbClr val="000000"/>
+                </a:solidFill>
+                <a:latin typeface="Arial" panose="020B0604020202020204" pitchFamily="34" charset="0"/>
+              </a:rPr>
+              <a:t>limitações cognitivas</a:t>
+            </a:r>
+            <a:r>
+              <a:rPr lang="pt-PT" noProof="0" dirty="0">
+                <a:solidFill>
+                  <a:srgbClr val="000000"/>
+                </a:solidFill>
+                <a:latin typeface="Arial" panose="020B0604020202020204" pitchFamily="34" charset="0"/>
+              </a:rPr>
+              <a:t>, </a:t>
+            </a:r>
+            <a:r>
+              <a:rPr lang="pt-PT" u="sng" noProof="0" dirty="0">
+                <a:solidFill>
+                  <a:srgbClr val="000000"/>
+                </a:solidFill>
+                <a:latin typeface="Arial" panose="020B0604020202020204" pitchFamily="34" charset="0"/>
+              </a:rPr>
+              <a:t>movimentos limitados</a:t>
+            </a:r>
+            <a:r>
+              <a:rPr lang="pt-PT" noProof="0" dirty="0">
+                <a:solidFill>
+                  <a:srgbClr val="000000"/>
+                </a:solidFill>
+                <a:latin typeface="Arial" panose="020B0604020202020204" pitchFamily="34" charset="0"/>
+              </a:rPr>
+              <a:t>, </a:t>
+            </a:r>
+            <a:r>
+              <a:rPr lang="pt-PT" u="sng" noProof="0" dirty="0">
+                <a:solidFill>
+                  <a:srgbClr val="000000"/>
+                </a:solidFill>
+                <a:latin typeface="Arial" panose="020B0604020202020204" pitchFamily="34" charset="0"/>
+              </a:rPr>
+              <a:t>incapacidades ao nível da fala</a:t>
+            </a:r>
+            <a:r>
+              <a:rPr lang="pt-PT" noProof="0" dirty="0">
+                <a:solidFill>
+                  <a:srgbClr val="000000"/>
+                </a:solidFill>
+                <a:latin typeface="Arial" panose="020B0604020202020204" pitchFamily="34" charset="0"/>
+              </a:rPr>
+              <a:t>, </a:t>
+            </a:r>
+            <a:r>
+              <a:rPr lang="pt-PT" u="sng" noProof="0" dirty="0">
+                <a:solidFill>
+                  <a:srgbClr val="000000"/>
+                </a:solidFill>
+                <a:latin typeface="Arial" panose="020B0604020202020204" pitchFamily="34" charset="0"/>
+              </a:rPr>
+              <a:t>fotossensibilidade</a:t>
+            </a:r>
+            <a:r>
+              <a:rPr lang="pt-PT" noProof="0" dirty="0">
+                <a:solidFill>
+                  <a:srgbClr val="000000"/>
+                </a:solidFill>
+                <a:latin typeface="Arial" panose="020B0604020202020204" pitchFamily="34" charset="0"/>
+              </a:rPr>
+              <a:t> e ainda combinações destas </a:t>
+            </a:r>
+            <a:r>
+              <a:rPr lang="pt-PT" noProof="0" dirty="0" smtClean="0">
+                <a:solidFill>
+                  <a:srgbClr val="000000"/>
+                </a:solidFill>
+                <a:latin typeface="Arial" panose="020B0604020202020204" pitchFamily="34" charset="0"/>
+              </a:rPr>
+              <a:t>incapacidades.</a:t>
+            </a:r>
+          </a:p>
+          <a:p>
+            <a:pPr algn="l"/>
+            <a:r>
+              <a:rPr lang="pt-PT" b="1" noProof="0" dirty="0" smtClean="0">
+                <a:solidFill>
+                  <a:srgbClr val="000000"/>
+                </a:solidFill>
+                <a:latin typeface="Arial" panose="020B0604020202020204" pitchFamily="34" charset="0"/>
+              </a:rPr>
+              <a:t>O </a:t>
+            </a:r>
+            <a:r>
+              <a:rPr lang="pt-PT" b="1" noProof="0" dirty="0">
+                <a:solidFill>
+                  <a:srgbClr val="000000"/>
+                </a:solidFill>
+                <a:latin typeface="Arial" panose="020B0604020202020204" pitchFamily="34" charset="0"/>
+              </a:rPr>
+              <a:t>cumprimento destas </a:t>
+            </a:r>
+            <a:r>
+              <a:rPr lang="pt-PT" b="1" noProof="0" dirty="0" smtClean="0">
+                <a:solidFill>
+                  <a:srgbClr val="000000"/>
+                </a:solidFill>
+                <a:latin typeface="Arial" panose="020B0604020202020204" pitchFamily="34" charset="0"/>
+              </a:rPr>
+              <a:t>diretrizes </a:t>
+            </a:r>
+            <a:r>
+              <a:rPr lang="pt-PT" b="1" noProof="0" dirty="0">
+                <a:solidFill>
+                  <a:srgbClr val="000000"/>
+                </a:solidFill>
+                <a:latin typeface="Arial" panose="020B0604020202020204" pitchFamily="34" charset="0"/>
+              </a:rPr>
+              <a:t>também facilitará a utilização do conteúdo </a:t>
+            </a:r>
+            <a:r>
+              <a:rPr lang="pt-PT" b="1" noProof="0" dirty="0" smtClean="0">
+                <a:solidFill>
+                  <a:srgbClr val="000000"/>
+                </a:solidFill>
+                <a:latin typeface="Arial" panose="020B0604020202020204" pitchFamily="34" charset="0"/>
+              </a:rPr>
+              <a:t>da </a:t>
+            </a:r>
+            <a:r>
+              <a:rPr lang="pt-PT" b="1" noProof="0" dirty="0">
+                <a:solidFill>
+                  <a:srgbClr val="000000"/>
+                </a:solidFill>
+                <a:latin typeface="Arial" panose="020B0604020202020204" pitchFamily="34" charset="0"/>
+              </a:rPr>
+              <a:t>Web pelos utilizadores em geral</a:t>
+            </a:r>
+            <a:r>
+              <a:rPr lang="pt-PT" b="1" noProof="0" dirty="0" smtClean="0">
+                <a:solidFill>
+                  <a:srgbClr val="000000"/>
+                </a:solidFill>
+                <a:latin typeface="Arial" panose="020B0604020202020204" pitchFamily="34" charset="0"/>
+              </a:rPr>
+              <a:t>.</a:t>
+            </a:r>
+          </a:p>
+          <a:p>
+            <a:pPr algn="r"/>
+            <a:endParaRPr lang="pt-PT" noProof="0" dirty="0"/>
+          </a:p>
+          <a:p>
+            <a:pPr algn="r"/>
+            <a:r>
+              <a:rPr lang="pt-PT" sz="1200" noProof="0" dirty="0" smtClean="0"/>
+              <a:t>(in: </a:t>
+            </a:r>
+            <a:r>
+              <a:rPr lang="pt-PT" sz="1200" noProof="0" dirty="0" smtClean="0">
+                <a:hlinkClick r:id="rId2"/>
+              </a:rPr>
+              <a:t>http</a:t>
+            </a:r>
+            <a:r>
+              <a:rPr lang="pt-PT" sz="1200" noProof="0" dirty="0">
+                <a:hlinkClick r:id="rId2"/>
+              </a:rPr>
+              <a:t>://www.acessibilidade.gov.pt/w3/TR/WCAG20</a:t>
+            </a:r>
+            <a:r>
+              <a:rPr lang="pt-PT" sz="1200" noProof="0" dirty="0" smtClean="0">
+                <a:hlinkClick r:id="rId2"/>
+              </a:rPr>
+              <a:t>/</a:t>
+            </a:r>
+            <a:r>
+              <a:rPr lang="pt-PT" sz="1200" noProof="0" dirty="0" smtClean="0"/>
+              <a:t> , acedido em  2016/04/13)</a:t>
+            </a:r>
+            <a:endParaRPr lang="pt-PT" sz="1200" noProof="0" dirty="0"/>
           </a:p>
         </p:txBody>
       </p:sp>
@@ -3034,6 +3789,13 @@
   <p:clrMapOvr>
     <a:masterClrMapping/>
   </p:clrMapOvr>
+  <p:timing>
+    <p:tnLst>
+      <p:par>
+        <p:cTn id="1" dur="indefinite" restart="never" nodeType="tmRoot"/>
+      </p:par>
+    </p:tnLst>
+  </p:timing>
 </p:sld>
 </file>
 
@@ -3069,7 +3831,11 @@
           <a:bodyPr/>
           <a:lstStyle/>
           <a:p>
-            <a:endParaRPr lang="pt-PT" dirty="0"/>
+            <a:r>
+              <a:rPr lang="pt-PT" noProof="0" dirty="0" smtClean="0"/>
+              <a:t>Agenda</a:t>
+            </a:r>
+            <a:endParaRPr lang="pt-PT" noProof="0" dirty="0"/>
           </a:p>
         </p:txBody>
       </p:sp>
@@ -3085,73 +3851,108 @@
         </p:nvSpPr>
         <p:spPr/>
         <p:txBody>
-          <a:bodyPr>
-            <a:normAutofit/>
-          </a:bodyPr>
-          <a:lstStyle/>
-          <a:p>
+          <a:bodyPr/>
+          <a:lstStyle/>
+          <a:p>
+            <a:pPr>
+              <a:tabLst>
+                <a:tab pos="9956800" algn="r"/>
+              </a:tabLst>
+            </a:pPr>
+            <a:r>
+              <a:rPr lang="pt-PT" noProof="0" dirty="0" smtClean="0"/>
+              <a:t>O que é que está em causa?	2 min</a:t>
+            </a:r>
+          </a:p>
+          <a:p>
+            <a:pPr>
+              <a:tabLst>
+                <a:tab pos="9956800" algn="r"/>
+              </a:tabLst>
+            </a:pPr>
+            <a:r>
+              <a:rPr lang="pt-PT" noProof="0" dirty="0" smtClean="0"/>
+              <a:t>Aplicabilidade e benefícios	3 min</a:t>
+            </a:r>
+          </a:p>
+          <a:p>
+            <a:pPr>
+              <a:tabLst>
+                <a:tab pos="9956800" algn="r"/>
+              </a:tabLst>
+            </a:pPr>
             <a:r>
               <a:rPr lang="pt-PT" dirty="0" smtClean="0"/>
-              <a:t>Unidade Acesso – Acessibilidade a Cidadãos com Necessidades Especiais à Sociedade de Informação (1999).</a:t>
-            </a:r>
-          </a:p>
-          <a:p>
-            <a:r>
-              <a:rPr lang="en-US" dirty="0" err="1" smtClean="0"/>
-              <a:t>Programa</a:t>
-            </a:r>
-            <a:r>
-              <a:rPr lang="en-US" dirty="0" smtClean="0"/>
-              <a:t> </a:t>
-            </a:r>
-            <a:r>
-              <a:rPr lang="en-US" dirty="0" err="1" smtClean="0"/>
-              <a:t>Acesso</a:t>
-            </a:r>
-            <a:r>
-              <a:rPr lang="en-US" dirty="0" smtClean="0"/>
-              <a:t> – UMIC</a:t>
-            </a:r>
-          </a:p>
-          <a:p>
-            <a:r>
-              <a:rPr lang="en-US" dirty="0" err="1" smtClean="0"/>
-              <a:t>Unidade</a:t>
-            </a:r>
-            <a:r>
-              <a:rPr lang="en-US" dirty="0" smtClean="0"/>
-              <a:t> </a:t>
-            </a:r>
-            <a:r>
-              <a:rPr lang="en-US" dirty="0" err="1" smtClean="0"/>
-              <a:t>Acesso</a:t>
-            </a:r>
-            <a:r>
-              <a:rPr lang="en-US" dirty="0" smtClean="0"/>
-              <a:t> – FCT</a:t>
-            </a:r>
-          </a:p>
-          <a:p>
-            <a:r>
-              <a:rPr lang="en-US" dirty="0" smtClean="0"/>
-              <a:t>http://www.acessibilidade.gov.pt/</a:t>
-            </a:r>
-          </a:p>
-          <a:p>
-            <a:endParaRPr lang="pt-PT" dirty="0"/>
+              <a:t>Casos práticos	7 min</a:t>
+            </a:r>
+            <a:endParaRPr lang="pt-PT" noProof="0" dirty="0" smtClean="0"/>
+          </a:p>
+          <a:p>
+            <a:pPr>
+              <a:tabLst>
+                <a:tab pos="9956800" algn="r"/>
+              </a:tabLst>
+            </a:pPr>
+            <a:r>
+              <a:rPr lang="pt-PT" noProof="0" dirty="0" smtClean="0"/>
+              <a:t>Em Portugal	3 min</a:t>
+            </a:r>
+          </a:p>
+          <a:p>
+            <a:pPr>
+              <a:tabLst>
+                <a:tab pos="9956800" algn="r"/>
+              </a:tabLst>
+            </a:pPr>
+            <a:r>
+              <a:rPr lang="pt-PT" noProof="0" dirty="0" smtClean="0"/>
+              <a:t>Referências</a:t>
+            </a:r>
+          </a:p>
+          <a:p>
+            <a:pPr marL="0" indent="0">
+              <a:buNone/>
+              <a:tabLst>
+                <a:tab pos="9956800" algn="r"/>
+              </a:tabLst>
+            </a:pPr>
+            <a:r>
+              <a:rPr lang="pt-PT" noProof="0" dirty="0" smtClean="0"/>
+              <a:t>	---------</a:t>
+            </a:r>
+          </a:p>
+          <a:p>
+            <a:pPr marL="0" indent="0">
+              <a:buNone/>
+              <a:tabLst>
+                <a:tab pos="9956800" algn="r"/>
+              </a:tabLst>
+            </a:pPr>
+            <a:r>
+              <a:rPr lang="pt-PT" dirty="0" smtClean="0"/>
+              <a:t>	15 min</a:t>
+            </a:r>
+            <a:endParaRPr lang="pt-PT" noProof="0" dirty="0" smtClean="0"/>
           </a:p>
         </p:txBody>
       </p:sp>
     </p:spTree>
     <p:extLst>
       <p:ext uri="{BB962C8B-B14F-4D97-AF65-F5344CB8AC3E}">
-        <p14:creationId xmlns:p14="http://schemas.microsoft.com/office/powerpoint/2010/main" val="810188647"/>
+        <p14:creationId xmlns:p14="http://schemas.microsoft.com/office/powerpoint/2010/main" val="2197099088"/>
       </p:ext>
     </p:extLst>
   </p:cSld>
   <p:clrMapOvr>
     <a:masterClrMapping/>
   </p:clrMapOvr>
+  <p:timing>
+    <p:tnLst>
+      <p:par>
+        <p:cTn id="1" dur="indefinite" restart="never" nodeType="tmRoot"/>
+      </p:par>
+    </p:tnLst>
+  </p:timing>
 </p:sld>
 </file>
 
@@ -3187,12 +3988,11 @@
           <a:bodyPr/>
           <a:lstStyle/>
           <a:p>
-            <a:pPr lvl="0"/>
-            <a:r>
-              <a:rPr lang="pt-PT" dirty="0" smtClean="0"/>
-              <a:t>O que é? (3min)</a:t>
-            </a:r>
-            <a:endParaRPr lang="pt-PT" dirty="0"/>
+            <a:r>
+              <a:rPr lang="en-US" noProof="0" dirty="0" smtClean="0"/>
+              <a:t>DUMMY</a:t>
+            </a:r>
+            <a:endParaRPr lang="pt-PT" noProof="0" dirty="0"/>
           </a:p>
         </p:txBody>
       </p:sp>
@@ -3214,74 +4014,50 @@
           <a:lstStyle/>
           <a:p>
             <a:r>
-              <a:rPr lang="en-US" dirty="0" err="1" smtClean="0"/>
-              <a:t>Normas</a:t>
-            </a:r>
-            <a:r>
-              <a:rPr lang="en-US" dirty="0" smtClean="0"/>
-              <a:t> de </a:t>
-            </a:r>
-            <a:r>
-              <a:rPr lang="en-US" dirty="0" err="1" smtClean="0"/>
-              <a:t>suporte</a:t>
-            </a:r>
-            <a:r>
-              <a:rPr lang="en-US" dirty="0" smtClean="0"/>
-              <a:t>:</a:t>
-            </a:r>
-            <a:endParaRPr lang="pt-PT" dirty="0" smtClean="0"/>
-          </a:p>
-          <a:p>
-            <a:pPr lvl="1"/>
-            <a:r>
-              <a:rPr lang="pt-PT" dirty="0" smtClean="0"/>
-              <a:t>WCAG 2.0</a:t>
-            </a:r>
-          </a:p>
-          <a:p>
-            <a:pPr lvl="1"/>
-            <a:r>
-              <a:rPr lang="pt-PT" dirty="0" smtClean="0"/>
-              <a:t>ISO/IEC 40500:2012</a:t>
-            </a:r>
-          </a:p>
-          <a:p>
-            <a:r>
-              <a:rPr lang="pt-PT" dirty="0" smtClean="0"/>
-              <a:t>Suporte legal:</a:t>
-            </a:r>
-          </a:p>
-          <a:p>
-            <a:pPr lvl="1"/>
-            <a:r>
-              <a:rPr lang="pt-PT" dirty="0" smtClean="0"/>
-              <a:t>Legislação</a:t>
-            </a:r>
-            <a:r>
-              <a:rPr lang="pt-PT" baseline="0" dirty="0" smtClean="0"/>
-              <a:t> comunitária</a:t>
-            </a:r>
-            <a:endParaRPr lang="pt-PT" dirty="0" smtClean="0"/>
-          </a:p>
-          <a:p>
-            <a:pPr lvl="1"/>
-            <a:r>
-              <a:rPr lang="pt-PT" dirty="0" smtClean="0"/>
-              <a:t>Legislação portuguesa</a:t>
-            </a:r>
+              <a:rPr lang="pt-PT" noProof="0" dirty="0" smtClean="0"/>
+              <a:t>Unidade Acesso – Acessibilidade a Cidadãos com Necessidades Especiais à Sociedade de Informação (1999).</a:t>
+            </a:r>
+          </a:p>
+          <a:p>
+            <a:r>
+              <a:rPr lang="pt-PT" noProof="0" dirty="0" smtClean="0"/>
+              <a:t>Programa Acesso – UMIC</a:t>
+            </a:r>
+          </a:p>
+          <a:p>
+            <a:r>
+              <a:rPr lang="pt-PT" noProof="0" dirty="0" smtClean="0"/>
+              <a:t>Unidade Acesso – FCT</a:t>
+            </a:r>
+          </a:p>
+          <a:p>
+            <a:r>
+              <a:rPr lang="pt-PT" noProof="0" dirty="0" smtClean="0">
+                <a:hlinkClick r:id="rId2"/>
+              </a:rPr>
+              <a:t>http://www.acessibilidade.gov.pt/</a:t>
+            </a:r>
+            <a:endParaRPr lang="pt-PT" noProof="0" dirty="0" smtClean="0"/>
           </a:p>
         </p:txBody>
       </p:sp>
     </p:spTree>
     <p:extLst>
       <p:ext uri="{BB962C8B-B14F-4D97-AF65-F5344CB8AC3E}">
-        <p14:creationId xmlns:p14="http://schemas.microsoft.com/office/powerpoint/2010/main" val="3999221353"/>
+        <p14:creationId xmlns:p14="http://schemas.microsoft.com/office/powerpoint/2010/main" val="810188647"/>
       </p:ext>
     </p:extLst>
   </p:cSld>
   <p:clrMapOvr>
     <a:masterClrMapping/>
   </p:clrMapOvr>
+  <p:timing>
+    <p:tnLst>
+      <p:par>
+        <p:cTn id="1" dur="indefinite" restart="never" nodeType="tmRoot"/>
+      </p:par>
+    </p:tnLst>
+  </p:timing>
 </p:sld>
 </file>
 
@@ -3317,58 +4093,415 @@
           <a:bodyPr/>
           <a:lstStyle/>
           <a:p>
-            <a:pPr lvl="0"/>
+            <a:r>
+              <a:rPr lang="pt-PT" sz="4400" kern="1200" dirty="0" smtClean="0">
+                <a:solidFill>
+                  <a:schemeClr val="tx1"/>
+                </a:solidFill>
+                <a:effectLst/>
+                <a:latin typeface="+mj-lt"/>
+                <a:ea typeface="+mj-ea"/>
+                <a:cs typeface="+mj-cs"/>
+              </a:rPr>
+              <a:t>O que é que está em causa?</a:t>
+            </a:r>
+            <a:endParaRPr lang="pt-PT" dirty="0"/>
+          </a:p>
+        </p:txBody>
+      </p:sp>
+      <p:sp>
+        <p:nvSpPr>
+          <p:cNvPr id="5" name="Content Placeholder 4"/>
+          <p:cNvSpPr>
+            <a:spLocks noGrp="1"/>
+          </p:cNvSpPr>
+          <p:nvPr>
+            <p:ph idx="1"/>
+          </p:nvPr>
+        </p:nvSpPr>
+        <p:spPr/>
+        <p:txBody>
+          <a:bodyPr>
+            <a:normAutofit lnSpcReduction="10000"/>
+          </a:bodyPr>
+          <a:lstStyle/>
+          <a:p>
+            <a:pPr>
+              <a:tabLst>
+                <a:tab pos="7269163" algn="r"/>
+                <a:tab pos="8786813" algn="r"/>
+                <a:tab pos="10042525" algn="r"/>
+              </a:tabLst>
+            </a:pPr>
+            <a:r>
+              <a:rPr lang="en-US" sz="2400" dirty="0" err="1" smtClean="0"/>
+              <a:t>População</a:t>
+            </a:r>
+            <a:r>
+              <a:rPr lang="en-US" sz="2400" dirty="0" smtClean="0"/>
+              <a:t> com &gt;= 15 </a:t>
+            </a:r>
+            <a:r>
+              <a:rPr lang="en-US" sz="2400" dirty="0" err="1" smtClean="0"/>
+              <a:t>anos</a:t>
+            </a:r>
+            <a:r>
+              <a:rPr lang="en-US" sz="2400" dirty="0" smtClean="0"/>
+              <a:t>:			8 </a:t>
+            </a:r>
+            <a:r>
+              <a:rPr lang="en-US" sz="2400" dirty="0"/>
+              <a:t>699 515</a:t>
+            </a:r>
+          </a:p>
+          <a:p>
+            <a:pPr>
+              <a:tabLst>
+                <a:tab pos="7269163" algn="r"/>
+                <a:tab pos="8786813" algn="r"/>
+                <a:tab pos="10042525" algn="r"/>
+              </a:tabLst>
+            </a:pPr>
+            <a:r>
+              <a:rPr lang="en-US" sz="2400" dirty="0" err="1" smtClean="0"/>
+              <a:t>População</a:t>
+            </a:r>
+            <a:r>
+              <a:rPr lang="en-US" sz="2400" dirty="0" smtClean="0"/>
+              <a:t> com </a:t>
+            </a:r>
+            <a:r>
+              <a:rPr lang="en-US" sz="2400" dirty="0" err="1" smtClean="0"/>
+              <a:t>atividade</a:t>
+            </a:r>
+            <a:r>
+              <a:rPr lang="en-US" sz="2400" dirty="0" smtClean="0"/>
+              <a:t> </a:t>
+            </a:r>
+            <a:r>
+              <a:rPr lang="en-US" sz="2400" dirty="0" err="1" smtClean="0"/>
+              <a:t>económica</a:t>
+            </a:r>
+            <a:r>
+              <a:rPr lang="en-US" sz="2400" dirty="0"/>
+              <a:t>:	</a:t>
+            </a:r>
+            <a:r>
+              <a:rPr lang="en-US" sz="2400" dirty="0" smtClean="0"/>
+              <a:t>	4 </a:t>
+            </a:r>
+            <a:r>
+              <a:rPr lang="en-US" sz="2400" dirty="0"/>
+              <a:t>990 208</a:t>
+            </a:r>
+          </a:p>
+          <a:p>
+            <a:pPr>
+              <a:tabLst>
+                <a:tab pos="7269163" algn="r"/>
+                <a:tab pos="8786813" algn="r"/>
+                <a:tab pos="10042525" algn="r"/>
+              </a:tabLst>
+            </a:pPr>
+            <a:r>
+              <a:rPr lang="en-US" sz="2400" dirty="0" err="1" smtClean="0"/>
+              <a:t>Deficiência</a:t>
+            </a:r>
+            <a:r>
+              <a:rPr lang="en-US" sz="2400" dirty="0" smtClean="0"/>
+              <a:t>:</a:t>
+            </a:r>
+            <a:endParaRPr lang="en-US" sz="2400" dirty="0"/>
+          </a:p>
+          <a:p>
+            <a:pPr lvl="1">
+              <a:tabLst>
+                <a:tab pos="7269163" algn="r"/>
+                <a:tab pos="8786813" algn="r"/>
+                <a:tab pos="10042525" algn="r"/>
+              </a:tabLst>
+            </a:pPr>
+            <a:r>
+              <a:rPr lang="en-US" dirty="0" err="1" smtClean="0"/>
+              <a:t>auditiva</a:t>
+            </a:r>
+            <a:r>
+              <a:rPr lang="en-US" dirty="0" smtClean="0"/>
+              <a:t>:</a:t>
+            </a:r>
+            <a:r>
+              <a:rPr lang="en-US" dirty="0"/>
+              <a:t>	 84 </a:t>
+            </a:r>
+            <a:r>
+              <a:rPr lang="en-US" dirty="0" smtClean="0"/>
+              <a:t>172	2 %	1 %</a:t>
+            </a:r>
+            <a:endParaRPr lang="en-US" dirty="0"/>
+          </a:p>
+          <a:p>
+            <a:pPr lvl="1">
+              <a:tabLst>
+                <a:tab pos="7269163" algn="r"/>
+                <a:tab pos="8786813" algn="r"/>
+                <a:tab pos="10042525" algn="r"/>
+              </a:tabLst>
+            </a:pPr>
+            <a:r>
+              <a:rPr lang="en-US" dirty="0"/>
+              <a:t>Visual:	 163 </a:t>
+            </a:r>
+            <a:r>
+              <a:rPr lang="en-US" dirty="0" smtClean="0"/>
+              <a:t>569	3 %	2 %</a:t>
+            </a:r>
+            <a:endParaRPr lang="en-US" dirty="0"/>
+          </a:p>
+          <a:p>
+            <a:pPr lvl="1">
+              <a:tabLst>
+                <a:tab pos="7269163" algn="r"/>
+                <a:tab pos="8786813" algn="r"/>
+                <a:tab pos="10042525" algn="r"/>
+              </a:tabLst>
+            </a:pPr>
+            <a:r>
+              <a:rPr lang="en-US" dirty="0" err="1" smtClean="0"/>
+              <a:t>Motora</a:t>
+            </a:r>
+            <a:r>
+              <a:rPr lang="en-US" dirty="0"/>
+              <a:t>:	 156 </a:t>
+            </a:r>
+            <a:r>
+              <a:rPr lang="en-US" dirty="0" smtClean="0"/>
+              <a:t>246	</a:t>
+            </a:r>
+            <a:r>
+              <a:rPr lang="en-US" dirty="0"/>
+              <a:t> </a:t>
+            </a:r>
+            <a:r>
+              <a:rPr lang="en-US" dirty="0" smtClean="0"/>
+              <a:t>3 %</a:t>
+            </a:r>
+            <a:r>
+              <a:rPr lang="en-US" dirty="0"/>
+              <a:t>	</a:t>
+            </a:r>
+            <a:r>
+              <a:rPr lang="en-US" dirty="0" smtClean="0"/>
+              <a:t>2 %</a:t>
+            </a:r>
+            <a:endParaRPr lang="en-US" dirty="0"/>
+          </a:p>
+          <a:p>
+            <a:pPr lvl="1">
+              <a:tabLst>
+                <a:tab pos="7269163" algn="r"/>
+                <a:tab pos="8786813" algn="r"/>
+                <a:tab pos="10042525" algn="r"/>
+              </a:tabLst>
+            </a:pPr>
+            <a:r>
+              <a:rPr lang="en-US" dirty="0"/>
+              <a:t>Mental:	 70 </a:t>
+            </a:r>
+            <a:r>
+              <a:rPr lang="en-US" dirty="0" smtClean="0"/>
+              <a:t>994	1 %	1 %</a:t>
+            </a:r>
+            <a:endParaRPr lang="en-US" dirty="0"/>
+          </a:p>
+          <a:p>
+            <a:pPr lvl="1">
+              <a:tabLst>
+                <a:tab pos="7269163" algn="r"/>
+                <a:tab pos="8786813" algn="r"/>
+                <a:tab pos="10042525" algn="r"/>
+              </a:tabLst>
+            </a:pPr>
+            <a:r>
+              <a:rPr lang="en-US" dirty="0" err="1" smtClean="0"/>
+              <a:t>Parilisia</a:t>
+            </a:r>
+            <a:r>
+              <a:rPr lang="en-US" dirty="0"/>
+              <a:t> Cerebral:	 15 </a:t>
+            </a:r>
+            <a:r>
+              <a:rPr lang="en-US" dirty="0" smtClean="0"/>
+              <a:t>009	0 %	0 %</a:t>
+            </a:r>
+            <a:endParaRPr lang="en-US" dirty="0"/>
+          </a:p>
+          <a:p>
+            <a:pPr lvl="1">
+              <a:tabLst>
+                <a:tab pos="7269163" algn="r"/>
+                <a:tab pos="8786813" algn="r"/>
+                <a:tab pos="10042525" algn="r"/>
+              </a:tabLst>
+            </a:pPr>
+            <a:r>
+              <a:rPr lang="en-US" dirty="0" err="1" smtClean="0"/>
+              <a:t>Outra</a:t>
+            </a:r>
+            <a:r>
+              <a:rPr lang="en-US" dirty="0" smtClean="0"/>
+              <a:t> </a:t>
+            </a:r>
+            <a:r>
+              <a:rPr lang="en-US" dirty="0" err="1" smtClean="0"/>
+              <a:t>deficiência</a:t>
+            </a:r>
+            <a:r>
+              <a:rPr lang="en-US" dirty="0"/>
+              <a:t>:	 </a:t>
+            </a:r>
+            <a:r>
+              <a:rPr lang="en-US" u="sng" dirty="0"/>
+              <a:t>146 </a:t>
+            </a:r>
+            <a:r>
+              <a:rPr lang="en-US" u="sng" dirty="0" smtClean="0"/>
+              <a:t>069	</a:t>
+            </a:r>
+            <a:r>
+              <a:rPr lang="en-US" u="sng" dirty="0"/>
+              <a:t> </a:t>
+            </a:r>
+            <a:r>
+              <a:rPr lang="en-US" u="sng" dirty="0" smtClean="0"/>
+              <a:t>3 %</a:t>
+            </a:r>
+            <a:r>
+              <a:rPr lang="en-US" u="sng" dirty="0"/>
+              <a:t>	</a:t>
+            </a:r>
+            <a:r>
+              <a:rPr lang="en-US" u="sng" dirty="0" smtClean="0"/>
+              <a:t>2 %</a:t>
+            </a:r>
+          </a:p>
+          <a:p>
+            <a:pPr marL="457200" lvl="1" indent="0">
+              <a:buNone/>
+              <a:tabLst>
+                <a:tab pos="7269163" algn="r"/>
+                <a:tab pos="8786813" algn="r"/>
+                <a:tab pos="10042525" algn="r"/>
+              </a:tabLst>
+            </a:pPr>
+            <a:r>
+              <a:rPr lang="en-US" dirty="0"/>
+              <a:t>	</a:t>
+            </a:r>
+            <a:r>
+              <a:rPr lang="en-US" dirty="0" smtClean="0"/>
+              <a:t>636 059	</a:t>
+            </a:r>
             <a:r>
               <a:rPr lang="pt-PT" dirty="0" smtClean="0"/>
-              <a:t>População alvo (2min)</a:t>
-            </a:r>
+              <a:t>13 %	7 % </a:t>
+            </a:r>
+          </a:p>
+          <a:p>
+            <a:pPr marL="457200" lvl="1" indent="0" algn="r">
+              <a:buNone/>
+              <a:tabLst>
+                <a:tab pos="7269163" algn="r"/>
+                <a:tab pos="8786813" algn="r"/>
+                <a:tab pos="10042525" algn="r"/>
+              </a:tabLst>
+            </a:pPr>
+            <a:endParaRPr lang="en-US" sz="1200" dirty="0" smtClean="0"/>
+          </a:p>
+          <a:p>
+            <a:pPr marL="457200" lvl="1" indent="0" algn="r">
+              <a:buNone/>
+              <a:tabLst>
+                <a:tab pos="7269163" algn="r"/>
+                <a:tab pos="8786813" algn="r"/>
+                <a:tab pos="10042525" algn="r"/>
+              </a:tabLst>
+            </a:pPr>
+            <a:r>
+              <a:rPr lang="en-US" sz="1100" dirty="0" smtClean="0"/>
+              <a:t>(Fonte: </a:t>
+            </a:r>
+            <a:r>
+              <a:rPr lang="en-US" sz="1100" dirty="0" smtClean="0">
+                <a:hlinkClick r:id="rId2"/>
+              </a:rPr>
+              <a:t>https</a:t>
+            </a:r>
+            <a:r>
+              <a:rPr lang="en-US" sz="1100" dirty="0">
+                <a:hlinkClick r:id="rId2"/>
+              </a:rPr>
+              <a:t>://</a:t>
+            </a:r>
+            <a:r>
+              <a:rPr lang="en-US" sz="1100" dirty="0" smtClean="0">
+                <a:hlinkClick r:id="rId2"/>
+              </a:rPr>
+              <a:t>www.ine.pt/ngt_server/attachfileu.jsp?look_parentBoui=7418317&amp;att_display=n&amp;att_download=y</a:t>
+            </a:r>
+            <a:r>
+              <a:rPr lang="en-US" sz="1100" dirty="0" smtClean="0"/>
+              <a:t>, </a:t>
+            </a:r>
+            <a:r>
+              <a:rPr lang="en-US" sz="1100" dirty="0" err="1" smtClean="0"/>
+              <a:t>actualização</a:t>
+            </a:r>
+            <a:r>
+              <a:rPr lang="en-US" sz="1100" dirty="0" smtClean="0"/>
+              <a:t> </a:t>
+            </a:r>
+            <a:r>
+              <a:rPr lang="en-US" sz="1100" dirty="0" err="1" smtClean="0"/>
+              <a:t>em</a:t>
+            </a:r>
+            <a:r>
+              <a:rPr lang="en-US" sz="1100" dirty="0" smtClean="0"/>
+              <a:t> 2007, </a:t>
+            </a:r>
+            <a:r>
+              <a:rPr lang="en-US" sz="1100" dirty="0" err="1" smtClean="0"/>
+              <a:t>acedido</a:t>
+            </a:r>
+            <a:r>
+              <a:rPr lang="en-US" sz="1100" dirty="0" smtClean="0"/>
+              <a:t> </a:t>
+            </a:r>
+            <a:r>
+              <a:rPr lang="en-US" sz="1100" dirty="0" err="1" smtClean="0"/>
+              <a:t>em</a:t>
+            </a:r>
+            <a:r>
+              <a:rPr lang="en-US" sz="1100" dirty="0" smtClean="0"/>
+              <a:t> 2016-04-13)</a:t>
+            </a:r>
+            <a:endParaRPr lang="en-US" sz="1100" dirty="0"/>
+          </a:p>
+          <a:p>
+            <a:pPr lvl="1">
+              <a:tabLst>
+                <a:tab pos="7269163" algn="r"/>
+                <a:tab pos="8786813" algn="r"/>
+                <a:tab pos="10042525" algn="r"/>
+              </a:tabLst>
+            </a:pPr>
             <a:endParaRPr lang="pt-PT" dirty="0"/>
-          </a:p>
-        </p:txBody>
-      </p:sp>
-      <p:sp>
-        <p:nvSpPr>
-          <p:cNvPr id="3" name="Content Placeholder 2"/>
-          <p:cNvSpPr>
-            <a:spLocks noGrp="1"/>
-          </p:cNvSpPr>
-          <p:nvPr>
-            <p:ph idx="1"/>
-          </p:nvPr>
-        </p:nvSpPr>
-        <p:spPr/>
-        <p:txBody>
-          <a:bodyPr>
-            <a:normAutofit/>
-          </a:bodyPr>
-          <a:lstStyle/>
-          <a:p>
-            <a:r>
-              <a:rPr lang="pt-PT" dirty="0" smtClean="0"/>
-              <a:t>* Estatística de pessoas com necessidades especiais em Portugal</a:t>
-            </a:r>
-          </a:p>
-          <a:p>
-            <a:r>
-              <a:rPr lang="pt-PT" dirty="0" smtClean="0"/>
-              <a:t>* Na Europa</a:t>
-            </a:r>
-          </a:p>
-          <a:p>
-            <a:r>
-              <a:rPr lang="pt-PT" dirty="0" smtClean="0"/>
-              <a:t>* ...</a:t>
-            </a:r>
-          </a:p>
-          <a:p>
-            <a:endParaRPr lang="pt-PT" dirty="0" smtClean="0"/>
           </a:p>
         </p:txBody>
       </p:sp>
     </p:spTree>
     <p:extLst>
       <p:ext uri="{BB962C8B-B14F-4D97-AF65-F5344CB8AC3E}">
-        <p14:creationId xmlns:p14="http://schemas.microsoft.com/office/powerpoint/2010/main" val="3932973354"/>
+        <p14:creationId xmlns:p14="http://schemas.microsoft.com/office/powerpoint/2010/main" val="1525894339"/>
       </p:ext>
     </p:extLst>
   </p:cSld>
@@ -3412,10 +4545,10 @@
           <a:p>
             <a:pPr lvl="0"/>
             <a:r>
-              <a:rPr lang="pt-PT" dirty="0" smtClean="0"/>
-              <a:t>Aplicabilidade (5min)</a:t>
-            </a:r>
-            <a:endParaRPr lang="pt-PT" dirty="0"/>
+              <a:rPr lang="pt-PT" noProof="0" dirty="0" smtClean="0"/>
+              <a:t>População alvo (2min)</a:t>
+            </a:r>
+            <a:endParaRPr lang="pt-PT" noProof="0" dirty="0"/>
           </a:p>
         </p:txBody>
       </p:sp>
@@ -3437,50 +4570,31 @@
           <a:lstStyle/>
           <a:p>
             <a:r>
-              <a:rPr lang="pt-PT" dirty="0" smtClean="0"/>
-              <a:t>* Vantagens para o site</a:t>
-            </a:r>
-          </a:p>
-          <a:p>
-            <a:r>
-              <a:rPr lang="pt-PT" dirty="0" smtClean="0"/>
-              <a:t>* Casos práticos mau e bom - exploração com </a:t>
-            </a:r>
-            <a:r>
-              <a:rPr lang="pt-PT" dirty="0" err="1" smtClean="0"/>
-              <a:t>iPad</a:t>
-            </a:r>
-            <a:endParaRPr lang="pt-PT" dirty="0" smtClean="0"/>
-          </a:p>
-          <a:p>
-            <a:r>
-              <a:rPr lang="pt-PT" dirty="0" smtClean="0"/>
-              <a:t>* Exemplo de uma página nível </a:t>
-            </a:r>
-            <a:r>
-              <a:rPr lang="pt-PT" dirty="0" err="1" smtClean="0"/>
-              <a:t>sss</a:t>
-            </a:r>
-            <a:r>
-              <a:rPr lang="pt-PT" dirty="0" smtClean="0"/>
-              <a:t> (WCAG 2.0)</a:t>
-            </a:r>
-          </a:p>
-          <a:p>
-            <a:r>
-              <a:rPr lang="pt-PT" dirty="0" smtClean="0"/>
-              <a:t>* Anotação HTML</a:t>
-            </a:r>
-          </a:p>
-          <a:p>
-            <a:endParaRPr lang="pt-PT" dirty="0" smtClean="0"/>
+              <a:rPr lang="pt-PT" noProof="0" dirty="0" smtClean="0"/>
+              <a:t>* Estatística de pessoas com necessidades especiais em Portugal</a:t>
+            </a:r>
+          </a:p>
+          <a:p>
+            <a:r>
+              <a:rPr lang="pt-PT" noProof="0" dirty="0" smtClean="0"/>
+              <a:t>* Na Europa</a:t>
+            </a:r>
+          </a:p>
+          <a:p>
+            <a:r>
+              <a:rPr lang="pt-PT" noProof="0" dirty="0" smtClean="0"/>
+              <a:t>* ...</a:t>
+            </a:r>
+          </a:p>
+          <a:p>
+            <a:endParaRPr lang="pt-PT" noProof="0" dirty="0" smtClean="0"/>
           </a:p>
         </p:txBody>
       </p:sp>
     </p:spTree>
     <p:extLst>
       <p:ext uri="{BB962C8B-B14F-4D97-AF65-F5344CB8AC3E}">
-        <p14:creationId xmlns:p14="http://schemas.microsoft.com/office/powerpoint/2010/main" val="1042487288"/>
+        <p14:creationId xmlns:p14="http://schemas.microsoft.com/office/powerpoint/2010/main" val="3932973354"/>
       </p:ext>
     </p:extLst>
   </p:cSld>
@@ -3524,10 +4638,14 @@
           <a:p>
             <a:pPr lvl="0"/>
             <a:r>
-              <a:rPr lang="pt-PT" dirty="0" smtClean="0"/>
-              <a:t>Contribuições em Portugal (5min)</a:t>
-            </a:r>
-            <a:endParaRPr lang="pt-PT" dirty="0"/>
+              <a:rPr lang="pt-PT" noProof="0" dirty="0" smtClean="0"/>
+              <a:t>O que é</a:t>
+            </a:r>
+            <a:r>
+              <a:rPr lang="pt-PT" noProof="0" dirty="0" smtClean="0"/>
+              <a:t>?</a:t>
+            </a:r>
+            <a:endParaRPr lang="pt-PT" noProof="0" dirty="0"/>
           </a:p>
         </p:txBody>
       </p:sp>
@@ -3543,46 +4661,75 @@
         </p:nvSpPr>
         <p:spPr/>
         <p:txBody>
-          <a:bodyPr/>
-          <a:lstStyle/>
-          <a:p>
-            <a:r>
-              <a:rPr lang="pt-PT" dirty="0" smtClean="0"/>
-              <a:t>* Sites de referência</a:t>
-            </a:r>
-          </a:p>
-          <a:p>
-            <a:r>
-              <a:rPr lang="pt-PT" dirty="0" smtClean="0"/>
-              <a:t>  * FCT - Unidade Acesso</a:t>
-            </a:r>
-          </a:p>
-          <a:p>
-            <a:r>
-              <a:rPr lang="pt-PT" dirty="0" smtClean="0"/>
-              <a:t>  * UP - </a:t>
-            </a:r>
-            <a:r>
-              <a:rPr lang="pt-PT" dirty="0" err="1" smtClean="0"/>
-              <a:t>Places</a:t>
-            </a:r>
-            <a:r>
-              <a:rPr lang="pt-PT" dirty="0" smtClean="0"/>
-              <a:t>, Plataforma de Acessibilidade</a:t>
-            </a:r>
+          <a:bodyPr>
+            <a:normAutofit/>
+          </a:bodyPr>
+          <a:lstStyle/>
+          <a:p>
+            <a:r>
+              <a:rPr lang="pt-PT" noProof="0" dirty="0" smtClean="0"/>
+              <a:t>Normas de suporte:</a:t>
+            </a:r>
+          </a:p>
+          <a:p>
+            <a:pPr lvl="1"/>
+            <a:r>
+              <a:rPr lang="pt-PT" noProof="0" dirty="0" smtClean="0"/>
+              <a:t>WCAG 2.0</a:t>
+            </a:r>
+          </a:p>
+          <a:p>
+            <a:pPr lvl="1"/>
+            <a:r>
+              <a:rPr lang="pt-PT" noProof="0" dirty="0" smtClean="0"/>
+              <a:t>ISO/IEC 40500:2012</a:t>
+            </a:r>
+          </a:p>
+          <a:p>
+            <a:r>
+              <a:rPr lang="pt-PT" noProof="0" dirty="0" smtClean="0"/>
+              <a:t>Suporte legal:</a:t>
+            </a:r>
+          </a:p>
+          <a:p>
+            <a:pPr lvl="1"/>
+            <a:r>
+              <a:rPr lang="pt-PT" noProof="0" dirty="0" smtClean="0"/>
+              <a:t>Legislação</a:t>
+            </a:r>
+            <a:r>
+              <a:rPr lang="pt-PT" baseline="0" noProof="0" dirty="0" smtClean="0"/>
+              <a:t> comunitária</a:t>
+            </a:r>
+            <a:endParaRPr lang="pt-PT" noProof="0" dirty="0" smtClean="0"/>
+          </a:p>
+          <a:p>
+            <a:pPr lvl="1"/>
+            <a:r>
+              <a:rPr lang="pt-PT" noProof="0" dirty="0" smtClean="0"/>
+              <a:t>Legislação portuguesa</a:t>
+            </a:r>
+            <a:endParaRPr lang="pt-PT" noProof="0" dirty="0" smtClean="0"/>
           </a:p>
         </p:txBody>
       </p:sp>
     </p:spTree>
     <p:extLst>
       <p:ext uri="{BB962C8B-B14F-4D97-AF65-F5344CB8AC3E}">
-        <p14:creationId xmlns:p14="http://schemas.microsoft.com/office/powerpoint/2010/main" val="1789695018"/>
+        <p14:creationId xmlns:p14="http://schemas.microsoft.com/office/powerpoint/2010/main" val="3999221353"/>
       </p:ext>
     </p:extLst>
   </p:cSld>
   <p:clrMapOvr>
     <a:masterClrMapping/>
   </p:clrMapOvr>
+  <p:timing>
+    <p:tnLst>
+      <p:par>
+        <p:cTn id="1" dur="indefinite" restart="never" nodeType="tmRoot"/>
+      </p:par>
+    </p:tnLst>
+  </p:timing>
 </p:sld>
 </file>
 
@@ -3618,44 +4765,328 @@
           <a:bodyPr/>
           <a:lstStyle/>
           <a:p>
-            <a:r>
-              <a:rPr lang="en-US" dirty="0" err="1" smtClean="0"/>
+            <a:pPr lvl="0"/>
+            <a:r>
+              <a:rPr lang="pt-PT" noProof="0" dirty="0" smtClean="0"/>
+              <a:t>Aplicabilidade (5min)</a:t>
+            </a:r>
+            <a:endParaRPr lang="pt-PT" noProof="0" dirty="0"/>
+          </a:p>
+        </p:txBody>
+      </p:sp>
+      <p:sp>
+        <p:nvSpPr>
+          <p:cNvPr id="3" name="Content Placeholder 2"/>
+          <p:cNvSpPr>
+            <a:spLocks noGrp="1"/>
+          </p:cNvSpPr>
+          <p:nvPr>
+            <p:ph idx="1"/>
+          </p:nvPr>
+        </p:nvSpPr>
+        <p:spPr/>
+        <p:txBody>
+          <a:bodyPr>
+            <a:normAutofit/>
+          </a:bodyPr>
+          <a:lstStyle/>
+          <a:p>
+            <a:r>
+              <a:rPr lang="en-US" noProof="0" dirty="0" err="1" smtClean="0"/>
+              <a:t>Paralelo</a:t>
+            </a:r>
+            <a:r>
+              <a:rPr lang="en-US" noProof="0" dirty="0" smtClean="0"/>
+              <a:t> API -&gt; HAL /</a:t>
+            </a:r>
+            <a:r>
+              <a:rPr lang="en-US" baseline="0" noProof="0" dirty="0" smtClean="0"/>
+              <a:t> UA -&gt; WCAG</a:t>
+            </a:r>
+            <a:endParaRPr lang="pt-PT" noProof="0" dirty="0" smtClean="0"/>
+          </a:p>
+          <a:p>
+            <a:r>
+              <a:rPr lang="pt-PT" noProof="0" dirty="0" smtClean="0"/>
+              <a:t>Vantagens </a:t>
+            </a:r>
+            <a:r>
+              <a:rPr lang="pt-PT" noProof="0" dirty="0" smtClean="0"/>
+              <a:t>para o </a:t>
+            </a:r>
+            <a:r>
+              <a:rPr lang="pt-PT" noProof="0" dirty="0" smtClean="0"/>
+              <a:t>site:</a:t>
+            </a:r>
+          </a:p>
+          <a:p>
+            <a:pPr lvl="1"/>
+            <a:r>
+              <a:rPr lang="pt-PT" noProof="0" dirty="0" err="1" smtClean="0"/>
+              <a:t>Crawlers</a:t>
+            </a:r>
+            <a:r>
+              <a:rPr lang="pt-PT" noProof="0" dirty="0" smtClean="0"/>
+              <a:t> portam-se como </a:t>
+            </a:r>
+            <a:r>
+              <a:rPr lang="pt-PT" noProof="0" dirty="0" err="1" smtClean="0"/>
+              <a:t>UAs</a:t>
+            </a:r>
+            <a:endParaRPr lang="pt-PT" noProof="0" dirty="0" smtClean="0"/>
+          </a:p>
+          <a:p>
+            <a:r>
+              <a:rPr lang="pt-PT" noProof="0" dirty="0" smtClean="0"/>
+              <a:t>Casos </a:t>
+            </a:r>
+            <a:r>
+              <a:rPr lang="pt-PT" noProof="0" dirty="0" smtClean="0"/>
+              <a:t>práticos mau e bom - exploração com </a:t>
+            </a:r>
+            <a:r>
+              <a:rPr lang="pt-PT" noProof="0" dirty="0" err="1" smtClean="0"/>
+              <a:t>iPad</a:t>
+            </a:r>
+            <a:endParaRPr lang="pt-PT" noProof="0" dirty="0" smtClean="0"/>
+          </a:p>
+          <a:p>
+            <a:r>
+              <a:rPr lang="pt-PT" noProof="0" dirty="0" smtClean="0"/>
+              <a:t>Exemplo </a:t>
+            </a:r>
+            <a:r>
+              <a:rPr lang="pt-PT" noProof="0" dirty="0" smtClean="0"/>
+              <a:t>de uma página nível </a:t>
+            </a:r>
+            <a:r>
+              <a:rPr lang="pt-PT" noProof="0" dirty="0" smtClean="0"/>
+              <a:t>de conformidade AAA </a:t>
+            </a:r>
+            <a:r>
+              <a:rPr lang="pt-PT" noProof="0" dirty="0" smtClean="0"/>
+              <a:t>(WCAG 2.0)</a:t>
+            </a:r>
+          </a:p>
+          <a:p>
+            <a:r>
+              <a:rPr lang="pt-PT" noProof="0" dirty="0" smtClean="0"/>
+              <a:t>Exemplo de marcação HTML</a:t>
+            </a:r>
+            <a:endParaRPr lang="pt-PT" noProof="0" dirty="0" smtClean="0"/>
+          </a:p>
+        </p:txBody>
+      </p:sp>
+    </p:spTree>
+    <p:extLst>
+      <p:ext uri="{BB962C8B-B14F-4D97-AF65-F5344CB8AC3E}">
+        <p14:creationId xmlns:p14="http://schemas.microsoft.com/office/powerpoint/2010/main" val="1042487288"/>
+      </p:ext>
+    </p:extLst>
+  </p:cSld>
+  <p:clrMapOvr>
+    <a:masterClrMapping/>
+  </p:clrMapOvr>
+</p:sld>
+</file>
+
+<file path=ppt/slides/slide8.xml><?xml version="1.0" encoding="utf-8"?>
+<p:sld xmlns:a="http://schemas.openxmlformats.org/drawingml/2006/main" xmlns:r="http://schemas.openxmlformats.org/officeDocument/2006/relationships" xmlns:p="http://schemas.openxmlformats.org/presentationml/2006/main">
+  <p:cSld>
+    <p:spTree>
+      <p:nvGrpSpPr>
+        <p:cNvPr id="1" name=""/>
+        <p:cNvGrpSpPr/>
+        <p:nvPr/>
+      </p:nvGrpSpPr>
+      <p:grpSpPr>
+        <a:xfrm>
+          <a:off x="0" y="0"/>
+          <a:ext cx="0" cy="0"/>
+          <a:chOff x="0" y="0"/>
+          <a:chExt cx="0" cy="0"/>
+        </a:xfrm>
+      </p:grpSpPr>
+      <p:sp>
+        <p:nvSpPr>
+          <p:cNvPr id="2" name="Title 1"/>
+          <p:cNvSpPr>
+            <a:spLocks noGrp="1"/>
+          </p:cNvSpPr>
+          <p:nvPr>
+            <p:ph type="title"/>
+          </p:nvPr>
+        </p:nvSpPr>
+        <p:spPr/>
+        <p:txBody>
+          <a:bodyPr/>
+          <a:lstStyle/>
+          <a:p>
+            <a:pPr lvl="0"/>
+            <a:r>
+              <a:rPr lang="pt-PT" noProof="0" dirty="0" smtClean="0"/>
+              <a:t>Contribuições em Portugal (5min)</a:t>
+            </a:r>
+            <a:endParaRPr lang="pt-PT" noProof="0" dirty="0"/>
+          </a:p>
+        </p:txBody>
+      </p:sp>
+      <p:sp>
+        <p:nvSpPr>
+          <p:cNvPr id="3" name="Content Placeholder 2"/>
+          <p:cNvSpPr>
+            <a:spLocks noGrp="1"/>
+          </p:cNvSpPr>
+          <p:nvPr>
+            <p:ph idx="1"/>
+          </p:nvPr>
+        </p:nvSpPr>
+        <p:spPr/>
+        <p:txBody>
+          <a:bodyPr/>
+          <a:lstStyle/>
+          <a:p>
+            <a:r>
+              <a:rPr lang="pt-PT" noProof="0" dirty="0" smtClean="0"/>
+              <a:t>FCT </a:t>
+            </a:r>
+            <a:r>
+              <a:rPr lang="pt-PT" noProof="0" dirty="0" smtClean="0"/>
+              <a:t>- Unidade Acesso</a:t>
+            </a:r>
+          </a:p>
+          <a:p>
+            <a:r>
+              <a:rPr lang="pt-PT" noProof="0" dirty="0" smtClean="0"/>
+              <a:t>UP </a:t>
+            </a:r>
+            <a:r>
+              <a:rPr lang="pt-PT" noProof="0" dirty="0" smtClean="0"/>
+              <a:t>- </a:t>
+            </a:r>
+            <a:r>
+              <a:rPr lang="pt-PT" noProof="0" dirty="0" err="1" smtClean="0"/>
+              <a:t>Places</a:t>
+            </a:r>
+            <a:r>
+              <a:rPr lang="pt-PT" noProof="0" dirty="0" smtClean="0"/>
+              <a:t>, Plataforma de </a:t>
+            </a:r>
+            <a:r>
+              <a:rPr lang="pt-PT" noProof="0" dirty="0" smtClean="0"/>
+              <a:t>Acessibilidade</a:t>
+            </a:r>
+          </a:p>
+          <a:p>
+            <a:endParaRPr lang="pt-PT" noProof="0" dirty="0" smtClean="0"/>
+          </a:p>
+        </p:txBody>
+      </p:sp>
+    </p:spTree>
+    <p:extLst>
+      <p:ext uri="{BB962C8B-B14F-4D97-AF65-F5344CB8AC3E}">
+        <p14:creationId xmlns:p14="http://schemas.microsoft.com/office/powerpoint/2010/main" val="1789695018"/>
+      </p:ext>
+    </p:extLst>
+  </p:cSld>
+  <p:clrMapOvr>
+    <a:masterClrMapping/>
+  </p:clrMapOvr>
+</p:sld>
+</file>
+
+<file path=ppt/slides/slide9.xml><?xml version="1.0" encoding="utf-8"?>
+<p:sld xmlns:a="http://schemas.openxmlformats.org/drawingml/2006/main" xmlns:r="http://schemas.openxmlformats.org/officeDocument/2006/relationships" xmlns:p="http://schemas.openxmlformats.org/presentationml/2006/main">
+  <p:cSld>
+    <p:spTree>
+      <p:nvGrpSpPr>
+        <p:cNvPr id="1" name=""/>
+        <p:cNvGrpSpPr/>
+        <p:nvPr/>
+      </p:nvGrpSpPr>
+      <p:grpSpPr>
+        <a:xfrm>
+          <a:off x="0" y="0"/>
+          <a:ext cx="0" cy="0"/>
+          <a:chOff x="0" y="0"/>
+          <a:chExt cx="0" cy="0"/>
+        </a:xfrm>
+      </p:grpSpPr>
+      <p:sp>
+        <p:nvSpPr>
+          <p:cNvPr id="2" name="Title 1"/>
+          <p:cNvSpPr>
+            <a:spLocks noGrp="1"/>
+          </p:cNvSpPr>
+          <p:nvPr>
+            <p:ph type="title"/>
+          </p:nvPr>
+        </p:nvSpPr>
+        <p:spPr/>
+        <p:txBody>
+          <a:bodyPr/>
+          <a:lstStyle/>
+          <a:p>
+            <a:r>
+              <a:rPr lang="pt-PT" noProof="0" dirty="0" smtClean="0"/>
               <a:t>Referências</a:t>
             </a:r>
+            <a:endParaRPr lang="pt-PT" noProof="0" dirty="0"/>
+          </a:p>
+        </p:txBody>
+      </p:sp>
+      <p:sp>
+        <p:nvSpPr>
+          <p:cNvPr id="3" name="Content Placeholder 2"/>
+          <p:cNvSpPr>
+            <a:spLocks noGrp="1"/>
+          </p:cNvSpPr>
+          <p:nvPr>
+            <p:ph idx="1"/>
+          </p:nvPr>
+        </p:nvSpPr>
+        <p:spPr/>
+        <p:txBody>
+          <a:bodyPr/>
+          <a:lstStyle/>
+          <a:p>
+            <a:r>
+              <a:rPr lang="pt-PT" noProof="0" dirty="0" smtClean="0"/>
+              <a:t>Validadores</a:t>
+            </a:r>
+          </a:p>
+          <a:p>
+            <a:pPr lvl="1"/>
+            <a:r>
+              <a:rPr lang="pt-PT" dirty="0"/>
+              <a:t>http://www.acessibilidade.gov.pt/accessmonitor/</a:t>
+            </a:r>
+            <a:endParaRPr lang="pt-PT" noProof="0" dirty="0" smtClean="0"/>
+          </a:p>
+          <a:p>
+            <a:r>
+              <a:rPr lang="pt-PT" noProof="0" dirty="0" smtClean="0"/>
+              <a:t>Sites de referência:</a:t>
+            </a:r>
+          </a:p>
+          <a:p>
+            <a:pPr lvl="1"/>
+            <a:r>
+              <a:rPr lang="en-US" noProof="0" dirty="0" smtClean="0"/>
+              <a:t>UMIC</a:t>
+            </a:r>
+          </a:p>
+          <a:p>
+            <a:pPr lvl="1"/>
+            <a:r>
+              <a:rPr lang="en-US" dirty="0" smtClean="0"/>
+              <a:t>CGD</a:t>
+            </a:r>
             <a:endParaRPr lang="pt-PT" dirty="0"/>
           </a:p>
-        </p:txBody>
-      </p:sp>
-      <p:sp>
-        <p:nvSpPr>
-          <p:cNvPr id="3" name="Content Placeholder 2"/>
-          <p:cNvSpPr>
-            <a:spLocks noGrp="1"/>
-          </p:cNvSpPr>
-          <p:nvPr>
-            <p:ph idx="1"/>
-          </p:nvPr>
-        </p:nvSpPr>
-        <p:spPr/>
-        <p:txBody>
-          <a:bodyPr/>
-          <a:lstStyle/>
-          <a:p>
-            <a:r>
-              <a:rPr lang="pt-PT" dirty="0" smtClean="0"/>
-              <a:t>* Validadores</a:t>
-            </a:r>
-          </a:p>
-          <a:p>
-            <a:r>
-              <a:rPr lang="en-US" dirty="0" err="1" smtClean="0"/>
-              <a:t>Melhores</a:t>
-            </a:r>
-            <a:r>
-              <a:rPr lang="en-US" dirty="0" smtClean="0"/>
-              <a:t> sites</a:t>
-            </a:r>
-            <a:endParaRPr lang="pt-PT" dirty="0"/>
+          <a:p>
+            <a:pPr lvl="1"/>
+            <a:endParaRPr lang="en-US" dirty="0" smtClean="0"/>
           </a:p>
         </p:txBody>
       </p:sp>
@@ -3931,4 +5362,265 @@
     </a:ext>
   </a:extLst>
 </a:theme>
+</file>
+
+<file path=ppt/theme/theme2.xml><?xml version="1.0" encoding="utf-8"?>
+<a:theme xmlns:a="http://schemas.openxmlformats.org/drawingml/2006/main" name="Office Theme">
+  <a:themeElements>
+    <a:clrScheme name="Office">
+      <a:dk1>
+        <a:sysClr val="windowText" lastClr="000000"/>
+      </a:dk1>
+      <a:lt1>
+        <a:sysClr val="window" lastClr="FFFFFF"/>
+      </a:lt1>
+      <a:dk2>
+        <a:srgbClr val="44546A"/>
+      </a:dk2>
+      <a:lt2>
+        <a:srgbClr val="E7E6E6"/>
+      </a:lt2>
+      <a:accent1>
+        <a:srgbClr val="5B9BD5"/>
+      </a:accent1>
+      <a:accent2>
+        <a:srgbClr val="ED7D31"/>
+      </a:accent2>
+      <a:accent3>
+        <a:srgbClr val="A5A5A5"/>
+      </a:accent3>
+      <a:accent4>
+        <a:srgbClr val="FFC000"/>
+      </a:accent4>
+      <a:accent5>
+        <a:srgbClr val="4472C4"/>
+      </a:accent5>
+      <a:accent6>
+        <a:srgbClr val="70AD47"/>
+      </a:accent6>
+      <a:hlink>
+        <a:srgbClr val="0563C1"/>
+      </a:hlink>
+      <a:folHlink>
+        <a:srgbClr val="954F72"/>
+      </a:folHlink>
+    </a:clrScheme>
+    <a:fontScheme name="Office">
+      <a:majorFont>
+        <a:latin typeface="Calibri Light" panose="020F0302020204030204"/>
+        <a:ea typeface=""/>
+        <a:cs typeface=""/>
+        <a:font script="Jpan" typeface="游ゴシック Light"/>
+        <a:font script="Hang" typeface="맑은 고딕"/>
+        <a:font script="Hans" typeface="等线 Light"/>
+        <a:font script="Hant" typeface="新細明體"/>
+        <a:font script="Arab" typeface="Times New Roman"/>
+        <a:font script="Hebr" typeface="Times New Roman"/>
+        <a:font script="Thai" typeface="Angsana New"/>
+        <a:font script="Ethi" typeface="Nyala"/>
+        <a:font script="Beng" typeface="Vrinda"/>
+        <a:font script="Gujr" typeface="Shruti"/>
+        <a:font script="Khmr" typeface="MoolBoran"/>
+        <a:font script="Knda" typeface="Tunga"/>
+        <a:font script="Guru" typeface="Raavi"/>
+        <a:font script="Cans" typeface="Euphemia"/>
+        <a:font script="Cher" typeface="Plantagenet Cherokee"/>
+        <a:font script="Yiii" typeface="Microsoft Yi Baiti"/>
+        <a:font script="Tibt" typeface="Microsoft Himalaya"/>
+        <a:font script="Thaa" typeface="MV Boli"/>
+        <a:font script="Deva" typeface="Mangal"/>
+        <a:font script="Telu" typeface="Gautami"/>
+        <a:font script="Taml" typeface="Latha"/>
+        <a:font script="Syrc" typeface="Estrangelo Edessa"/>
+        <a:font script="Orya" typeface="Kalinga"/>
+        <a:font script="Mlym" typeface="Kartika"/>
+        <a:font script="Laoo" typeface="DokChampa"/>
+        <a:font script="Sinh" typeface="Iskoola Pota"/>
+        <a:font script="Mong" typeface="Mongolian Baiti"/>
+        <a:font script="Viet" typeface="Times New Roman"/>
+        <a:font script="Uigh" typeface="Microsoft Uighur"/>
+        <a:font script="Geor" typeface="Sylfaen"/>
+      </a:majorFont>
+      <a:minorFont>
+        <a:latin typeface="Calibri" panose="020F0502020204030204"/>
+        <a:ea typeface=""/>
+        <a:cs typeface=""/>
+        <a:font script="Jpan" typeface="游ゴシック"/>
+        <a:font script="Hang" typeface="맑은 고딕"/>
+        <a:font script="Hans" typeface="等线"/>
+        <a:font script="Hant" typeface="新細明體"/>
+        <a:font script="Arab" typeface="Arial"/>
+        <a:font script="Hebr" typeface="Arial"/>
+        <a:font script="Thai" typeface="Cordia New"/>
+        <a:font script="Ethi" typeface="Nyala"/>
+        <a:font script="Beng" typeface="Vrinda"/>
+        <a:font script="Gujr" typeface="Shruti"/>
+        <a:font script="Khmr" typeface="DaunPenh"/>
+        <a:font script="Knda" typeface="Tunga"/>
+        <a:font script="Guru" typeface="Raavi"/>
+        <a:font script="Cans" typeface="Euphemia"/>
+        <a:font script="Cher" typeface="Plantagenet Cherokee"/>
+        <a:font script="Yiii" typeface="Microsoft Yi Baiti"/>
+        <a:font script="Tibt" typeface="Microsoft Himalaya"/>
+        <a:font script="Thaa" typeface="MV Boli"/>
+        <a:font script="Deva" typeface="Mangal"/>
+        <a:font script="Telu" typeface="Gautami"/>
+        <a:font script="Taml" typeface="Latha"/>
+        <a:font script="Syrc" typeface="Estrangelo Edessa"/>
+        <a:font script="Orya" typeface="Kalinga"/>
+        <a:font script="Mlym" typeface="Kartika"/>
+        <a:font script="Laoo" typeface="DokChampa"/>
+        <a:font script="Sinh" typeface="Iskoola Pota"/>
+        <a:font script="Mong" typeface="Mongolian Baiti"/>
+        <a:font script="Viet" typeface="Arial"/>
+        <a:font script="Uigh" typeface="Microsoft Uighur"/>
+        <a:font script="Geor" typeface="Sylfaen"/>
+      </a:minorFont>
+    </a:fontScheme>
+    <a:fmtScheme name="Office">
+      <a:fillStyleLst>
+        <a:solidFill>
+          <a:schemeClr val="phClr"/>
+        </a:solidFill>
+        <a:gradFill rotWithShape="1">
+          <a:gsLst>
+            <a:gs pos="0">
+              <a:schemeClr val="phClr">
+                <a:lumMod val="110000"/>
+                <a:satMod val="105000"/>
+                <a:tint val="67000"/>
+              </a:schemeClr>
+            </a:gs>
+            <a:gs pos="50000">
+              <a:schemeClr val="phClr">
+                <a:lumMod val="105000"/>
+                <a:satMod val="103000"/>
+                <a:tint val="73000"/>
+              </a:schemeClr>
+            </a:gs>
+            <a:gs pos="100000">
+              <a:schemeClr val="phClr">
+                <a:lumMod val="105000"/>
+                <a:satMod val="109000"/>
+                <a:tint val="81000"/>
+              </a:schemeClr>
+            </a:gs>
+          </a:gsLst>
+          <a:lin ang="5400000" scaled="0"/>
+        </a:gradFill>
+        <a:gradFill rotWithShape="1">
+          <a:gsLst>
+            <a:gs pos="0">
+              <a:schemeClr val="phClr">
+                <a:satMod val="103000"/>
+                <a:lumMod val="102000"/>
+                <a:tint val="94000"/>
+              </a:schemeClr>
+            </a:gs>
+            <a:gs pos="50000">
+              <a:schemeClr val="phClr">
+                <a:satMod val="110000"/>
+                <a:lumMod val="100000"/>
+                <a:shade val="100000"/>
+              </a:schemeClr>
+            </a:gs>
+            <a:gs pos="100000">
+              <a:schemeClr val="phClr">
+                <a:lumMod val="99000"/>
+                <a:satMod val="120000"/>
+                <a:shade val="78000"/>
+              </a:schemeClr>
+            </a:gs>
+          </a:gsLst>
+          <a:lin ang="5400000" scaled="0"/>
+        </a:gradFill>
+      </a:fillStyleLst>
+      <a:lnStyleLst>
+        <a:ln w="6350" cap="flat" cmpd="sng" algn="ctr">
+          <a:solidFill>
+            <a:schemeClr val="phClr"/>
+          </a:solidFill>
+          <a:prstDash val="solid"/>
+          <a:miter lim="800000"/>
+        </a:ln>
+        <a:ln w="12700" cap="flat" cmpd="sng" algn="ctr">
+          <a:solidFill>
+            <a:schemeClr val="phClr"/>
+          </a:solidFill>
+          <a:prstDash val="solid"/>
+          <a:miter lim="800000"/>
+        </a:ln>
+        <a:ln w="19050" cap="flat" cmpd="sng" algn="ctr">
+          <a:solidFill>
+            <a:schemeClr val="phClr"/>
+          </a:solidFill>
+          <a:prstDash val="solid"/>
+          <a:miter lim="800000"/>
+        </a:ln>
+      </a:lnStyleLst>
+      <a:effectStyleLst>
+        <a:effectStyle>
+          <a:effectLst/>
+        </a:effectStyle>
+        <a:effectStyle>
+          <a:effectLst/>
+        </a:effectStyle>
+        <a:effectStyle>
+          <a:effectLst>
+            <a:outerShdw blurRad="57150" dist="19050" dir="5400000" algn="ctr" rotWithShape="0">
+              <a:srgbClr val="000000">
+                <a:alpha val="63000"/>
+              </a:srgbClr>
+            </a:outerShdw>
+          </a:effectLst>
+        </a:effectStyle>
+      </a:effectStyleLst>
+      <a:bgFillStyleLst>
+        <a:solidFill>
+          <a:schemeClr val="phClr"/>
+        </a:solidFill>
+        <a:solidFill>
+          <a:schemeClr val="phClr">
+            <a:tint val="95000"/>
+            <a:satMod val="170000"/>
+          </a:schemeClr>
+        </a:solidFill>
+        <a:gradFill rotWithShape="1">
+          <a:gsLst>
+            <a:gs pos="0">
+              <a:schemeClr val="phClr">
+                <a:tint val="93000"/>
+                <a:satMod val="150000"/>
+                <a:shade val="98000"/>
+                <a:lumMod val="102000"/>
+              </a:schemeClr>
+            </a:gs>
+            <a:gs pos="50000">
+              <a:schemeClr val="phClr">
+                <a:tint val="98000"/>
+                <a:satMod val="130000"/>
+                <a:shade val="90000"/>
+                <a:lumMod val="103000"/>
+              </a:schemeClr>
+            </a:gs>
+            <a:gs pos="100000">
+              <a:schemeClr val="phClr">
+                <a:shade val="63000"/>
+                <a:satMod val="120000"/>
+              </a:schemeClr>
+            </a:gs>
+          </a:gsLst>
+          <a:lin ang="5400000" scaled="0"/>
+        </a:gradFill>
+      </a:bgFillStyleLst>
+    </a:fmtScheme>
+  </a:themeElements>
+  <a:objectDefaults/>
+  <a:extraClrSchemeLst/>
+  <a:extLst>
+    <a:ext uri="{05A4C25C-085E-4340-85A3-A5531E510DB2}">
+      <thm15:themeFamily xmlns:thm15="http://schemas.microsoft.com/office/thememl/2012/main" name="Office Theme" id="{62F939B6-93AF-4DB8-9C6B-D6C7DFDC589F}" vid="{4A3C46E8-61CC-4603-A589-7422A47A8E4A}"/>
+    </a:ext>
+  </a:extLst>
+</a:theme>
 </file>
</xml_diff>

<commit_message>
Apresentação individual - WIP
</commit_message>
<xml_diff>
--- a/docs/Accessibility a22908.pptx
+++ b/docs/Accessibility a22908.pptx
@@ -5,7 +5,7 @@
     <p:sldMasterId id="2147483648" r:id="rId1"/>
   </p:sldMasterIdLst>
   <p:notesMasterIdLst>
-    <p:notesMasterId r:id="rId11"/>
+    <p:notesMasterId r:id="rId12"/>
   </p:notesMasterIdLst>
   <p:sldIdLst>
     <p:sldId id="256" r:id="rId2"/>
@@ -14,9 +14,10 @@
     <p:sldId id="264" r:id="rId5"/>
     <p:sldId id="259" r:id="rId6"/>
     <p:sldId id="258" r:id="rId7"/>
-    <p:sldId id="260" r:id="rId8"/>
-    <p:sldId id="261" r:id="rId9"/>
-    <p:sldId id="262" r:id="rId10"/>
+    <p:sldId id="265" r:id="rId8"/>
+    <p:sldId id="260" r:id="rId9"/>
+    <p:sldId id="261" r:id="rId10"/>
+    <p:sldId id="262" r:id="rId11"/>
   </p:sldIdLst>
   <p:sldSz cx="12192000" cy="6858000"/>
   <p:notesSz cx="6858000" cy="9144000"/>
@@ -552,6 +553,334 @@
     <p:extLst>
       <p:ext uri="{BB962C8B-B14F-4D97-AF65-F5344CB8AC3E}">
         <p14:creationId xmlns:p14="http://schemas.microsoft.com/office/powerpoint/2010/main" val="3451408510"/>
+      </p:ext>
+    </p:extLst>
+  </p:cSld>
+  <p:clrMapOvr>
+    <a:masterClrMapping/>
+  </p:clrMapOvr>
+</p:notes>
+</file>
+
+<file path=ppt/notesSlides/notesSlide2.xml><?xml version="1.0" encoding="utf-8"?>
+<p:notes xmlns:a="http://schemas.openxmlformats.org/drawingml/2006/main" xmlns:r="http://schemas.openxmlformats.org/officeDocument/2006/relationships" xmlns:p="http://schemas.openxmlformats.org/presentationml/2006/main">
+  <p:cSld>
+    <p:spTree>
+      <p:nvGrpSpPr>
+        <p:cNvPr id="1" name=""/>
+        <p:cNvGrpSpPr/>
+        <p:nvPr/>
+      </p:nvGrpSpPr>
+      <p:grpSpPr>
+        <a:xfrm>
+          <a:off x="0" y="0"/>
+          <a:ext cx="0" cy="0"/>
+          <a:chOff x="0" y="0"/>
+          <a:chExt cx="0" cy="0"/>
+        </a:xfrm>
+      </p:grpSpPr>
+      <p:sp>
+        <p:nvSpPr>
+          <p:cNvPr id="2" name="Slide Image Placeholder 1"/>
+          <p:cNvSpPr>
+            <a:spLocks noGrp="1" noRot="1" noChangeAspect="1"/>
+          </p:cNvSpPr>
+          <p:nvPr>
+            <p:ph type="sldImg"/>
+          </p:nvPr>
+        </p:nvSpPr>
+        <p:spPr/>
+      </p:sp>
+      <p:sp>
+        <p:nvSpPr>
+          <p:cNvPr id="3" name="Notes Placeholder 2"/>
+          <p:cNvSpPr>
+            <a:spLocks noGrp="1"/>
+          </p:cNvSpPr>
+          <p:nvPr>
+            <p:ph type="body" idx="1"/>
+          </p:nvPr>
+        </p:nvSpPr>
+        <p:spPr/>
+        <p:txBody>
+          <a:bodyPr/>
+          <a:lstStyle/>
+          <a:p>
+            <a:r>
+              <a:rPr lang="en-US" sz="1200" b="0" i="0" kern="1200" dirty="0" smtClean="0">
+                <a:solidFill>
+                  <a:schemeClr val="tx1"/>
+                </a:solidFill>
+                <a:effectLst/>
+                <a:latin typeface="+mn-lt"/>
+                <a:ea typeface="+mn-ea"/>
+                <a:cs typeface="+mn-cs"/>
+              </a:rPr>
+              <a:t>Accessibility is about ensuring an equivalent user experience for people with disabilities, including people with age-related impairments. For the Web, accessibility means that people with disabilities can perceive, understand, navigate, and interact with websites and tools, and that they can contribute equally without barriers. Access to information and communications technologies is a basic human right as recognized in the </a:t>
+            </a:r>
+            <a:r>
+              <a:rPr lang="en-US" sz="1200" b="0" i="0" kern="1200" dirty="0" smtClean="0">
+                <a:solidFill>
+                  <a:schemeClr val="tx1"/>
+                </a:solidFill>
+                <a:effectLst/>
+                <a:latin typeface="+mn-lt"/>
+                <a:ea typeface="+mn-ea"/>
+                <a:cs typeface="+mn-cs"/>
+                <a:hlinkClick r:id="rId3"/>
+              </a:rPr>
+              <a:t>UN Convention on the Rights of Persons with Disabilities (CRPD) </a:t>
+            </a:r>
+            <a:r>
+              <a:rPr lang="en-US" sz="1200" b="0" i="0" kern="1200" dirty="0" smtClean="0">
+                <a:solidFill>
+                  <a:schemeClr val="tx1"/>
+                </a:solidFill>
+                <a:effectLst/>
+                <a:latin typeface="+mn-lt"/>
+                <a:ea typeface="+mn-ea"/>
+                <a:cs typeface="+mn-cs"/>
+              </a:rPr>
+              <a:t>. See </a:t>
+            </a:r>
+            <a:r>
+              <a:rPr lang="en-US" sz="1200" b="0" i="0" kern="1200" dirty="0" smtClean="0">
+                <a:solidFill>
+                  <a:schemeClr val="tx1"/>
+                </a:solidFill>
+                <a:effectLst/>
+                <a:latin typeface="+mn-lt"/>
+                <a:ea typeface="+mn-ea"/>
+                <a:cs typeface="+mn-cs"/>
+                <a:hlinkClick r:id="rId4"/>
+              </a:rPr>
+              <a:t>Accessibility - W3C </a:t>
+            </a:r>
+            <a:r>
+              <a:rPr lang="en-US" sz="1200" b="0" i="0" kern="1200" dirty="0" smtClean="0">
+                <a:solidFill>
+                  <a:schemeClr val="tx1"/>
+                </a:solidFill>
+                <a:effectLst/>
+                <a:latin typeface="+mn-lt"/>
+                <a:ea typeface="+mn-ea"/>
+                <a:cs typeface="+mn-cs"/>
+              </a:rPr>
+              <a:t> for an introduction to web accessibility.</a:t>
+            </a:r>
+          </a:p>
+          <a:p>
+            <a:r>
+              <a:rPr lang="en-US" sz="1200" b="0" i="0" kern="1200" dirty="0" smtClean="0">
+                <a:solidFill>
+                  <a:schemeClr val="tx1"/>
+                </a:solidFill>
+                <a:effectLst/>
+                <a:latin typeface="+mn-lt"/>
+                <a:ea typeface="+mn-ea"/>
+                <a:cs typeface="+mn-cs"/>
+              </a:rPr>
+              <a:t>Most accessibility guidelines also </a:t>
+            </a:r>
+            <a:r>
+              <a:rPr lang="en-US" sz="1200" b="0" i="0" kern="1200" dirty="0" smtClean="0">
+                <a:solidFill>
+                  <a:schemeClr val="tx1"/>
+                </a:solidFill>
+                <a:effectLst/>
+                <a:latin typeface="+mn-lt"/>
+                <a:ea typeface="+mn-ea"/>
+                <a:cs typeface="+mn-cs"/>
+                <a:hlinkClick r:id="rId5"/>
+              </a:rPr>
+              <a:t>improve usability for everyone</a:t>
+            </a:r>
+            <a:r>
+              <a:rPr lang="en-US" sz="1200" b="0" i="0" kern="1200" dirty="0" smtClean="0">
+                <a:solidFill>
+                  <a:schemeClr val="tx1"/>
+                </a:solidFill>
+                <a:effectLst/>
+                <a:latin typeface="+mn-lt"/>
+                <a:ea typeface="+mn-ea"/>
+                <a:cs typeface="+mn-cs"/>
+              </a:rPr>
+              <a:t>, and especially benefit </a:t>
+            </a:r>
+            <a:r>
+              <a:rPr lang="en-US" sz="1200" b="0" i="0" kern="1200" dirty="0" smtClean="0">
+                <a:solidFill>
+                  <a:schemeClr val="tx1"/>
+                </a:solidFill>
+                <a:effectLst/>
+                <a:latin typeface="+mn-lt"/>
+                <a:ea typeface="+mn-ea"/>
+                <a:cs typeface="+mn-cs"/>
+                <a:hlinkClick r:id="rId6"/>
+              </a:rPr>
+              <a:t>older users</a:t>
+            </a:r>
+            <a:r>
+              <a:rPr lang="en-US" sz="1200" b="0" i="0" kern="1200" dirty="0" smtClean="0">
+                <a:solidFill>
+                  <a:schemeClr val="tx1"/>
+                </a:solidFill>
+                <a:effectLst/>
+                <a:latin typeface="+mn-lt"/>
+                <a:ea typeface="+mn-ea"/>
+                <a:cs typeface="+mn-cs"/>
+              </a:rPr>
+              <a:t>, </a:t>
+            </a:r>
+            <a:r>
+              <a:rPr lang="en-US" sz="1200" b="0" i="0" kern="1200" dirty="0" smtClean="0">
+                <a:solidFill>
+                  <a:schemeClr val="tx1"/>
+                </a:solidFill>
+                <a:effectLst/>
+                <a:latin typeface="+mn-lt"/>
+                <a:ea typeface="+mn-ea"/>
+                <a:cs typeface="+mn-cs"/>
+                <a:hlinkClick r:id="rId7"/>
+              </a:rPr>
+              <a:t>people using different devices</a:t>
+            </a:r>
+            <a:r>
+              <a:rPr lang="en-US" sz="1200" b="0" i="0" kern="1200" dirty="0" smtClean="0">
+                <a:solidFill>
+                  <a:schemeClr val="tx1"/>
+                </a:solidFill>
+                <a:effectLst/>
+                <a:latin typeface="+mn-lt"/>
+                <a:ea typeface="+mn-ea"/>
+                <a:cs typeface="+mn-cs"/>
+              </a:rPr>
+              <a:t>, and </a:t>
+            </a:r>
+            <a:r>
+              <a:rPr lang="en-US" sz="1200" b="0" i="0" kern="1200" dirty="0" smtClean="0">
+                <a:solidFill>
+                  <a:schemeClr val="tx1"/>
+                </a:solidFill>
+                <a:effectLst/>
+                <a:latin typeface="+mn-lt"/>
+                <a:ea typeface="+mn-ea"/>
+                <a:cs typeface="+mn-cs"/>
+                <a:hlinkClick r:id="rId8"/>
+              </a:rPr>
+              <a:t>others such as</a:t>
+            </a:r>
+            <a:r>
+              <a:rPr lang="en-US" sz="1200" b="0" i="0" kern="1200" dirty="0" smtClean="0">
+                <a:solidFill>
+                  <a:schemeClr val="tx1"/>
+                </a:solidFill>
+                <a:effectLst/>
+                <a:latin typeface="+mn-lt"/>
+                <a:ea typeface="+mn-ea"/>
+                <a:cs typeface="+mn-cs"/>
+              </a:rPr>
+              <a:t> people with low literacy or not fluent in the language, and people with low bandwidth connections or using older technologies. Thus accessibility includes both:</a:t>
+            </a:r>
+          </a:p>
+          <a:p>
+            <a:r>
+              <a:rPr lang="en-US" sz="1200" b="1" i="0" kern="1200" dirty="0" smtClean="0">
+                <a:solidFill>
+                  <a:schemeClr val="tx1"/>
+                </a:solidFill>
+                <a:effectLst/>
+                <a:latin typeface="+mn-lt"/>
+                <a:ea typeface="+mn-ea"/>
+                <a:cs typeface="+mn-cs"/>
+              </a:rPr>
+              <a:t>Requirements that are more specific to people with disabilities</a:t>
+            </a:r>
+            <a:r>
+              <a:rPr lang="en-US" sz="1200" b="0" i="0" kern="1200" dirty="0" smtClean="0">
+                <a:solidFill>
+                  <a:schemeClr val="tx1"/>
+                </a:solidFill>
+                <a:effectLst/>
+                <a:latin typeface="+mn-lt"/>
+                <a:ea typeface="+mn-ea"/>
+                <a:cs typeface="+mn-cs"/>
+              </a:rPr>
+              <a:t>; for example, they ensure that websites work well with assistive technologies such as screen readers that read aloud web pages, screen magnifiers that enlarge web pages, and voice recognition software that is used to input text. Most of these requirements are technical and relate to the underlying code rather than to the visual appearance.</a:t>
+            </a:r>
+          </a:p>
+          <a:p>
+            <a:r>
+              <a:rPr lang="en-US" sz="1200" b="1" i="0" kern="1200" dirty="0" smtClean="0">
+                <a:solidFill>
+                  <a:schemeClr val="tx1"/>
+                </a:solidFill>
+                <a:effectLst/>
+                <a:latin typeface="+mn-lt"/>
+                <a:ea typeface="+mn-ea"/>
+                <a:cs typeface="+mn-cs"/>
+              </a:rPr>
+              <a:t>Requirements that are also general usability principles</a:t>
+            </a:r>
+            <a:r>
+              <a:rPr lang="en-US" sz="1200" b="0" i="0" kern="1200" dirty="0" smtClean="0">
+                <a:solidFill>
+                  <a:schemeClr val="tx1"/>
+                </a:solidFill>
+                <a:effectLst/>
+                <a:latin typeface="+mn-lt"/>
+                <a:ea typeface="+mn-ea"/>
+                <a:cs typeface="+mn-cs"/>
+              </a:rPr>
+              <a:t>, which are included in accessibility requirements because they can be significant barriers to people with disabilities. For example, a website that is developed so that it can be used without a mouse is good usability; and use without a mouse is an accessibility requirement because people with some physical and visual disabilities cannot use a mouse at all.</a:t>
+            </a:r>
+          </a:p>
+          <a:p>
+            <a:r>
+              <a:rPr lang="en-US" sz="1200" b="0" i="0" kern="1200" dirty="0" smtClean="0">
+                <a:solidFill>
+                  <a:schemeClr val="tx1"/>
+                </a:solidFill>
+                <a:effectLst/>
+                <a:latin typeface="+mn-lt"/>
+                <a:ea typeface="+mn-ea"/>
+                <a:cs typeface="+mn-cs"/>
+              </a:rPr>
+              <a:t>Websites, web tools, and other products that meet accessibility goals are more usable for everyone.</a:t>
+            </a:r>
+          </a:p>
+          <a:p>
+            <a:endParaRPr lang="pt-PT" dirty="0"/>
+          </a:p>
+        </p:txBody>
+      </p:sp>
+      <p:sp>
+        <p:nvSpPr>
+          <p:cNvPr id="4" name="Slide Number Placeholder 3"/>
+          <p:cNvSpPr>
+            <a:spLocks noGrp="1"/>
+          </p:cNvSpPr>
+          <p:nvPr>
+            <p:ph type="sldNum" sz="quarter" idx="10"/>
+          </p:nvPr>
+        </p:nvSpPr>
+        <p:spPr/>
+        <p:txBody>
+          <a:bodyPr/>
+          <a:lstStyle/>
+          <a:p>
+            <a:fld id="{94A2E280-44B8-42CB-8147-6E1BA11A84E2}" type="slidenum">
+              <a:rPr lang="pt-PT" smtClean="0"/>
+              <a:t>7</a:t>
+            </a:fld>
+            <a:endParaRPr lang="pt-PT"/>
+          </a:p>
+        </p:txBody>
+      </p:sp>
+    </p:spTree>
+    <p:extLst>
+      <p:ext uri="{BB962C8B-B14F-4D97-AF65-F5344CB8AC3E}">
+        <p14:creationId xmlns:p14="http://schemas.microsoft.com/office/powerpoint/2010/main" val="448145495"/>
       </p:ext>
     </p:extLst>
   </p:cSld>
@@ -3799,6 +4128,114 @@
 </p:sld>
 </file>
 
+<file path=ppt/slides/slide10.xml><?xml version="1.0" encoding="utf-8"?>
+<p:sld xmlns:a="http://schemas.openxmlformats.org/drawingml/2006/main" xmlns:r="http://schemas.openxmlformats.org/officeDocument/2006/relationships" xmlns:p="http://schemas.openxmlformats.org/presentationml/2006/main">
+  <p:cSld>
+    <p:spTree>
+      <p:nvGrpSpPr>
+        <p:cNvPr id="1" name=""/>
+        <p:cNvGrpSpPr/>
+        <p:nvPr/>
+      </p:nvGrpSpPr>
+      <p:grpSpPr>
+        <a:xfrm>
+          <a:off x="0" y="0"/>
+          <a:ext cx="0" cy="0"/>
+          <a:chOff x="0" y="0"/>
+          <a:chExt cx="0" cy="0"/>
+        </a:xfrm>
+      </p:grpSpPr>
+      <p:sp>
+        <p:nvSpPr>
+          <p:cNvPr id="2" name="Title 1"/>
+          <p:cNvSpPr>
+            <a:spLocks noGrp="1"/>
+          </p:cNvSpPr>
+          <p:nvPr>
+            <p:ph type="title"/>
+          </p:nvPr>
+        </p:nvSpPr>
+        <p:spPr/>
+        <p:txBody>
+          <a:bodyPr/>
+          <a:lstStyle/>
+          <a:p>
+            <a:r>
+              <a:rPr lang="pt-PT" noProof="0" dirty="0" smtClean="0"/>
+              <a:t>Referências</a:t>
+            </a:r>
+            <a:endParaRPr lang="pt-PT" noProof="0" dirty="0"/>
+          </a:p>
+        </p:txBody>
+      </p:sp>
+      <p:sp>
+        <p:nvSpPr>
+          <p:cNvPr id="3" name="Content Placeholder 2"/>
+          <p:cNvSpPr>
+            <a:spLocks noGrp="1"/>
+          </p:cNvSpPr>
+          <p:nvPr>
+            <p:ph idx="1"/>
+          </p:nvPr>
+        </p:nvSpPr>
+        <p:spPr/>
+        <p:txBody>
+          <a:bodyPr/>
+          <a:lstStyle/>
+          <a:p>
+            <a:r>
+              <a:rPr lang="pt-PT" noProof="0" dirty="0" smtClean="0"/>
+              <a:t>Validadores</a:t>
+            </a:r>
+          </a:p>
+          <a:p>
+            <a:pPr lvl="1"/>
+            <a:r>
+              <a:rPr lang="pt-PT" dirty="0"/>
+              <a:t>http://www.acessibilidade.gov.pt/accessmonitor/</a:t>
+            </a:r>
+            <a:endParaRPr lang="pt-PT" noProof="0" dirty="0" smtClean="0"/>
+          </a:p>
+          <a:p>
+            <a:r>
+              <a:rPr lang="pt-PT" noProof="0" dirty="0" smtClean="0"/>
+              <a:t>Sites de referência:</a:t>
+            </a:r>
+          </a:p>
+          <a:p>
+            <a:pPr lvl="1"/>
+            <a:r>
+              <a:rPr lang="en-US" noProof="0" dirty="0" smtClean="0"/>
+              <a:t>UMIC</a:t>
+            </a:r>
+          </a:p>
+          <a:p>
+            <a:pPr lvl="1"/>
+            <a:r>
+              <a:rPr lang="en-US" dirty="0" smtClean="0"/>
+              <a:t>CGD</a:t>
+            </a:r>
+            <a:endParaRPr lang="pt-PT" dirty="0"/>
+          </a:p>
+          <a:p>
+            <a:pPr lvl="1"/>
+            <a:endParaRPr lang="en-US" dirty="0" smtClean="0"/>
+          </a:p>
+        </p:txBody>
+      </p:sp>
+    </p:spTree>
+    <p:extLst>
+      <p:ext uri="{BB962C8B-B14F-4D97-AF65-F5344CB8AC3E}">
+        <p14:creationId xmlns:p14="http://schemas.microsoft.com/office/powerpoint/2010/main" val="1080507439"/>
+      </p:ext>
+    </p:extLst>
+  </p:cSld>
+  <p:clrMapOvr>
+    <a:masterClrMapping/>
+  </p:clrMapOvr>
+</p:sld>
+</file>
+
 <file path=ppt/slides/slide2.xml><?xml version="1.0" encoding="utf-8"?>
 <p:sld xmlns:a="http://schemas.openxmlformats.org/drawingml/2006/main" xmlns:r="http://schemas.openxmlformats.org/officeDocument/2006/relationships" xmlns:p="http://schemas.openxmlformats.org/presentationml/2006/main">
   <p:cSld>
@@ -4080,6 +4517,52 @@
       </p:grpSpPr>
       <p:sp>
         <p:nvSpPr>
+          <p:cNvPr id="3" name="Oval 2"/>
+          <p:cNvSpPr/>
+          <p:nvPr/>
+        </p:nvSpPr>
+        <p:spPr>
+          <a:xfrm>
+            <a:off x="10271340" y="2956142"/>
+            <a:ext cx="926926" cy="1139869"/>
+          </a:xfrm>
+          <a:prstGeom prst="ellipse">
+            <a:avLst/>
+          </a:prstGeom>
+          <a:solidFill>
+            <a:schemeClr val="accent4">
+              <a:alpha val="50000"/>
+            </a:schemeClr>
+          </a:solidFill>
+          <a:ln>
+            <a:noFill/>
+          </a:ln>
+        </p:spPr>
+        <p:style>
+          <a:lnRef idx="0">
+            <a:scrgbClr r="0" g="0" b="0"/>
+          </a:lnRef>
+          <a:fillRef idx="0">
+            <a:scrgbClr r="0" g="0" b="0"/>
+          </a:fillRef>
+          <a:effectRef idx="0">
+            <a:scrgbClr r="0" g="0" b="0"/>
+          </a:effectRef>
+          <a:fontRef idx="minor">
+            <a:schemeClr val="lt1"/>
+          </a:fontRef>
+        </p:style>
+        <p:txBody>
+          <a:bodyPr rtlCol="0" anchor="ctr"/>
+          <a:lstStyle/>
+          <a:p>
+            <a:pPr algn="ctr"/>
+            <a:endParaRPr lang="pt-PT"/>
+          </a:p>
+        </p:txBody>
+      </p:sp>
+      <p:sp>
+        <p:nvSpPr>
           <p:cNvPr id="2" name="Title 1"/>
           <p:cNvSpPr>
             <a:spLocks noGrp="1"/>
@@ -4235,7 +4718,7 @@
             </a:r>
             <a:r>
               <a:rPr lang="en-US" dirty="0" smtClean="0"/>
-              <a:t>172	2 %	1 %</a:t>
+              <a:t>172		1 %</a:t>
             </a:r>
             <a:endParaRPr lang="en-US" dirty="0"/>
           </a:p>
@@ -4253,7 +4736,7 @@
             </a:r>
             <a:r>
               <a:rPr lang="en-US" dirty="0" smtClean="0"/>
-              <a:t>569	3 %	2 %</a:t>
+              <a:t>569		2 %</a:t>
             </a:r>
             <a:endParaRPr lang="en-US" dirty="0"/>
           </a:p>
@@ -4279,15 +4762,7 @@
             </a:r>
             <a:r>
               <a:rPr lang="en-US" dirty="0"/>
-              <a:t> </a:t>
-            </a:r>
-            <a:r>
-              <a:rPr lang="en-US" dirty="0" smtClean="0"/>
-              <a:t>3 %</a:t>
-            </a:r>
-            <a:r>
-              <a:rPr lang="en-US" dirty="0"/>
-              <a:t>	</a:t>
+              <a:t> 	</a:t>
             </a:r>
             <a:r>
               <a:rPr lang="en-US" dirty="0" smtClean="0"/>
@@ -4309,7 +4784,7 @@
             </a:r>
             <a:r>
               <a:rPr lang="en-US" dirty="0" smtClean="0"/>
-              <a:t>994	1 %	1 %</a:t>
+              <a:t>994		1 %</a:t>
             </a:r>
             <a:endParaRPr lang="en-US" dirty="0"/>
           </a:p>
@@ -4331,7 +4806,7 @@
             </a:r>
             <a:r>
               <a:rPr lang="en-US" dirty="0" smtClean="0"/>
-              <a:t>009	0 %	0 %</a:t>
+              <a:t>009		0 %</a:t>
             </a:r>
             <a:endParaRPr lang="en-US" dirty="0"/>
           </a:p>
@@ -4369,15 +4844,7 @@
             </a:r>
             <a:r>
               <a:rPr lang="en-US" u="sng" dirty="0"/>
-              <a:t> </a:t>
-            </a:r>
-            <a:r>
-              <a:rPr lang="en-US" u="sng" dirty="0" smtClean="0"/>
-              <a:t>3 %</a:t>
-            </a:r>
-            <a:r>
-              <a:rPr lang="en-US" u="sng" dirty="0"/>
-              <a:t>	</a:t>
+              <a:t> 	</a:t>
             </a:r>
             <a:r>
               <a:rPr lang="en-US" u="sng" dirty="0" smtClean="0"/>
@@ -4403,7 +4870,7 @@
             </a:r>
             <a:r>
               <a:rPr lang="pt-PT" dirty="0" smtClean="0"/>
-              <a:t>13 %	7 % </a:t>
+              <a:t>	7 % </a:t>
             </a:r>
           </a:p>
           <a:p>
@@ -4508,6 +4975,13 @@
   <p:clrMapOvr>
     <a:masterClrMapping/>
   </p:clrMapOvr>
+  <p:timing>
+    <p:tnLst>
+      <p:par>
+        <p:cTn id="1" dur="indefinite" restart="never" nodeType="tmRoot"/>
+      </p:par>
+    </p:tnLst>
+  </p:timing>
 </p:sld>
 </file>
 
@@ -4601,6 +5075,13 @@
   <p:clrMapOvr>
     <a:masterClrMapping/>
   </p:clrMapOvr>
+  <p:timing>
+    <p:tnLst>
+      <p:par>
+        <p:cTn id="1" dur="indefinite" restart="never" nodeType="tmRoot"/>
+      </p:par>
+    </p:tnLst>
+  </p:timing>
 </p:sld>
 </file>
 
@@ -4639,11 +5120,7 @@
             <a:pPr lvl="0"/>
             <a:r>
               <a:rPr lang="pt-PT" noProof="0" dirty="0" smtClean="0"/>
-              <a:t>O que é</a:t>
-            </a:r>
-            <a:r>
-              <a:rPr lang="pt-PT" noProof="0" dirty="0" smtClean="0"/>
-              <a:t>?</a:t>
+              <a:t>O que é?</a:t>
             </a:r>
             <a:endParaRPr lang="pt-PT" noProof="0" dirty="0"/>
           </a:p>
@@ -4709,7 +5186,6 @@
               <a:rPr lang="pt-PT" noProof="0" dirty="0" smtClean="0"/>
               <a:t>Legislação portuguesa</a:t>
             </a:r>
-            <a:endParaRPr lang="pt-PT" noProof="0" dirty="0" smtClean="0"/>
           </a:p>
         </p:txBody>
       </p:sp>
@@ -4765,12 +5241,19 @@
           <a:bodyPr/>
           <a:lstStyle/>
           <a:p>
-            <a:pPr lvl="0"/>
-            <a:r>
-              <a:rPr lang="pt-PT" noProof="0" dirty="0" smtClean="0"/>
-              <a:t>Aplicabilidade (5min)</a:t>
-            </a:r>
-            <a:endParaRPr lang="pt-PT" noProof="0" dirty="0"/>
+            <a:r>
+              <a:rPr lang="en-US" dirty="0" err="1" smtClean="0"/>
+              <a:t>Acessibilidade</a:t>
+            </a:r>
+            <a:r>
+              <a:rPr lang="en-US" dirty="0" smtClean="0"/>
+              <a:t> vs. </a:t>
+            </a:r>
+            <a:r>
+              <a:rPr lang="en-US" dirty="0" err="1" smtClean="0"/>
+              <a:t>Usabilidade</a:t>
+            </a:r>
+            <a:endParaRPr lang="pt-PT" dirty="0"/>
           </a:p>
         </p:txBody>
       </p:sp>
@@ -4791,96 +5274,139 @@
           </a:bodyPr>
           <a:lstStyle/>
           <a:p>
-            <a:r>
-              <a:rPr lang="en-US" noProof="0" dirty="0" err="1" smtClean="0"/>
-              <a:t>Paralelo</a:t>
-            </a:r>
-            <a:r>
-              <a:rPr lang="en-US" noProof="0" dirty="0" smtClean="0"/>
-              <a:t> API -&gt; HAL /</a:t>
-            </a:r>
-            <a:r>
-              <a:rPr lang="en-US" baseline="0" noProof="0" dirty="0" smtClean="0"/>
-              <a:t> UA -&gt; WCAG</a:t>
-            </a:r>
-            <a:endParaRPr lang="pt-PT" noProof="0" dirty="0" smtClean="0"/>
-          </a:p>
-          <a:p>
-            <a:r>
-              <a:rPr lang="pt-PT" noProof="0" dirty="0" smtClean="0"/>
-              <a:t>Vantagens </a:t>
-            </a:r>
-            <a:r>
-              <a:rPr lang="pt-PT" noProof="0" dirty="0" smtClean="0"/>
-              <a:t>para o </a:t>
-            </a:r>
-            <a:r>
-              <a:rPr lang="pt-PT" noProof="0" dirty="0" smtClean="0"/>
-              <a:t>site:</a:t>
-            </a:r>
+            <a:pPr marL="0" indent="0">
+              <a:buNone/>
+            </a:pPr>
+            <a:r>
+              <a:rPr lang="en-US" dirty="0" smtClean="0"/>
+              <a:t>“</a:t>
+            </a:r>
+            <a:r>
+              <a:rPr lang="en-US" i="1" dirty="0" smtClean="0"/>
+              <a:t>Accessibility </a:t>
+            </a:r>
+            <a:r>
+              <a:rPr lang="en-US" i="1" dirty="0"/>
+              <a:t>is about ensuring an equivalent user experience for people with disabilities, including people with age-related </a:t>
+            </a:r>
+            <a:r>
+              <a:rPr lang="en-US" i="1" dirty="0" smtClean="0"/>
+              <a:t>impairments.</a:t>
+            </a:r>
+          </a:p>
+          <a:p>
+            <a:pPr marL="0" indent="0">
+              <a:buNone/>
+            </a:pPr>
+            <a:r>
+              <a:rPr lang="en-US" i="1" dirty="0" smtClean="0"/>
+              <a:t>…Thus </a:t>
+            </a:r>
+            <a:r>
+              <a:rPr lang="en-US" i="1" dirty="0"/>
+              <a:t>accessibility includes both</a:t>
+            </a:r>
+            <a:r>
+              <a:rPr lang="en-US" i="1" dirty="0" smtClean="0"/>
+              <a:t>:</a:t>
+            </a:r>
+            <a:endParaRPr lang="en-US" i="1" dirty="0"/>
           </a:p>
           <a:p>
             <a:pPr lvl="1"/>
             <a:r>
-              <a:rPr lang="pt-PT" noProof="0" dirty="0" err="1" smtClean="0"/>
-              <a:t>Crawlers</a:t>
-            </a:r>
-            <a:r>
-              <a:rPr lang="pt-PT" noProof="0" dirty="0" smtClean="0"/>
-              <a:t> portam-se como </a:t>
-            </a:r>
-            <a:r>
-              <a:rPr lang="pt-PT" noProof="0" dirty="0" err="1" smtClean="0"/>
-              <a:t>UAs</a:t>
-            </a:r>
-            <a:endParaRPr lang="pt-PT" noProof="0" dirty="0" smtClean="0"/>
-          </a:p>
-          <a:p>
-            <a:r>
-              <a:rPr lang="pt-PT" noProof="0" dirty="0" smtClean="0"/>
-              <a:t>Casos </a:t>
-            </a:r>
-            <a:r>
-              <a:rPr lang="pt-PT" noProof="0" dirty="0" smtClean="0"/>
-              <a:t>práticos mau e bom - exploração com </a:t>
-            </a:r>
-            <a:r>
-              <a:rPr lang="pt-PT" noProof="0" dirty="0" err="1" smtClean="0"/>
-              <a:t>iPad</a:t>
-            </a:r>
-            <a:endParaRPr lang="pt-PT" noProof="0" dirty="0" smtClean="0"/>
-          </a:p>
-          <a:p>
-            <a:r>
-              <a:rPr lang="pt-PT" noProof="0" dirty="0" smtClean="0"/>
-              <a:t>Exemplo </a:t>
-            </a:r>
-            <a:r>
-              <a:rPr lang="pt-PT" noProof="0" dirty="0" smtClean="0"/>
-              <a:t>de uma página nível </a:t>
-            </a:r>
-            <a:r>
-              <a:rPr lang="pt-PT" noProof="0" dirty="0" smtClean="0"/>
-              <a:t>de conformidade AAA </a:t>
-            </a:r>
-            <a:r>
-              <a:rPr lang="pt-PT" noProof="0" dirty="0" smtClean="0"/>
-              <a:t>(WCAG 2.0)</a:t>
-            </a:r>
-          </a:p>
-          <a:p>
-            <a:r>
-              <a:rPr lang="pt-PT" noProof="0" dirty="0" smtClean="0"/>
-              <a:t>Exemplo de marcação HTML</a:t>
-            </a:r>
-            <a:endParaRPr lang="pt-PT" noProof="0" dirty="0" smtClean="0"/>
+              <a:rPr lang="en-US" i="1" dirty="0"/>
+              <a:t>Requirements that are more specific to people with </a:t>
+            </a:r>
+            <a:r>
+              <a:rPr lang="en-US" i="1" dirty="0" smtClean="0"/>
+              <a:t>disabilities;…</a:t>
+            </a:r>
+            <a:endParaRPr lang="en-US" i="1" dirty="0"/>
+          </a:p>
+          <a:p>
+            <a:pPr lvl="1"/>
+            <a:r>
+              <a:rPr lang="en-US" i="1" dirty="0"/>
+              <a:t>Requirements that are also general usability </a:t>
+            </a:r>
+            <a:r>
+              <a:rPr lang="en-US" i="1" dirty="0" smtClean="0"/>
+              <a:t>principles…</a:t>
+            </a:r>
+            <a:endParaRPr lang="en-US" i="1" dirty="0"/>
+          </a:p>
+          <a:p>
+            <a:pPr marL="0" indent="0">
+              <a:buNone/>
+            </a:pPr>
+            <a:r>
+              <a:rPr lang="en-US" i="1" dirty="0"/>
+              <a:t>Websites, web tools, and other products that meet accessibility goals are more usable for everyone</a:t>
+            </a:r>
+            <a:r>
+              <a:rPr lang="en-US" i="1" dirty="0" smtClean="0"/>
+              <a:t>.</a:t>
+            </a:r>
+            <a:r>
+              <a:rPr lang="en-US" dirty="0" smtClean="0"/>
+              <a:t>”</a:t>
+            </a:r>
+          </a:p>
+          <a:p>
+            <a:pPr marL="0" indent="0" algn="r">
+              <a:buNone/>
+            </a:pPr>
+            <a:r>
+              <a:rPr lang="en-US" sz="1200" dirty="0"/>
+              <a:t>W3C - Web </a:t>
+            </a:r>
+            <a:r>
+              <a:rPr lang="en-US" sz="1200" dirty="0"/>
+              <a:t>Accessibility and Usability Working </a:t>
+            </a:r>
+            <a:r>
+              <a:rPr lang="en-US" sz="1200" dirty="0" smtClean="0"/>
+              <a:t>Together</a:t>
+            </a:r>
+            <a:r>
+              <a:rPr lang="en-US" sz="1200" dirty="0"/>
+              <a:t>, &lt;</a:t>
+            </a:r>
+            <a:r>
+              <a:rPr lang="en-US" sz="1200" dirty="0">
+                <a:hlinkClick r:id="rId3"/>
+              </a:rPr>
+              <a:t>https://www.w3.org/WAI/intro/usable</a:t>
+            </a:r>
+            <a:r>
+              <a:rPr lang="en-US" sz="1200" dirty="0"/>
+              <a:t>&gt;, </a:t>
+            </a:r>
+            <a:r>
+              <a:rPr lang="en-US" sz="1200" dirty="0" err="1" smtClean="0"/>
+              <a:t>acedido</a:t>
+            </a:r>
+            <a:r>
+              <a:rPr lang="en-US" sz="1200" dirty="0" smtClean="0"/>
+              <a:t> </a:t>
+            </a:r>
+            <a:r>
+              <a:rPr lang="en-US" sz="1200" dirty="0" err="1" smtClean="0"/>
+              <a:t>em</a:t>
+            </a:r>
+            <a:r>
+              <a:rPr lang="en-US" sz="1200" dirty="0" smtClean="0"/>
+              <a:t> 2016-04-13</a:t>
+            </a:r>
+            <a:endParaRPr lang="en-US" sz="1200" dirty="0"/>
           </a:p>
         </p:txBody>
       </p:sp>
     </p:spTree>
     <p:extLst>
       <p:ext uri="{BB962C8B-B14F-4D97-AF65-F5344CB8AC3E}">
-        <p14:creationId xmlns:p14="http://schemas.microsoft.com/office/powerpoint/2010/main" val="1042487288"/>
+        <p14:creationId xmlns:p14="http://schemas.microsoft.com/office/powerpoint/2010/main" val="3523767973"/>
       </p:ext>
     </p:extLst>
   </p:cSld>
@@ -4925,7 +5451,7 @@
             <a:pPr lvl="0"/>
             <a:r>
               <a:rPr lang="pt-PT" noProof="0" dirty="0" smtClean="0"/>
-              <a:t>Contribuições em Portugal (5min)</a:t>
+              <a:t>Aplicabilidade (5min)</a:t>
             </a:r>
             <a:endParaRPr lang="pt-PT" noProof="0" dirty="0"/>
           </a:p>
@@ -4943,49 +5469,76 @@
         </p:nvSpPr>
         <p:spPr/>
         <p:txBody>
-          <a:bodyPr/>
-          <a:lstStyle/>
+          <a:bodyPr>
+            <a:normAutofit/>
+          </a:bodyPr>
+          <a:lstStyle/>
+          <a:p>
+            <a:r>
+              <a:rPr lang="en-US" noProof="0" dirty="0" err="1" smtClean="0"/>
+              <a:t>Paralelo</a:t>
+            </a:r>
+            <a:r>
+              <a:rPr lang="en-US" noProof="0" dirty="0" smtClean="0"/>
+              <a:t> API -&gt; HAL /</a:t>
+            </a:r>
+            <a:r>
+              <a:rPr lang="en-US" baseline="0" noProof="0" dirty="0" smtClean="0"/>
+              <a:t> UA -&gt; WCAG</a:t>
+            </a:r>
+            <a:endParaRPr lang="pt-PT" noProof="0" dirty="0" smtClean="0"/>
+          </a:p>
           <a:p>
             <a:r>
               <a:rPr lang="pt-PT" noProof="0" dirty="0" smtClean="0"/>
-              <a:t>FCT </a:t>
+              <a:t>Vantagens para o site:</a:t>
+            </a:r>
+          </a:p>
+          <a:p>
+            <a:pPr lvl="1"/>
+            <a:r>
+              <a:rPr lang="pt-PT" noProof="0" dirty="0" err="1" smtClean="0"/>
+              <a:t>Crawlers</a:t>
             </a:r>
             <a:r>
               <a:rPr lang="pt-PT" noProof="0" dirty="0" smtClean="0"/>
-              <a:t>- Unidade Acesso</a:t>
-            </a:r>
+              <a:t> portam-se como </a:t>
+            </a:r>
+            <a:r>
+              <a:rPr lang="pt-PT" noProof="0" dirty="0" err="1" smtClean="0"/>
+              <a:t>UAs</a:t>
+            </a:r>
+            <a:endParaRPr lang="pt-PT" noProof="0" dirty="0" smtClean="0"/>
           </a:p>
           <a:p>
             <a:r>
               <a:rPr lang="pt-PT" noProof="0" dirty="0" smtClean="0"/>
-              <a:t>UP </a:t>
-            </a:r>
+              <a:t>Casos práticos mau e bom - exploração com </a:t>
+            </a:r>
+            <a:r>
+              <a:rPr lang="pt-PT" noProof="0" dirty="0" err="1" smtClean="0"/>
+              <a:t>iPad</a:t>
+            </a:r>
+            <a:endParaRPr lang="pt-PT" noProof="0" dirty="0" smtClean="0"/>
+          </a:p>
+          <a:p>
             <a:r>
               <a:rPr lang="pt-PT" noProof="0" dirty="0" smtClean="0"/>
-              <a:t>- </a:t>
-            </a:r>
-            <a:r>
-              <a:rPr lang="pt-PT" noProof="0" dirty="0" err="1" smtClean="0"/>
-              <a:t>Places</a:t>
-            </a:r>
+              <a:t>Exemplo de uma página nível de conformidade AAA (WCAG 2.0)</a:t>
+            </a:r>
+          </a:p>
+          <a:p>
             <a:r>
               <a:rPr lang="pt-PT" noProof="0" dirty="0" smtClean="0"/>
-              <a:t>, Plataforma de </a:t>
-            </a:r>
-            <a:r>
-              <a:rPr lang="pt-PT" noProof="0" dirty="0" smtClean="0"/>
-              <a:t>Acessibilidade</a:t>
-            </a:r>
-          </a:p>
-          <a:p>
-            <a:endParaRPr lang="pt-PT" noProof="0" dirty="0" smtClean="0"/>
+              <a:t>Exemplo de marcação HTML</a:t>
+            </a:r>
           </a:p>
         </p:txBody>
       </p:sp>
     </p:spTree>
     <p:extLst>
       <p:ext uri="{BB962C8B-B14F-4D97-AF65-F5344CB8AC3E}">
-        <p14:creationId xmlns:p14="http://schemas.microsoft.com/office/powerpoint/2010/main" val="1789695018"/>
+        <p14:creationId xmlns:p14="http://schemas.microsoft.com/office/powerpoint/2010/main" val="1042487288"/>
       </p:ext>
     </p:extLst>
   </p:cSld>
@@ -5027,9 +5580,10 @@
           <a:bodyPr/>
           <a:lstStyle/>
           <a:p>
+            <a:pPr lvl="0"/>
             <a:r>
               <a:rPr lang="pt-PT" noProof="0" dirty="0" smtClean="0"/>
-              <a:t>Referências</a:t>
+              <a:t>Contribuições em Portugal (5min)</a:t>
             </a:r>
             <a:endParaRPr lang="pt-PT" noProof="0" dirty="0"/>
           </a:p>
@@ -5052,48 +5606,32 @@
           <a:p>
             <a:r>
               <a:rPr lang="pt-PT" noProof="0" dirty="0" smtClean="0"/>
-              <a:t>Validadores</a:t>
-            </a:r>
-          </a:p>
-          <a:p>
-            <a:pPr lvl="1"/>
-            <a:r>
-              <a:rPr lang="pt-PT" dirty="0"/>
-              <a:t>http://www.acessibilidade.gov.pt/accessmonitor/</a:t>
-            </a:r>
+              <a:t>FCT - Unidade Acesso</a:t>
+            </a:r>
+          </a:p>
+          <a:p>
+            <a:r>
+              <a:rPr lang="pt-PT" noProof="0" dirty="0" smtClean="0"/>
+              <a:t>UP - </a:t>
+            </a:r>
+            <a:r>
+              <a:rPr lang="pt-PT" noProof="0" dirty="0" err="1" smtClean="0"/>
+              <a:t>Places</a:t>
+            </a:r>
+            <a:r>
+              <a:rPr lang="pt-PT" noProof="0" dirty="0" smtClean="0"/>
+              <a:t>, Plataforma de Acessibilidade</a:t>
+            </a:r>
+          </a:p>
+          <a:p>
             <a:endParaRPr lang="pt-PT" noProof="0" dirty="0" smtClean="0"/>
-          </a:p>
-          <a:p>
-            <a:r>
-              <a:rPr lang="pt-PT" noProof="0" dirty="0" smtClean="0"/>
-              <a:t>Sites de referência:</a:t>
-            </a:r>
-          </a:p>
-          <a:p>
-            <a:pPr lvl="1"/>
-            <a:r>
-              <a:rPr lang="en-US" noProof="0" dirty="0" smtClean="0"/>
-              <a:t>UMIC</a:t>
-            </a:r>
-          </a:p>
-          <a:p>
-            <a:pPr lvl="1"/>
-            <a:r>
-              <a:rPr lang="en-US" dirty="0" smtClean="0"/>
-              <a:t>CGD</a:t>
-            </a:r>
-            <a:endParaRPr lang="pt-PT" dirty="0"/>
-          </a:p>
-          <a:p>
-            <a:pPr lvl="1"/>
-            <a:endParaRPr lang="en-US" dirty="0" smtClean="0"/>
           </a:p>
         </p:txBody>
       </p:sp>
     </p:spTree>
     <p:extLst>
       <p:ext uri="{BB962C8B-B14F-4D97-AF65-F5344CB8AC3E}">
-        <p14:creationId xmlns:p14="http://schemas.microsoft.com/office/powerpoint/2010/main" val="1080507439"/>
+        <p14:creationId xmlns:p14="http://schemas.microsoft.com/office/powerpoint/2010/main" val="1789695018"/>
       </p:ext>
     </p:extLst>
   </p:cSld>

</xml_diff>

<commit_message>
Apresentação individual - versão entregue no Thoth
</commit_message>
<xml_diff>
--- a/docs/Accessibility a22908.pptx
+++ b/docs/Accessibility a22908.pptx
@@ -5,19 +5,20 @@
     <p:sldMasterId id="2147483648" r:id="rId1"/>
   </p:sldMasterIdLst>
   <p:notesMasterIdLst>
-    <p:notesMasterId r:id="rId12"/>
+    <p:notesMasterId r:id="rId13"/>
   </p:notesMasterIdLst>
   <p:sldIdLst>
-    <p:sldId id="256" r:id="rId2"/>
-    <p:sldId id="263" r:id="rId3"/>
-    <p:sldId id="257" r:id="rId4"/>
+    <p:sldId id="267" r:id="rId2"/>
+    <p:sldId id="256" r:id="rId3"/>
+    <p:sldId id="266" r:id="rId4"/>
     <p:sldId id="264" r:id="rId5"/>
-    <p:sldId id="259" r:id="rId6"/>
-    <p:sldId id="258" r:id="rId7"/>
-    <p:sldId id="265" r:id="rId8"/>
+    <p:sldId id="258" r:id="rId6"/>
+    <p:sldId id="265" r:id="rId7"/>
+    <p:sldId id="268" r:id="rId8"/>
     <p:sldId id="260" r:id="rId9"/>
-    <p:sldId id="261" r:id="rId10"/>
-    <p:sldId id="262" r:id="rId11"/>
+    <p:sldId id="269" r:id="rId10"/>
+    <p:sldId id="261" r:id="rId11"/>
+    <p:sldId id="262" r:id="rId12"/>
   </p:sldIdLst>
   <p:sldSz cx="12192000" cy="6858000"/>
   <p:notesSz cx="6858000" cy="9144000"/>
@@ -206,7 +207,7 @@
           <a:p>
             <a:fld id="{3DA6DE8F-1BE5-412F-968A-A00033B87462}" type="datetimeFigureOut">
               <a:rPr lang="pt-PT" smtClean="0"/>
-              <a:t>2016/04/13</a:t>
+              <a:t>2016/05/02</a:t>
             </a:fld>
             <a:endParaRPr lang="pt-PT"/>
           </a:p>
@@ -543,7 +544,7 @@
           <a:p>
             <a:fld id="{94A2E280-44B8-42CB-8147-6E1BA11A84E2}" type="slidenum">
               <a:rPr lang="pt-PT" smtClean="0"/>
-              <a:t>6</a:t>
+              <a:t>5</a:t>
             </a:fld>
             <a:endParaRPr lang="pt-PT"/>
           </a:p>
@@ -871,7 +872,7 @@
           <a:p>
             <a:fld id="{94A2E280-44B8-42CB-8147-6E1BA11A84E2}" type="slidenum">
               <a:rPr lang="pt-PT" smtClean="0"/>
-              <a:t>7</a:t>
+              <a:t>6</a:t>
             </a:fld>
             <a:endParaRPr lang="pt-PT"/>
           </a:p>
@@ -1021,7 +1022,7 @@
           <a:p>
             <a:fld id="{2F5B6AAC-F37E-44D6-AB03-0A53764B43E9}" type="datetimeFigureOut">
               <a:rPr lang="pt-PT" smtClean="0"/>
-              <a:t>2016/04/13</a:t>
+              <a:t>2016/05/02</a:t>
             </a:fld>
             <a:endParaRPr lang="pt-PT"/>
           </a:p>
@@ -1191,7 +1192,7 @@
           <a:p>
             <a:fld id="{2F5B6AAC-F37E-44D6-AB03-0A53764B43E9}" type="datetimeFigureOut">
               <a:rPr lang="pt-PT" smtClean="0"/>
-              <a:t>2016/04/13</a:t>
+              <a:t>2016/05/02</a:t>
             </a:fld>
             <a:endParaRPr lang="pt-PT"/>
           </a:p>
@@ -1371,7 +1372,7 @@
           <a:p>
             <a:fld id="{2F5B6AAC-F37E-44D6-AB03-0A53764B43E9}" type="datetimeFigureOut">
               <a:rPr lang="pt-PT" smtClean="0"/>
-              <a:t>2016/04/13</a:t>
+              <a:t>2016/05/02</a:t>
             </a:fld>
             <a:endParaRPr lang="pt-PT"/>
           </a:p>
@@ -1541,7 +1542,7 @@
           <a:p>
             <a:fld id="{2F5B6AAC-F37E-44D6-AB03-0A53764B43E9}" type="datetimeFigureOut">
               <a:rPr lang="pt-PT" smtClean="0"/>
-              <a:t>2016/04/13</a:t>
+              <a:t>2016/05/02</a:t>
             </a:fld>
             <a:endParaRPr lang="pt-PT"/>
           </a:p>
@@ -1787,7 +1788,7 @@
           <a:p>
             <a:fld id="{2F5B6AAC-F37E-44D6-AB03-0A53764B43E9}" type="datetimeFigureOut">
               <a:rPr lang="pt-PT" smtClean="0"/>
-              <a:t>2016/04/13</a:t>
+              <a:t>2016/05/02</a:t>
             </a:fld>
             <a:endParaRPr lang="pt-PT"/>
           </a:p>
@@ -2019,7 +2020,7 @@
           <a:p>
             <a:fld id="{2F5B6AAC-F37E-44D6-AB03-0A53764B43E9}" type="datetimeFigureOut">
               <a:rPr lang="pt-PT" smtClean="0"/>
-              <a:t>2016/04/13</a:t>
+              <a:t>2016/05/02</a:t>
             </a:fld>
             <a:endParaRPr lang="pt-PT"/>
           </a:p>
@@ -2386,7 +2387,7 @@
           <a:p>
             <a:fld id="{2F5B6AAC-F37E-44D6-AB03-0A53764B43E9}" type="datetimeFigureOut">
               <a:rPr lang="pt-PT" smtClean="0"/>
-              <a:t>2016/04/13</a:t>
+              <a:t>2016/05/02</a:t>
             </a:fld>
             <a:endParaRPr lang="pt-PT"/>
           </a:p>
@@ -2504,7 +2505,7 @@
           <a:p>
             <a:fld id="{2F5B6AAC-F37E-44D6-AB03-0A53764B43E9}" type="datetimeFigureOut">
               <a:rPr lang="pt-PT" smtClean="0"/>
-              <a:t>2016/04/13</a:t>
+              <a:t>2016/05/02</a:t>
             </a:fld>
             <a:endParaRPr lang="pt-PT"/>
           </a:p>
@@ -2599,7 +2600,7 @@
           <a:p>
             <a:fld id="{2F5B6AAC-F37E-44D6-AB03-0A53764B43E9}" type="datetimeFigureOut">
               <a:rPr lang="pt-PT" smtClean="0"/>
-              <a:t>2016/04/13</a:t>
+              <a:t>2016/05/02</a:t>
             </a:fld>
             <a:endParaRPr lang="pt-PT"/>
           </a:p>
@@ -2876,7 +2877,7 @@
           <a:p>
             <a:fld id="{2F5B6AAC-F37E-44D6-AB03-0A53764B43E9}" type="datetimeFigureOut">
               <a:rPr lang="pt-PT" smtClean="0"/>
-              <a:t>2016/04/13</a:t>
+              <a:t>2016/05/02</a:t>
             </a:fld>
             <a:endParaRPr lang="pt-PT"/>
           </a:p>
@@ -3129,7 +3130,7 @@
           <a:p>
             <a:fld id="{2F5B6AAC-F37E-44D6-AB03-0A53764B43E9}" type="datetimeFigureOut">
               <a:rPr lang="pt-PT" smtClean="0"/>
-              <a:t>2016/04/13</a:t>
+              <a:t>2016/05/02</a:t>
             </a:fld>
             <a:endParaRPr lang="pt-PT"/>
           </a:p>
@@ -3342,7 +3343,7 @@
           <a:p>
             <a:fld id="{2F5B6AAC-F37E-44D6-AB03-0A53764B43E9}" type="datetimeFigureOut">
               <a:rPr lang="pt-PT" smtClean="0"/>
-              <a:t>2016/04/13</a:t>
+              <a:t>2016/05/02</a:t>
             </a:fld>
             <a:endParaRPr lang="pt-PT"/>
           </a:p>
@@ -3749,7 +3750,7 @@
       </p:grpSpPr>
       <p:sp>
         <p:nvSpPr>
-          <p:cNvPr id="2" name="Title 1"/>
+          <p:cNvPr id="4" name="Title 3"/>
           <p:cNvSpPr>
             <a:spLocks noGrp="1"/>
           </p:cNvSpPr>
@@ -3757,27 +3758,22 @@
             <p:ph type="ctrTitle"/>
           </p:nvPr>
         </p:nvSpPr>
-        <p:spPr>
-          <a:xfrm>
-            <a:off x="1524000" y="1122363"/>
-            <a:ext cx="9144000" cy="1011237"/>
-          </a:xfrm>
-        </p:spPr>
-        <p:txBody>
-          <a:bodyPr/>
-          <a:lstStyle/>
-          <a:p>
-            <a:r>
-              <a:rPr lang="pt-PT" noProof="0" dirty="0" smtClean="0"/>
+        <p:spPr/>
+        <p:txBody>
+          <a:bodyPr/>
+          <a:lstStyle/>
+          <a:p>
+            <a:r>
+              <a:rPr lang="en-US" dirty="0" err="1" smtClean="0"/>
               <a:t>Acessibilidade</a:t>
             </a:r>
-            <a:endParaRPr lang="pt-PT" noProof="0" dirty="0"/>
-          </a:p>
-        </p:txBody>
-      </p:sp>
-      <p:sp>
-        <p:nvSpPr>
-          <p:cNvPr id="3" name="Subtitle 2"/>
+            <a:endParaRPr lang="pt-PT" dirty="0"/>
+          </a:p>
+        </p:txBody>
+      </p:sp>
+      <p:sp>
+        <p:nvSpPr>
+          <p:cNvPr id="5" name="Subtitle 4"/>
           <p:cNvSpPr>
             <a:spLocks noGrp="1"/>
           </p:cNvSpPr>
@@ -3785,346 +3781,45 @@
             <p:ph type="subTitle" idx="1"/>
           </p:nvPr>
         </p:nvSpPr>
-        <p:spPr>
-          <a:xfrm>
-            <a:off x="1524000" y="2401824"/>
-            <a:ext cx="9144000" cy="3608832"/>
-          </a:xfrm>
-        </p:spPr>
-        <p:txBody>
-          <a:bodyPr>
-            <a:normAutofit/>
-          </a:bodyPr>
-          <a:lstStyle/>
-          <a:p>
-            <a:pPr algn="l"/>
-            <a:r>
-              <a:rPr lang="pt-PT" noProof="0" dirty="0" smtClean="0">
-                <a:solidFill>
-                  <a:srgbClr val="000000"/>
-                </a:solidFill>
-                <a:latin typeface="Arial" panose="020B0604020202020204" pitchFamily="34" charset="0"/>
-              </a:rPr>
-              <a:t>…O </a:t>
-            </a:r>
-            <a:r>
-              <a:rPr lang="pt-PT" noProof="0" dirty="0">
-                <a:solidFill>
-                  <a:srgbClr val="000000"/>
-                </a:solidFill>
-                <a:latin typeface="Arial" panose="020B0604020202020204" pitchFamily="34" charset="0"/>
-              </a:rPr>
-              <a:t>cumprimento </a:t>
-            </a:r>
-            <a:r>
-              <a:rPr lang="pt-PT" noProof="0" dirty="0" smtClean="0">
-                <a:solidFill>
-                  <a:srgbClr val="000000"/>
-                </a:solidFill>
-                <a:latin typeface="Arial" panose="020B0604020202020204" pitchFamily="34" charset="0"/>
-              </a:rPr>
-              <a:t>… [das] … diretrizes </a:t>
-            </a:r>
-            <a:r>
-              <a:rPr lang="pt-PT" noProof="0" dirty="0">
-                <a:solidFill>
-                  <a:srgbClr val="000000"/>
-                </a:solidFill>
-                <a:latin typeface="Arial" panose="020B0604020202020204" pitchFamily="34" charset="0"/>
-              </a:rPr>
-              <a:t>fará com que os conteúdos fiquem acessíveis a um maior número de pessoas com incapacidades, incluindo </a:t>
-            </a:r>
-            <a:r>
-              <a:rPr lang="pt-PT" u="sng" noProof="0" dirty="0">
-                <a:solidFill>
-                  <a:srgbClr val="000000"/>
-                </a:solidFill>
-                <a:latin typeface="Arial" panose="020B0604020202020204" pitchFamily="34" charset="0"/>
-              </a:rPr>
-              <a:t>cegueira</a:t>
-            </a:r>
-            <a:r>
-              <a:rPr lang="pt-PT" noProof="0" dirty="0">
-                <a:solidFill>
-                  <a:srgbClr val="000000"/>
-                </a:solidFill>
-                <a:latin typeface="Arial" panose="020B0604020202020204" pitchFamily="34" charset="0"/>
-              </a:rPr>
-              <a:t> e </a:t>
-            </a:r>
-            <a:r>
-              <a:rPr lang="pt-PT" u="sng" noProof="0" dirty="0">
-                <a:solidFill>
-                  <a:srgbClr val="000000"/>
-                </a:solidFill>
-                <a:latin typeface="Arial" panose="020B0604020202020204" pitchFamily="34" charset="0"/>
-              </a:rPr>
-              <a:t>baixa visão</a:t>
-            </a:r>
-            <a:r>
-              <a:rPr lang="pt-PT" noProof="0" dirty="0">
-                <a:solidFill>
-                  <a:srgbClr val="000000"/>
-                </a:solidFill>
-                <a:latin typeface="Arial" panose="020B0604020202020204" pitchFamily="34" charset="0"/>
-              </a:rPr>
-              <a:t>, </a:t>
-            </a:r>
-            <a:r>
-              <a:rPr lang="pt-PT" u="sng" noProof="0" dirty="0">
-                <a:solidFill>
-                  <a:srgbClr val="000000"/>
-                </a:solidFill>
-                <a:latin typeface="Arial" panose="020B0604020202020204" pitchFamily="34" charset="0"/>
-              </a:rPr>
-              <a:t>surdez</a:t>
-            </a:r>
-            <a:r>
-              <a:rPr lang="pt-PT" noProof="0" dirty="0">
-                <a:solidFill>
-                  <a:srgbClr val="000000"/>
-                </a:solidFill>
-                <a:latin typeface="Arial" panose="020B0604020202020204" pitchFamily="34" charset="0"/>
-              </a:rPr>
-              <a:t> e </a:t>
-            </a:r>
-            <a:r>
-              <a:rPr lang="pt-PT" u="sng" noProof="0" dirty="0">
-                <a:solidFill>
-                  <a:srgbClr val="000000"/>
-                </a:solidFill>
-                <a:latin typeface="Arial" panose="020B0604020202020204" pitchFamily="34" charset="0"/>
-              </a:rPr>
-              <a:t>perda de audição</a:t>
-            </a:r>
-            <a:r>
-              <a:rPr lang="pt-PT" noProof="0" dirty="0">
-                <a:solidFill>
-                  <a:srgbClr val="000000"/>
-                </a:solidFill>
-                <a:latin typeface="Arial" panose="020B0604020202020204" pitchFamily="34" charset="0"/>
-              </a:rPr>
-              <a:t>, </a:t>
-            </a:r>
-            <a:r>
-              <a:rPr lang="pt-PT" u="sng" noProof="0" dirty="0">
-                <a:solidFill>
-                  <a:srgbClr val="000000"/>
-                </a:solidFill>
-                <a:latin typeface="Arial" panose="020B0604020202020204" pitchFamily="34" charset="0"/>
-              </a:rPr>
-              <a:t>incapacidades ao nível da aprendizagem</a:t>
-            </a:r>
-            <a:r>
-              <a:rPr lang="pt-PT" noProof="0" dirty="0">
-                <a:solidFill>
-                  <a:srgbClr val="000000"/>
-                </a:solidFill>
-                <a:latin typeface="Arial" panose="020B0604020202020204" pitchFamily="34" charset="0"/>
-              </a:rPr>
-              <a:t>, </a:t>
-            </a:r>
-            <a:r>
-              <a:rPr lang="pt-PT" u="sng" noProof="0" dirty="0">
-                <a:solidFill>
-                  <a:srgbClr val="000000"/>
-                </a:solidFill>
-                <a:latin typeface="Arial" panose="020B0604020202020204" pitchFamily="34" charset="0"/>
-              </a:rPr>
-              <a:t>limitações cognitivas</a:t>
-            </a:r>
-            <a:r>
-              <a:rPr lang="pt-PT" noProof="0" dirty="0">
-                <a:solidFill>
-                  <a:srgbClr val="000000"/>
-                </a:solidFill>
-                <a:latin typeface="Arial" panose="020B0604020202020204" pitchFamily="34" charset="0"/>
-              </a:rPr>
-              <a:t>, </a:t>
-            </a:r>
-            <a:r>
-              <a:rPr lang="pt-PT" u="sng" noProof="0" dirty="0">
-                <a:solidFill>
-                  <a:srgbClr val="000000"/>
-                </a:solidFill>
-                <a:latin typeface="Arial" panose="020B0604020202020204" pitchFamily="34" charset="0"/>
-              </a:rPr>
-              <a:t>movimentos limitados</a:t>
-            </a:r>
-            <a:r>
-              <a:rPr lang="pt-PT" noProof="0" dirty="0">
-                <a:solidFill>
-                  <a:srgbClr val="000000"/>
-                </a:solidFill>
-                <a:latin typeface="Arial" panose="020B0604020202020204" pitchFamily="34" charset="0"/>
-              </a:rPr>
-              <a:t>, </a:t>
-            </a:r>
-            <a:r>
-              <a:rPr lang="pt-PT" u="sng" noProof="0" dirty="0">
-                <a:solidFill>
-                  <a:srgbClr val="000000"/>
-                </a:solidFill>
-                <a:latin typeface="Arial" panose="020B0604020202020204" pitchFamily="34" charset="0"/>
-              </a:rPr>
-              <a:t>incapacidades ao nível da fala</a:t>
-            </a:r>
-            <a:r>
-              <a:rPr lang="pt-PT" noProof="0" dirty="0">
-                <a:solidFill>
-                  <a:srgbClr val="000000"/>
-                </a:solidFill>
-                <a:latin typeface="Arial" panose="020B0604020202020204" pitchFamily="34" charset="0"/>
-              </a:rPr>
-              <a:t>, </a:t>
-            </a:r>
-            <a:r>
-              <a:rPr lang="pt-PT" u="sng" noProof="0" dirty="0">
-                <a:solidFill>
-                  <a:srgbClr val="000000"/>
-                </a:solidFill>
-                <a:latin typeface="Arial" panose="020B0604020202020204" pitchFamily="34" charset="0"/>
-              </a:rPr>
-              <a:t>fotossensibilidade</a:t>
-            </a:r>
-            <a:r>
-              <a:rPr lang="pt-PT" noProof="0" dirty="0">
-                <a:solidFill>
-                  <a:srgbClr val="000000"/>
-                </a:solidFill>
-                <a:latin typeface="Arial" panose="020B0604020202020204" pitchFamily="34" charset="0"/>
-              </a:rPr>
-              <a:t> e ainda combinações destas </a:t>
-            </a:r>
-            <a:r>
-              <a:rPr lang="pt-PT" noProof="0" dirty="0" smtClean="0">
-                <a:solidFill>
-                  <a:srgbClr val="000000"/>
-                </a:solidFill>
-                <a:latin typeface="Arial" panose="020B0604020202020204" pitchFamily="34" charset="0"/>
-              </a:rPr>
-              <a:t>incapacidades.</a:t>
-            </a:r>
-          </a:p>
-          <a:p>
-            <a:pPr algn="l"/>
-            <a:r>
-              <a:rPr lang="pt-PT" b="1" noProof="0" dirty="0" smtClean="0">
-                <a:solidFill>
-                  <a:srgbClr val="000000"/>
-                </a:solidFill>
-                <a:latin typeface="Arial" panose="020B0604020202020204" pitchFamily="34" charset="0"/>
-              </a:rPr>
-              <a:t>O </a:t>
-            </a:r>
-            <a:r>
-              <a:rPr lang="pt-PT" b="1" noProof="0" dirty="0">
-                <a:solidFill>
-                  <a:srgbClr val="000000"/>
-                </a:solidFill>
-                <a:latin typeface="Arial" panose="020B0604020202020204" pitchFamily="34" charset="0"/>
-              </a:rPr>
-              <a:t>cumprimento destas </a:t>
-            </a:r>
-            <a:r>
-              <a:rPr lang="pt-PT" b="1" noProof="0" dirty="0" smtClean="0">
-                <a:solidFill>
-                  <a:srgbClr val="000000"/>
-                </a:solidFill>
-                <a:latin typeface="Arial" panose="020B0604020202020204" pitchFamily="34" charset="0"/>
-              </a:rPr>
-              <a:t>diretrizes </a:t>
-            </a:r>
-            <a:r>
-              <a:rPr lang="pt-PT" b="1" noProof="0" dirty="0">
-                <a:solidFill>
-                  <a:srgbClr val="000000"/>
-                </a:solidFill>
-                <a:latin typeface="Arial" panose="020B0604020202020204" pitchFamily="34" charset="0"/>
-              </a:rPr>
-              <a:t>também facilitará a utilização do conteúdo </a:t>
-            </a:r>
-            <a:r>
-              <a:rPr lang="pt-PT" b="1" noProof="0" dirty="0" smtClean="0">
-                <a:solidFill>
-                  <a:srgbClr val="000000"/>
-                </a:solidFill>
-                <a:latin typeface="Arial" panose="020B0604020202020204" pitchFamily="34" charset="0"/>
-              </a:rPr>
-              <a:t>da </a:t>
-            </a:r>
-            <a:r>
-              <a:rPr lang="pt-PT" b="1" noProof="0" dirty="0">
-                <a:solidFill>
-                  <a:srgbClr val="000000"/>
-                </a:solidFill>
-                <a:latin typeface="Arial" panose="020B0604020202020204" pitchFamily="34" charset="0"/>
-              </a:rPr>
-              <a:t>Web pelos utilizadores em geral</a:t>
-            </a:r>
-            <a:r>
-              <a:rPr lang="pt-PT" b="1" noProof="0" dirty="0" smtClean="0">
-                <a:solidFill>
-                  <a:srgbClr val="000000"/>
-                </a:solidFill>
-                <a:latin typeface="Arial" panose="020B0604020202020204" pitchFamily="34" charset="0"/>
-              </a:rPr>
-              <a:t>.</a:t>
-            </a:r>
-          </a:p>
-          <a:p>
-            <a:pPr algn="r"/>
-            <a:endParaRPr lang="pt-PT" noProof="0" dirty="0"/>
-          </a:p>
-          <a:p>
-            <a:pPr algn="r"/>
-            <a:r>
-              <a:rPr lang="pt-PT" sz="1200" noProof="0" dirty="0" smtClean="0"/>
-              <a:t>(in: </a:t>
-            </a:r>
-            <a:r>
-              <a:rPr lang="pt-PT" sz="1200" noProof="0" dirty="0" smtClean="0">
-                <a:hlinkClick r:id="rId2"/>
-              </a:rPr>
-              <a:t>http</a:t>
-            </a:r>
-            <a:r>
-              <a:rPr lang="pt-PT" sz="1200" noProof="0" dirty="0">
-                <a:hlinkClick r:id="rId2"/>
-              </a:rPr>
-              <a:t>://www.acessibilidade.gov.pt/w3/TR/WCAG20</a:t>
-            </a:r>
-            <a:r>
-              <a:rPr lang="pt-PT" sz="1200" noProof="0" dirty="0" smtClean="0">
-                <a:hlinkClick r:id="rId2"/>
-              </a:rPr>
-              <a:t>/</a:t>
-            </a:r>
-            <a:r>
-              <a:rPr lang="pt-PT" sz="1200" noProof="0" dirty="0" smtClean="0"/>
-              <a:t> , acedido em  2016/04/13)</a:t>
-            </a:r>
-            <a:endParaRPr lang="pt-PT" sz="1200" noProof="0" dirty="0"/>
+        <p:spPr/>
+        <p:txBody>
+          <a:bodyPr/>
+          <a:lstStyle/>
+          <a:p>
+            <a:r>
+              <a:rPr lang="en-US" dirty="0" smtClean="0"/>
+              <a:t>António Borba da Silva – 22908</a:t>
+            </a:r>
+          </a:p>
+          <a:p>
+            <a:r>
+              <a:rPr lang="en-US" dirty="0" smtClean="0"/>
+              <a:t>LEIC – 2015/2016</a:t>
+            </a:r>
+          </a:p>
+          <a:p>
+            <a:r>
+              <a:rPr lang="en-US" dirty="0" err="1" smtClean="0"/>
+              <a:t>Grupo</a:t>
+            </a:r>
+            <a:r>
+              <a:rPr lang="en-US" dirty="0" smtClean="0"/>
+              <a:t> 40</a:t>
+            </a:r>
+            <a:endParaRPr lang="pt-PT" dirty="0"/>
           </a:p>
         </p:txBody>
       </p:sp>
     </p:spTree>
     <p:extLst>
       <p:ext uri="{BB962C8B-B14F-4D97-AF65-F5344CB8AC3E}">
-        <p14:creationId xmlns:p14="http://schemas.microsoft.com/office/powerpoint/2010/main" val="3894842286"/>
+        <p14:creationId xmlns:p14="http://schemas.microsoft.com/office/powerpoint/2010/main" val="1543821543"/>
       </p:ext>
     </p:extLst>
   </p:cSld>
   <p:clrMapOvr>
     <a:masterClrMapping/>
   </p:clrMapOvr>
-  <p:timing>
-    <p:tnLst>
-      <p:par>
-        <p:cTn id="1" dur="indefinite" restart="never" nodeType="tmRoot"/>
-      </p:par>
-    </p:tnLst>
-  </p:timing>
 </p:sld>
 </file>
 
@@ -4160,10 +3855,113 @@
           <a:bodyPr/>
           <a:lstStyle/>
           <a:p>
+            <a:pPr lvl="0"/>
+            <a:r>
+              <a:rPr lang="pt-PT" noProof="0" dirty="0" smtClean="0"/>
+              <a:t>Contribuições em </a:t>
+            </a:r>
+            <a:r>
+              <a:rPr lang="pt-PT" noProof="0" dirty="0" smtClean="0"/>
+              <a:t>Portugal</a:t>
+            </a:r>
+            <a:br>
+              <a:rPr lang="pt-PT" noProof="0" dirty="0" smtClean="0"/>
+            </a:br>
+            <a:endParaRPr lang="pt-PT" noProof="0" dirty="0"/>
+          </a:p>
+        </p:txBody>
+      </p:sp>
+      <p:sp>
+        <p:nvSpPr>
+          <p:cNvPr id="3" name="Content Placeholder 2"/>
+          <p:cNvSpPr>
+            <a:spLocks noGrp="1"/>
+          </p:cNvSpPr>
+          <p:nvPr>
+            <p:ph idx="1"/>
+          </p:nvPr>
+        </p:nvSpPr>
+        <p:spPr/>
+        <p:txBody>
+          <a:bodyPr/>
+          <a:lstStyle/>
+          <a:p>
+            <a:r>
+              <a:rPr lang="pt-PT" noProof="0" dirty="0" smtClean="0"/>
+              <a:t>FCT - Unidade Acesso</a:t>
+            </a:r>
+          </a:p>
+          <a:p>
+            <a:r>
+              <a:rPr lang="pt-PT" noProof="0" dirty="0" smtClean="0"/>
+              <a:t>UP - </a:t>
+            </a:r>
+            <a:r>
+              <a:rPr lang="pt-PT" noProof="0" dirty="0" err="1" smtClean="0"/>
+              <a:t>Places</a:t>
+            </a:r>
+            <a:r>
+              <a:rPr lang="pt-PT" noProof="0" dirty="0" smtClean="0"/>
+              <a:t>, Plataforma de Acessibilidade</a:t>
+            </a:r>
+          </a:p>
+          <a:p>
+            <a:endParaRPr lang="pt-PT" noProof="0" dirty="0" smtClean="0"/>
+          </a:p>
+        </p:txBody>
+      </p:sp>
+    </p:spTree>
+    <p:extLst>
+      <p:ext uri="{BB962C8B-B14F-4D97-AF65-F5344CB8AC3E}">
+        <p14:creationId xmlns:p14="http://schemas.microsoft.com/office/powerpoint/2010/main" val="1789695018"/>
+      </p:ext>
+    </p:extLst>
+  </p:cSld>
+  <p:clrMapOvr>
+    <a:masterClrMapping/>
+  </p:clrMapOvr>
+</p:sld>
+</file>
+
+<file path=ppt/slides/slide11.xml><?xml version="1.0" encoding="utf-8"?>
+<p:sld xmlns:a="http://schemas.openxmlformats.org/drawingml/2006/main" xmlns:r="http://schemas.openxmlformats.org/officeDocument/2006/relationships" xmlns:p="http://schemas.openxmlformats.org/presentationml/2006/main">
+  <p:cSld>
+    <p:spTree>
+      <p:nvGrpSpPr>
+        <p:cNvPr id="1" name=""/>
+        <p:cNvGrpSpPr/>
+        <p:nvPr/>
+      </p:nvGrpSpPr>
+      <p:grpSpPr>
+        <a:xfrm>
+          <a:off x="0" y="0"/>
+          <a:ext cx="0" cy="0"/>
+          <a:chOff x="0" y="0"/>
+          <a:chExt cx="0" cy="0"/>
+        </a:xfrm>
+      </p:grpSpPr>
+      <p:sp>
+        <p:nvSpPr>
+          <p:cNvPr id="2" name="Title 1"/>
+          <p:cNvSpPr>
+            <a:spLocks noGrp="1"/>
+          </p:cNvSpPr>
+          <p:nvPr>
+            <p:ph type="title"/>
+          </p:nvPr>
+        </p:nvSpPr>
+        <p:spPr/>
+        <p:txBody>
+          <a:bodyPr/>
+          <a:lstStyle/>
+          <a:p>
             <a:r>
               <a:rPr lang="pt-PT" noProof="0" dirty="0" smtClean="0"/>
               <a:t>Referências</a:t>
             </a:r>
+            <a:br>
+              <a:rPr lang="pt-PT" noProof="0" dirty="0" smtClean="0"/>
+            </a:br>
             <a:endParaRPr lang="pt-PT" noProof="0" dirty="0"/>
           </a:p>
         </p:txBody>
@@ -4260,17 +4058,30 @@
             <a:spLocks noGrp="1"/>
           </p:cNvSpPr>
           <p:nvPr>
-            <p:ph type="title"/>
-          </p:nvPr>
-        </p:nvSpPr>
-        <p:spPr/>
-        <p:txBody>
-          <a:bodyPr/>
-          <a:lstStyle/>
-          <a:p>
-            <a:r>
-              <a:rPr lang="pt-PT" noProof="0" dirty="0" smtClean="0"/>
-              <a:t>Agenda</a:t>
+            <p:ph type="ctrTitle"/>
+          </p:nvPr>
+        </p:nvSpPr>
+        <p:spPr>
+          <a:xfrm>
+            <a:off x="1524000" y="1122363"/>
+            <a:ext cx="9144000" cy="1011237"/>
+          </a:xfrm>
+        </p:spPr>
+        <p:txBody>
+          <a:bodyPr/>
+          <a:lstStyle/>
+          <a:p>
+            <a:r>
+              <a:rPr lang="en-US" dirty="0" err="1" smtClean="0"/>
+              <a:t>Acessibilidade</a:t>
+            </a:r>
+            <a:r>
+              <a:rPr lang="en-US" dirty="0" smtClean="0"/>
+              <a:t> - </a:t>
+            </a:r>
+            <a:r>
+              <a:rPr lang="en-US" dirty="0" err="1" smtClean="0"/>
+              <a:t>definição</a:t>
             </a:r>
             <a:endParaRPr lang="pt-PT" noProof="0" dirty="0"/>
           </a:p>
@@ -4278,105 +4089,341 @@
       </p:sp>
       <p:sp>
         <p:nvSpPr>
-          <p:cNvPr id="3" name="Content Placeholder 2"/>
-          <p:cNvSpPr>
-            <a:spLocks noGrp="1"/>
-          </p:cNvSpPr>
-          <p:nvPr>
-            <p:ph idx="1"/>
-          </p:nvPr>
-        </p:nvSpPr>
-        <p:spPr/>
-        <p:txBody>
-          <a:bodyPr/>
-          <a:lstStyle/>
-          <a:p>
-            <a:pPr>
-              <a:tabLst>
-                <a:tab pos="9956800" algn="r"/>
-              </a:tabLst>
-            </a:pPr>
-            <a:r>
-              <a:rPr lang="pt-PT" noProof="0" dirty="0" smtClean="0"/>
-              <a:t>O que é que está em causa?	2 min</a:t>
-            </a:r>
-          </a:p>
-          <a:p>
-            <a:pPr>
-              <a:tabLst>
-                <a:tab pos="9956800" algn="r"/>
-              </a:tabLst>
-            </a:pPr>
-            <a:r>
-              <a:rPr lang="pt-PT" noProof="0" dirty="0" smtClean="0"/>
-              <a:t>Aplicabilidade e benefícios	3 min</a:t>
-            </a:r>
-          </a:p>
-          <a:p>
-            <a:pPr>
-              <a:tabLst>
-                <a:tab pos="9956800" algn="r"/>
-              </a:tabLst>
-            </a:pPr>
-            <a:r>
-              <a:rPr lang="pt-PT" dirty="0" smtClean="0"/>
-              <a:t>Casos práticos	7 min</a:t>
-            </a:r>
-            <a:endParaRPr lang="pt-PT" noProof="0" dirty="0" smtClean="0"/>
-          </a:p>
-          <a:p>
-            <a:pPr>
-              <a:tabLst>
-                <a:tab pos="9956800" algn="r"/>
-              </a:tabLst>
-            </a:pPr>
-            <a:r>
-              <a:rPr lang="pt-PT" noProof="0" dirty="0" smtClean="0"/>
-              <a:t>Em Portugal	3 min</a:t>
-            </a:r>
-          </a:p>
-          <a:p>
-            <a:pPr>
-              <a:tabLst>
-                <a:tab pos="9956800" algn="r"/>
-              </a:tabLst>
-            </a:pPr>
-            <a:r>
-              <a:rPr lang="pt-PT" noProof="0" dirty="0" smtClean="0"/>
-              <a:t>Referências</a:t>
-            </a:r>
-          </a:p>
-          <a:p>
-            <a:pPr marL="0" indent="0">
-              <a:buNone/>
-              <a:tabLst>
-                <a:tab pos="9956800" algn="r"/>
-              </a:tabLst>
-            </a:pPr>
-            <a:r>
-              <a:rPr lang="pt-PT" noProof="0" dirty="0" smtClean="0"/>
-              <a:t>	---------</a:t>
-            </a:r>
-          </a:p>
-          <a:p>
-            <a:pPr marL="0" indent="0">
-              <a:buNone/>
-              <a:tabLst>
-                <a:tab pos="9956800" algn="r"/>
-              </a:tabLst>
-            </a:pPr>
-            <a:r>
-              <a:rPr lang="pt-PT" dirty="0" smtClean="0"/>
-              <a:t>	15 min</a:t>
-            </a:r>
-            <a:endParaRPr lang="pt-PT" noProof="0" dirty="0" smtClean="0"/>
+          <p:cNvPr id="3" name="Subtitle 2"/>
+          <p:cNvSpPr>
+            <a:spLocks noGrp="1"/>
+          </p:cNvSpPr>
+          <p:nvPr>
+            <p:ph type="subTitle" idx="1"/>
+          </p:nvPr>
+        </p:nvSpPr>
+        <p:spPr>
+          <a:xfrm>
+            <a:off x="1524000" y="2401824"/>
+            <a:ext cx="9144000" cy="3608832"/>
+          </a:xfrm>
+        </p:spPr>
+        <p:txBody>
+          <a:bodyPr>
+            <a:normAutofit/>
+          </a:bodyPr>
+          <a:lstStyle/>
+          <a:p>
+            <a:pPr algn="l"/>
+            <a:r>
+              <a:rPr lang="pt-PT" noProof="0" dirty="0" smtClean="0">
+                <a:solidFill>
+                  <a:srgbClr val="000000"/>
+                </a:solidFill>
+                <a:latin typeface="Arial" panose="020B0604020202020204" pitchFamily="34" charset="0"/>
+              </a:rPr>
+              <a:t>…O </a:t>
+            </a:r>
+            <a:r>
+              <a:rPr lang="pt-PT" noProof="0" dirty="0">
+                <a:solidFill>
+                  <a:srgbClr val="000000"/>
+                </a:solidFill>
+                <a:latin typeface="Arial" panose="020B0604020202020204" pitchFamily="34" charset="0"/>
+              </a:rPr>
+              <a:t>cumprimento </a:t>
+            </a:r>
+            <a:r>
+              <a:rPr lang="pt-PT" noProof="0" dirty="0" smtClean="0">
+                <a:solidFill>
+                  <a:srgbClr val="000000"/>
+                </a:solidFill>
+                <a:latin typeface="Arial" panose="020B0604020202020204" pitchFamily="34" charset="0"/>
+              </a:rPr>
+              <a:t>… [das] … diretrizes </a:t>
+            </a:r>
+            <a:r>
+              <a:rPr lang="pt-PT" noProof="0" dirty="0">
+                <a:solidFill>
+                  <a:srgbClr val="000000"/>
+                </a:solidFill>
+                <a:latin typeface="Arial" panose="020B0604020202020204" pitchFamily="34" charset="0"/>
+              </a:rPr>
+              <a:t>fará com que os conteúdos fiquem acessíveis a um maior número de pessoas com incapacidades, incluindo </a:t>
+            </a:r>
+            <a:r>
+              <a:rPr lang="pt-PT" u="sng" noProof="0" dirty="0">
+                <a:solidFill>
+                  <a:srgbClr val="000000"/>
+                </a:solidFill>
+                <a:latin typeface="Arial" panose="020B0604020202020204" pitchFamily="34" charset="0"/>
+              </a:rPr>
+              <a:t>cegueira</a:t>
+            </a:r>
+            <a:r>
+              <a:rPr lang="pt-PT" noProof="0" dirty="0">
+                <a:solidFill>
+                  <a:srgbClr val="000000"/>
+                </a:solidFill>
+                <a:latin typeface="Arial" panose="020B0604020202020204" pitchFamily="34" charset="0"/>
+              </a:rPr>
+              <a:t> e </a:t>
+            </a:r>
+            <a:r>
+              <a:rPr lang="pt-PT" u="sng" noProof="0" dirty="0">
+                <a:solidFill>
+                  <a:srgbClr val="000000"/>
+                </a:solidFill>
+                <a:latin typeface="Arial" panose="020B0604020202020204" pitchFamily="34" charset="0"/>
+              </a:rPr>
+              <a:t>baixa visão</a:t>
+            </a:r>
+            <a:r>
+              <a:rPr lang="pt-PT" noProof="0" dirty="0">
+                <a:solidFill>
+                  <a:srgbClr val="000000"/>
+                </a:solidFill>
+                <a:latin typeface="Arial" panose="020B0604020202020204" pitchFamily="34" charset="0"/>
+              </a:rPr>
+              <a:t>, </a:t>
+            </a:r>
+            <a:r>
+              <a:rPr lang="pt-PT" u="sng" noProof="0" dirty="0">
+                <a:solidFill>
+                  <a:srgbClr val="000000"/>
+                </a:solidFill>
+                <a:latin typeface="Arial" panose="020B0604020202020204" pitchFamily="34" charset="0"/>
+              </a:rPr>
+              <a:t>surdez</a:t>
+            </a:r>
+            <a:r>
+              <a:rPr lang="pt-PT" noProof="0" dirty="0">
+                <a:solidFill>
+                  <a:srgbClr val="000000"/>
+                </a:solidFill>
+                <a:latin typeface="Arial" panose="020B0604020202020204" pitchFamily="34" charset="0"/>
+              </a:rPr>
+              <a:t> e </a:t>
+            </a:r>
+            <a:r>
+              <a:rPr lang="pt-PT" u="sng" noProof="0" dirty="0">
+                <a:solidFill>
+                  <a:srgbClr val="000000"/>
+                </a:solidFill>
+                <a:latin typeface="Arial" panose="020B0604020202020204" pitchFamily="34" charset="0"/>
+              </a:rPr>
+              <a:t>perda de audição</a:t>
+            </a:r>
+            <a:r>
+              <a:rPr lang="pt-PT" noProof="0" dirty="0">
+                <a:solidFill>
+                  <a:srgbClr val="000000"/>
+                </a:solidFill>
+                <a:latin typeface="Arial" panose="020B0604020202020204" pitchFamily="34" charset="0"/>
+              </a:rPr>
+              <a:t>, </a:t>
+            </a:r>
+            <a:r>
+              <a:rPr lang="pt-PT" u="sng" noProof="0" dirty="0">
+                <a:solidFill>
+                  <a:srgbClr val="000000"/>
+                </a:solidFill>
+                <a:latin typeface="Arial" panose="020B0604020202020204" pitchFamily="34" charset="0"/>
+              </a:rPr>
+              <a:t>incapacidades ao nível da aprendizagem</a:t>
+            </a:r>
+            <a:r>
+              <a:rPr lang="pt-PT" noProof="0" dirty="0">
+                <a:solidFill>
+                  <a:srgbClr val="000000"/>
+                </a:solidFill>
+                <a:latin typeface="Arial" panose="020B0604020202020204" pitchFamily="34" charset="0"/>
+              </a:rPr>
+              <a:t>, </a:t>
+            </a:r>
+            <a:r>
+              <a:rPr lang="pt-PT" u="sng" noProof="0" dirty="0">
+                <a:solidFill>
+                  <a:srgbClr val="000000"/>
+                </a:solidFill>
+                <a:latin typeface="Arial" panose="020B0604020202020204" pitchFamily="34" charset="0"/>
+              </a:rPr>
+              <a:t>limitações cognitivas</a:t>
+            </a:r>
+            <a:r>
+              <a:rPr lang="pt-PT" noProof="0" dirty="0">
+                <a:solidFill>
+                  <a:srgbClr val="000000"/>
+                </a:solidFill>
+                <a:latin typeface="Arial" panose="020B0604020202020204" pitchFamily="34" charset="0"/>
+              </a:rPr>
+              <a:t>, </a:t>
+            </a:r>
+            <a:r>
+              <a:rPr lang="pt-PT" u="sng" noProof="0" dirty="0">
+                <a:solidFill>
+                  <a:srgbClr val="000000"/>
+                </a:solidFill>
+                <a:latin typeface="Arial" panose="020B0604020202020204" pitchFamily="34" charset="0"/>
+              </a:rPr>
+              <a:t>movimentos limitados</a:t>
+            </a:r>
+            <a:r>
+              <a:rPr lang="pt-PT" noProof="0" dirty="0">
+                <a:solidFill>
+                  <a:srgbClr val="000000"/>
+                </a:solidFill>
+                <a:latin typeface="Arial" panose="020B0604020202020204" pitchFamily="34" charset="0"/>
+              </a:rPr>
+              <a:t>, </a:t>
+            </a:r>
+            <a:r>
+              <a:rPr lang="pt-PT" u="sng" noProof="0" dirty="0">
+                <a:solidFill>
+                  <a:srgbClr val="000000"/>
+                </a:solidFill>
+                <a:latin typeface="Arial" panose="020B0604020202020204" pitchFamily="34" charset="0"/>
+              </a:rPr>
+              <a:t>incapacidades ao nível da fala</a:t>
+            </a:r>
+            <a:r>
+              <a:rPr lang="pt-PT" noProof="0" dirty="0">
+                <a:solidFill>
+                  <a:srgbClr val="000000"/>
+                </a:solidFill>
+                <a:latin typeface="Arial" panose="020B0604020202020204" pitchFamily="34" charset="0"/>
+              </a:rPr>
+              <a:t>, </a:t>
+            </a:r>
+            <a:r>
+              <a:rPr lang="pt-PT" u="sng" noProof="0" dirty="0">
+                <a:solidFill>
+                  <a:srgbClr val="000000"/>
+                </a:solidFill>
+                <a:latin typeface="Arial" panose="020B0604020202020204" pitchFamily="34" charset="0"/>
+              </a:rPr>
+              <a:t>fotossensibilidade</a:t>
+            </a:r>
+            <a:r>
+              <a:rPr lang="pt-PT" noProof="0" dirty="0">
+                <a:solidFill>
+                  <a:srgbClr val="000000"/>
+                </a:solidFill>
+                <a:latin typeface="Arial" panose="020B0604020202020204" pitchFamily="34" charset="0"/>
+              </a:rPr>
+              <a:t> e ainda combinações destas </a:t>
+            </a:r>
+            <a:r>
+              <a:rPr lang="pt-PT" noProof="0" dirty="0" smtClean="0">
+                <a:solidFill>
+                  <a:srgbClr val="000000"/>
+                </a:solidFill>
+                <a:latin typeface="Arial" panose="020B0604020202020204" pitchFamily="34" charset="0"/>
+              </a:rPr>
+              <a:t>incapacidades.</a:t>
+            </a:r>
+          </a:p>
+          <a:p>
+            <a:pPr algn="l"/>
+            <a:r>
+              <a:rPr lang="pt-PT" b="1" noProof="0" dirty="0" smtClean="0">
+                <a:solidFill>
+                  <a:srgbClr val="000000"/>
+                </a:solidFill>
+                <a:latin typeface="Arial" panose="020B0604020202020204" pitchFamily="34" charset="0"/>
+              </a:rPr>
+              <a:t>O </a:t>
+            </a:r>
+            <a:r>
+              <a:rPr lang="pt-PT" b="1" noProof="0" dirty="0">
+                <a:solidFill>
+                  <a:srgbClr val="000000"/>
+                </a:solidFill>
+                <a:latin typeface="Arial" panose="020B0604020202020204" pitchFamily="34" charset="0"/>
+              </a:rPr>
+              <a:t>cumprimento destas </a:t>
+            </a:r>
+            <a:r>
+              <a:rPr lang="pt-PT" b="1" noProof="0" dirty="0" smtClean="0">
+                <a:solidFill>
+                  <a:srgbClr val="000000"/>
+                </a:solidFill>
+                <a:latin typeface="Arial" panose="020B0604020202020204" pitchFamily="34" charset="0"/>
+              </a:rPr>
+              <a:t>diretrizes </a:t>
+            </a:r>
+            <a:r>
+              <a:rPr lang="pt-PT" b="1" noProof="0" dirty="0">
+                <a:solidFill>
+                  <a:srgbClr val="000000"/>
+                </a:solidFill>
+                <a:latin typeface="Arial" panose="020B0604020202020204" pitchFamily="34" charset="0"/>
+              </a:rPr>
+              <a:t>também facilitará a utilização do conteúdo </a:t>
+            </a:r>
+            <a:r>
+              <a:rPr lang="pt-PT" b="1" noProof="0" dirty="0" smtClean="0">
+                <a:solidFill>
+                  <a:srgbClr val="000000"/>
+                </a:solidFill>
+                <a:latin typeface="Arial" panose="020B0604020202020204" pitchFamily="34" charset="0"/>
+              </a:rPr>
+              <a:t>da </a:t>
+            </a:r>
+            <a:r>
+              <a:rPr lang="pt-PT" b="1" noProof="0" dirty="0">
+                <a:solidFill>
+                  <a:srgbClr val="000000"/>
+                </a:solidFill>
+                <a:latin typeface="Arial" panose="020B0604020202020204" pitchFamily="34" charset="0"/>
+              </a:rPr>
+              <a:t>Web pelos utilizadores em geral</a:t>
+            </a:r>
+            <a:r>
+              <a:rPr lang="pt-PT" b="1" noProof="0" dirty="0" smtClean="0">
+                <a:solidFill>
+                  <a:srgbClr val="000000"/>
+                </a:solidFill>
+                <a:latin typeface="Arial" panose="020B0604020202020204" pitchFamily="34" charset="0"/>
+              </a:rPr>
+              <a:t>.</a:t>
+            </a:r>
+          </a:p>
+          <a:p>
+            <a:pPr algn="r"/>
+            <a:endParaRPr lang="pt-PT" noProof="0" dirty="0"/>
+          </a:p>
+          <a:p>
+            <a:pPr algn="r"/>
+            <a:r>
+              <a:rPr lang="pt-PT" sz="1200" noProof="0" dirty="0" smtClean="0"/>
+              <a:t>(in: </a:t>
+            </a:r>
+            <a:r>
+              <a:rPr lang="pt-PT" sz="1200" noProof="0" dirty="0" smtClean="0">
+                <a:hlinkClick r:id="rId2"/>
+              </a:rPr>
+              <a:t>http</a:t>
+            </a:r>
+            <a:r>
+              <a:rPr lang="pt-PT" sz="1200" noProof="0" dirty="0">
+                <a:hlinkClick r:id="rId2"/>
+              </a:rPr>
+              <a:t>://www.acessibilidade.gov.pt/w3/TR/WCAG20</a:t>
+            </a:r>
+            <a:r>
+              <a:rPr lang="pt-PT" sz="1200" noProof="0" dirty="0" smtClean="0">
+                <a:hlinkClick r:id="rId2"/>
+              </a:rPr>
+              <a:t>/</a:t>
+            </a:r>
+            <a:r>
+              <a:rPr lang="pt-PT" sz="1200" noProof="0" dirty="0" smtClean="0"/>
+              <a:t> , acedido em  2016/04/13)</a:t>
+            </a:r>
+            <a:endParaRPr lang="pt-PT" sz="1200" noProof="0" dirty="0"/>
           </a:p>
         </p:txBody>
       </p:sp>
     </p:spTree>
     <p:extLst>
       <p:ext uri="{BB962C8B-B14F-4D97-AF65-F5344CB8AC3E}">
-        <p14:creationId xmlns:p14="http://schemas.microsoft.com/office/powerpoint/2010/main" val="2197099088"/>
+        <p14:creationId xmlns:p14="http://schemas.microsoft.com/office/powerpoint/2010/main" val="3894842286"/>
       </p:ext>
     </p:extLst>
   </p:cSld>
@@ -4426,10 +4473,37 @@
           <a:lstStyle/>
           <a:p>
             <a:r>
-              <a:rPr lang="en-US" noProof="0" dirty="0" smtClean="0"/>
-              <a:t>DUMMY</a:t>
-            </a:r>
-            <a:endParaRPr lang="pt-PT" noProof="0" dirty="0"/>
+              <a:rPr lang="pt-PT" dirty="0"/>
+              <a:t>O que é que está em causa</a:t>
+            </a:r>
+            <a:r>
+              <a:rPr lang="pt-PT" dirty="0" smtClean="0"/>
+              <a:t>?</a:t>
+            </a:r>
+            <a:br>
+              <a:rPr lang="pt-PT" dirty="0" smtClean="0"/>
+            </a:br>
+            <a:r>
+              <a:rPr lang="pt-PT" dirty="0" smtClean="0"/>
+              <a:t>- </a:t>
+            </a:r>
+            <a:r>
+              <a:rPr lang="en-US" dirty="0" err="1" smtClean="0"/>
+              <a:t>Não</a:t>
+            </a:r>
+            <a:r>
+              <a:rPr lang="en-US" dirty="0" smtClean="0"/>
+              <a:t> se </a:t>
+            </a:r>
+            <a:r>
+              <a:rPr lang="en-US" dirty="0" err="1" smtClean="0"/>
+              <a:t>limita</a:t>
+            </a:r>
+            <a:r>
+              <a:rPr lang="en-US" dirty="0" smtClean="0"/>
+              <a:t> à Web</a:t>
+            </a:r>
+            <a:endParaRPr lang="pt-PT" dirty="0"/>
           </a:p>
         </p:txBody>
       </p:sp>
@@ -4451,50 +4525,126 @@
           <a:lstStyle/>
           <a:p>
             <a:r>
-              <a:rPr lang="pt-PT" noProof="0" dirty="0" smtClean="0"/>
-              <a:t>Unidade Acesso – Acessibilidade a Cidadãos com Necessidades Especiais à Sociedade de Informação (1999).</a:t>
-            </a:r>
-          </a:p>
-          <a:p>
-            <a:r>
-              <a:rPr lang="pt-PT" noProof="0" dirty="0" smtClean="0"/>
-              <a:t>Programa Acesso – UMIC</a:t>
-            </a:r>
-          </a:p>
-          <a:p>
-            <a:r>
-              <a:rPr lang="pt-PT" noProof="0" dirty="0" smtClean="0"/>
-              <a:t>Unidade Acesso – FCT</a:t>
-            </a:r>
-          </a:p>
-          <a:p>
-            <a:r>
-              <a:rPr lang="pt-PT" noProof="0" dirty="0" smtClean="0">
-                <a:hlinkClick r:id="rId2"/>
-              </a:rPr>
-              <a:t>http://www.acessibilidade.gov.pt/</a:t>
-            </a:r>
-            <a:endParaRPr lang="pt-PT" noProof="0" dirty="0" smtClean="0"/>
+              <a:rPr lang="pt-PT" dirty="0"/>
+              <a:t>Recomendações na </a:t>
+            </a:r>
+            <a:r>
+              <a:rPr lang="pt-PT" dirty="0" smtClean="0"/>
+              <a:t>preparação</a:t>
+            </a:r>
+          </a:p>
+          <a:p>
+            <a:pPr lvl="1"/>
+            <a:r>
+              <a:rPr lang="pt-PT" dirty="0" smtClean="0"/>
+              <a:t>Escolher </a:t>
+            </a:r>
+            <a:r>
+              <a:rPr lang="pt-PT" dirty="0"/>
+              <a:t>tipo de letra </a:t>
+            </a:r>
+            <a:r>
+              <a:rPr lang="pt-PT" dirty="0" smtClean="0"/>
+              <a:t>legível</a:t>
+            </a:r>
+          </a:p>
+          <a:p>
+            <a:pPr lvl="1"/>
+            <a:r>
+              <a:rPr lang="pt-PT" dirty="0" smtClean="0"/>
+              <a:t>Utilizar </a:t>
+            </a:r>
+            <a:r>
+              <a:rPr lang="pt-PT" dirty="0"/>
+              <a:t>fundos </a:t>
+            </a:r>
+            <a:r>
+              <a:rPr lang="pt-PT" dirty="0" smtClean="0"/>
+              <a:t>lisos</a:t>
+            </a:r>
+          </a:p>
+          <a:p>
+            <a:pPr lvl="1"/>
+            <a:r>
+              <a:rPr lang="pt-PT" dirty="0" smtClean="0"/>
+              <a:t>Escolher </a:t>
+            </a:r>
+            <a:r>
+              <a:rPr lang="pt-PT" dirty="0"/>
+              <a:t>cuidadosamente as </a:t>
+            </a:r>
+            <a:r>
+              <a:rPr lang="pt-PT" dirty="0" smtClean="0"/>
+              <a:t>cores</a:t>
+            </a:r>
+          </a:p>
+          <a:p>
+            <a:pPr lvl="1"/>
+            <a:r>
+              <a:rPr lang="pt-PT" dirty="0" smtClean="0"/>
+              <a:t>Limitar </a:t>
+            </a:r>
+            <a:r>
+              <a:rPr lang="pt-PT" dirty="0"/>
+              <a:t>as </a:t>
+            </a:r>
+            <a:r>
+              <a:rPr lang="pt-PT" dirty="0" smtClean="0"/>
+              <a:t>animações</a:t>
+            </a:r>
+          </a:p>
+          <a:p>
+            <a:pPr lvl="1"/>
+            <a:r>
+              <a:rPr lang="pt-PT" dirty="0" smtClean="0"/>
+              <a:t>…</a:t>
+            </a:r>
+          </a:p>
+          <a:p>
+            <a:pPr marL="0" indent="0">
+              <a:buNone/>
+            </a:pPr>
+            <a:r>
+              <a:rPr lang="pt-PT" sz="1100" dirty="0" smtClean="0"/>
+              <a:t>(Fonte</a:t>
+            </a:r>
+            <a:r>
+              <a:rPr lang="pt-PT" sz="1100" dirty="0"/>
+              <a:t>: </a:t>
+            </a:r>
+            <a:r>
+              <a:rPr lang="pt-PT" sz="1100" dirty="0" err="1"/>
+              <a:t>Projecto</a:t>
+            </a:r>
+            <a:r>
+              <a:rPr lang="pt-PT" sz="1100" dirty="0"/>
+              <a:t> e </a:t>
+            </a:r>
+            <a:r>
+              <a:rPr lang="pt-PT" sz="1100" dirty="0" smtClean="0"/>
+              <a:t>Seminário - Preparação </a:t>
+            </a:r>
+            <a:r>
+              <a:rPr lang="pt-PT" sz="1100" dirty="0"/>
+              <a:t>da apresentação </a:t>
+            </a:r>
+            <a:r>
+              <a:rPr lang="pt-PT" sz="1100" dirty="0" smtClean="0"/>
+              <a:t>individual, Prof. Fernando Sousa )</a:t>
+            </a:r>
           </a:p>
         </p:txBody>
       </p:sp>
     </p:spTree>
     <p:extLst>
       <p:ext uri="{BB962C8B-B14F-4D97-AF65-F5344CB8AC3E}">
-        <p14:creationId xmlns:p14="http://schemas.microsoft.com/office/powerpoint/2010/main" val="810188647"/>
+        <p14:creationId xmlns:p14="http://schemas.microsoft.com/office/powerpoint/2010/main" val="1424945827"/>
       </p:ext>
     </p:extLst>
   </p:cSld>
   <p:clrMapOvr>
     <a:masterClrMapping/>
   </p:clrMapOvr>
-  <p:timing>
-    <p:tnLst>
-      <p:par>
-        <p:cTn id="1" dur="indefinite" restart="never" nodeType="tmRoot"/>
-      </p:par>
-    </p:tnLst>
-  </p:timing>
 </p:sld>
 </file>
 
@@ -4586,8 +4736,31 @@
                 <a:ea typeface="+mj-ea"/>
                 <a:cs typeface="+mj-cs"/>
               </a:rPr>
-              <a:t>O que é que está em causa?</a:t>
-            </a:r>
+              <a:t>O que é que está em causa</a:t>
+            </a:r>
+            <a:r>
+              <a:rPr lang="pt-PT" sz="4400" kern="1200" dirty="0" smtClean="0">
+                <a:solidFill>
+                  <a:schemeClr val="tx1"/>
+                </a:solidFill>
+                <a:effectLst/>
+                <a:latin typeface="+mj-lt"/>
+                <a:ea typeface="+mj-ea"/>
+                <a:cs typeface="+mj-cs"/>
+              </a:rPr>
+              <a:t>?</a:t>
+            </a:r>
+            <a:br>
+              <a:rPr lang="pt-PT" sz="4400" kern="1200" dirty="0" smtClean="0">
+                <a:solidFill>
+                  <a:schemeClr val="tx1"/>
+                </a:solidFill>
+                <a:effectLst/>
+                <a:latin typeface="+mj-lt"/>
+                <a:ea typeface="+mj-ea"/>
+                <a:cs typeface="+mj-cs"/>
+              </a:rPr>
+            </a:br>
             <a:endParaRPr lang="pt-PT" dirty="0"/>
           </a:p>
         </p:txBody>
@@ -5020,8 +5193,15 @@
             <a:pPr lvl="0"/>
             <a:r>
               <a:rPr lang="pt-PT" noProof="0" dirty="0" smtClean="0"/>
-              <a:t>População alvo (2min)</a:t>
-            </a:r>
+              <a:t>O que é</a:t>
+            </a:r>
+            <a:r>
+              <a:rPr lang="pt-PT" noProof="0" dirty="0" smtClean="0"/>
+              <a:t>?</a:t>
+            </a:r>
+            <a:br>
+              <a:rPr lang="pt-PT" noProof="0" dirty="0" smtClean="0"/>
+            </a:br>
             <a:endParaRPr lang="pt-PT" noProof="0" dirty="0"/>
           </a:p>
         </p:txBody>
@@ -5045,30 +5225,89 @@
           <a:p>
             <a:r>
               <a:rPr lang="pt-PT" noProof="0" dirty="0" smtClean="0"/>
-              <a:t>* Estatística de pessoas com necessidades especiais em Portugal</a:t>
-            </a:r>
-          </a:p>
-          <a:p>
+              <a:t>Normas de suporte:</a:t>
+            </a:r>
+          </a:p>
+          <a:p>
+            <a:pPr lvl="1"/>
             <a:r>
               <a:rPr lang="pt-PT" noProof="0" dirty="0" smtClean="0"/>
-              <a:t>* Na Europa</a:t>
-            </a:r>
-          </a:p>
-          <a:p>
+              <a:t>WCAG 2.0</a:t>
+            </a:r>
+          </a:p>
+          <a:p>
+            <a:pPr lvl="1"/>
             <a:r>
               <a:rPr lang="pt-PT" noProof="0" dirty="0" smtClean="0"/>
-              <a:t>* ...</a:t>
-            </a:r>
-          </a:p>
-          <a:p>
-            <a:endParaRPr lang="pt-PT" noProof="0" dirty="0" smtClean="0"/>
+              <a:t>ISO/IEC 40500:2012</a:t>
+            </a:r>
+          </a:p>
+          <a:p>
+            <a:r>
+              <a:rPr lang="pt-PT" noProof="0" dirty="0" smtClean="0"/>
+              <a:t>Suporte legal:</a:t>
+            </a:r>
+          </a:p>
+          <a:p>
+            <a:pPr lvl="1"/>
+            <a:r>
+              <a:rPr lang="pt-PT" noProof="0" dirty="0" smtClean="0"/>
+              <a:t>Legislação</a:t>
+            </a:r>
+            <a:r>
+              <a:rPr lang="pt-PT" baseline="0" noProof="0" dirty="0" smtClean="0"/>
+              <a:t> comunitária: Proposta de </a:t>
+            </a:r>
+            <a:r>
+              <a:rPr lang="pt-PT" baseline="0" noProof="0" dirty="0" err="1" smtClean="0"/>
+              <a:t>directiva</a:t>
+            </a:r>
+            <a:r>
+              <a:rPr lang="pt-PT" baseline="0" noProof="0" dirty="0" smtClean="0"/>
+              <a:t> – 2012/03/03</a:t>
+            </a:r>
+          </a:p>
+          <a:p>
+            <a:pPr marL="914400" lvl="2" indent="0">
+              <a:buNone/>
+            </a:pPr>
+            <a:r>
+              <a:rPr lang="pt-PT" sz="1200" dirty="0"/>
+              <a:t>https://ec.europa.eu/digital-single-market/news/proposal-directive-european-parliament-and-council-accessibility-public-sector-bodies-websites</a:t>
+            </a:r>
+            <a:endParaRPr lang="pt-PT" sz="1200" noProof="0" dirty="0" smtClean="0"/>
+          </a:p>
+          <a:p>
+            <a:pPr lvl="1"/>
+            <a:r>
+              <a:rPr lang="pt-PT" noProof="0" dirty="0" smtClean="0"/>
+              <a:t>Legislação portuguesa</a:t>
+            </a:r>
+            <a:r>
+              <a:rPr lang="pt-PT" dirty="0"/>
+              <a:t>: RCM n.º 112/2012 de 31 de </a:t>
+            </a:r>
+            <a:r>
+              <a:rPr lang="pt-PT" dirty="0" smtClean="0"/>
+              <a:t>dezembro</a:t>
+            </a:r>
+          </a:p>
+          <a:p>
+            <a:pPr marL="914400" lvl="2" indent="0">
+              <a:buNone/>
+            </a:pPr>
+            <a:r>
+              <a:rPr lang="pt-PT" sz="1200" dirty="0"/>
+              <a:t>http://www.acessibilidade.gov.pt/publicacoes#legislacao</a:t>
+            </a:r>
+            <a:endParaRPr lang="pt-PT" sz="1200" noProof="0" dirty="0" smtClean="0"/>
           </a:p>
         </p:txBody>
       </p:sp>
     </p:spTree>
     <p:extLst>
       <p:ext uri="{BB962C8B-B14F-4D97-AF65-F5344CB8AC3E}">
-        <p14:creationId xmlns:p14="http://schemas.microsoft.com/office/powerpoint/2010/main" val="3932973354"/>
+        <p14:creationId xmlns:p14="http://schemas.microsoft.com/office/powerpoint/2010/main" val="3999221353"/>
       </p:ext>
     </p:extLst>
   </p:cSld>
@@ -5117,12 +5356,26 @@
           <a:bodyPr/>
           <a:lstStyle/>
           <a:p>
-            <a:pPr lvl="0"/>
-            <a:r>
-              <a:rPr lang="pt-PT" noProof="0" dirty="0" smtClean="0"/>
-              <a:t>O que é?</a:t>
-            </a:r>
-            <a:endParaRPr lang="pt-PT" noProof="0" dirty="0"/>
+            <a:r>
+              <a:rPr lang="en-US" dirty="0" err="1" smtClean="0"/>
+              <a:t>Acessibilidade</a:t>
+            </a:r>
+            <a:r>
+              <a:rPr lang="en-US" dirty="0" smtClean="0"/>
+              <a:t> vs. </a:t>
+            </a:r>
+            <a:r>
+              <a:rPr lang="en-US" dirty="0" err="1" smtClean="0"/>
+              <a:t>Usabilidade</a:t>
+            </a:r>
+            <a:r>
+              <a:rPr lang="en-US" dirty="0" smtClean="0"/>
+              <a:t/>
+            </a:r>
+            <a:br>
+              <a:rPr lang="en-US" dirty="0" smtClean="0"/>
+            </a:br>
+            <a:endParaRPr lang="pt-PT" dirty="0"/>
           </a:p>
         </p:txBody>
       </p:sp>
@@ -5143,69 +5396,141 @@
           </a:bodyPr>
           <a:lstStyle/>
           <a:p>
-            <a:r>
-              <a:rPr lang="pt-PT" noProof="0" dirty="0" smtClean="0"/>
-              <a:t>Normas de suporte:</a:t>
-            </a:r>
+            <a:pPr marL="0" indent="0">
+              <a:buNone/>
+            </a:pPr>
+            <a:r>
+              <a:rPr lang="en-US" dirty="0" smtClean="0"/>
+              <a:t>“</a:t>
+            </a:r>
+            <a:r>
+              <a:rPr lang="en-US" i="1" dirty="0" smtClean="0"/>
+              <a:t>Accessibility </a:t>
+            </a:r>
+            <a:r>
+              <a:rPr lang="en-US" i="1" dirty="0"/>
+              <a:t>is about ensuring an equivalent user experience for people with disabilities, including people with age-related </a:t>
+            </a:r>
+            <a:r>
+              <a:rPr lang="en-US" i="1" dirty="0" smtClean="0"/>
+              <a:t>impairments.</a:t>
+            </a:r>
+          </a:p>
+          <a:p>
+            <a:pPr marL="0" indent="0">
+              <a:buNone/>
+            </a:pPr>
+            <a:r>
+              <a:rPr lang="en-US" i="1" dirty="0" smtClean="0"/>
+              <a:t>…Thus </a:t>
+            </a:r>
+            <a:r>
+              <a:rPr lang="en-US" i="1" dirty="0"/>
+              <a:t>accessibility includes both</a:t>
+            </a:r>
+            <a:r>
+              <a:rPr lang="en-US" i="1" dirty="0" smtClean="0"/>
+              <a:t>:</a:t>
+            </a:r>
+            <a:endParaRPr lang="en-US" i="1" dirty="0"/>
           </a:p>
           <a:p>
             <a:pPr lvl="1"/>
             <a:r>
-              <a:rPr lang="pt-PT" noProof="0" dirty="0" smtClean="0"/>
-              <a:t>WCAG 2.0</a:t>
-            </a:r>
+              <a:rPr lang="en-US" i="1" dirty="0"/>
+              <a:t>Requirements that are more specific to people with </a:t>
+            </a:r>
+            <a:r>
+              <a:rPr lang="en-US" i="1" dirty="0" smtClean="0"/>
+              <a:t>disabilities;…</a:t>
+            </a:r>
+            <a:endParaRPr lang="en-US" i="1" dirty="0"/>
           </a:p>
           <a:p>
             <a:pPr lvl="1"/>
             <a:r>
-              <a:rPr lang="pt-PT" noProof="0" dirty="0" smtClean="0"/>
-              <a:t>ISO/IEC 40500:2012</a:t>
-            </a:r>
-          </a:p>
-          <a:p>
-            <a:r>
-              <a:rPr lang="pt-PT" noProof="0" dirty="0" smtClean="0"/>
-              <a:t>Suporte legal:</a:t>
-            </a:r>
-          </a:p>
-          <a:p>
-            <a:pPr lvl="1"/>
-            <a:r>
-              <a:rPr lang="pt-PT" noProof="0" dirty="0" smtClean="0"/>
-              <a:t>Legislação</a:t>
-            </a:r>
-            <a:r>
-              <a:rPr lang="pt-PT" baseline="0" noProof="0" dirty="0" smtClean="0"/>
-              <a:t> comunitária</a:t>
-            </a:r>
-            <a:endParaRPr lang="pt-PT" noProof="0" dirty="0" smtClean="0"/>
-          </a:p>
-          <a:p>
-            <a:pPr lvl="1"/>
-            <a:r>
-              <a:rPr lang="pt-PT" noProof="0" dirty="0" smtClean="0"/>
-              <a:t>Legislação portuguesa</a:t>
-            </a:r>
+              <a:rPr lang="en-US" i="1" dirty="0"/>
+              <a:t>Requirements that are also general usability </a:t>
+            </a:r>
+            <a:r>
+              <a:rPr lang="en-US" i="1" dirty="0" smtClean="0"/>
+              <a:t>principles…</a:t>
+            </a:r>
+            <a:endParaRPr lang="en-US" i="1" dirty="0"/>
+          </a:p>
+          <a:p>
+            <a:pPr marL="0" indent="0">
+              <a:buNone/>
+            </a:pPr>
+            <a:r>
+              <a:rPr lang="en-US" i="1" dirty="0"/>
+              <a:t>Websites, web tools, and other products that meet accessibility goals are more usable for everyone</a:t>
+            </a:r>
+            <a:r>
+              <a:rPr lang="en-US" i="1" dirty="0" smtClean="0"/>
+              <a:t>.</a:t>
+            </a:r>
+            <a:r>
+              <a:rPr lang="en-US" dirty="0" smtClean="0"/>
+              <a:t>”</a:t>
+            </a:r>
+          </a:p>
+          <a:p>
+            <a:pPr marL="0" indent="0" algn="r">
+              <a:buNone/>
+            </a:pPr>
+            <a:r>
+              <a:rPr lang="en-US" sz="1200" dirty="0"/>
+              <a:t>W3C - Web Accessibility and Usability Working </a:t>
+            </a:r>
+            <a:r>
+              <a:rPr lang="en-US" sz="1200" dirty="0" smtClean="0"/>
+              <a:t>Together</a:t>
+            </a:r>
+            <a:r>
+              <a:rPr lang="en-US" sz="1200" dirty="0"/>
+              <a:t>, &lt;</a:t>
+            </a:r>
+            <a:r>
+              <a:rPr lang="en-US" sz="1200" dirty="0">
+                <a:hlinkClick r:id="rId3"/>
+              </a:rPr>
+              <a:t>https://www.w3.org/WAI/intro/usable</a:t>
+            </a:r>
+            <a:r>
+              <a:rPr lang="en-US" sz="1200" dirty="0"/>
+              <a:t>&gt;, </a:t>
+            </a:r>
+            <a:r>
+              <a:rPr lang="en-US" sz="1200" dirty="0" err="1" smtClean="0"/>
+              <a:t>acedido</a:t>
+            </a:r>
+            <a:r>
+              <a:rPr lang="en-US" sz="1200" dirty="0" smtClean="0"/>
+              <a:t> </a:t>
+            </a:r>
+            <a:r>
+              <a:rPr lang="en-US" sz="1200" dirty="0" err="1" smtClean="0"/>
+              <a:t>em</a:t>
+            </a:r>
+            <a:r>
+              <a:rPr lang="en-US" sz="1200" dirty="0" smtClean="0"/>
+              <a:t> 2016-04-13</a:t>
+            </a:r>
+            <a:endParaRPr lang="en-US" sz="1200" dirty="0"/>
           </a:p>
         </p:txBody>
       </p:sp>
     </p:spTree>
     <p:extLst>
       <p:ext uri="{BB962C8B-B14F-4D97-AF65-F5344CB8AC3E}">
-        <p14:creationId xmlns:p14="http://schemas.microsoft.com/office/powerpoint/2010/main" val="3999221353"/>
+        <p14:creationId xmlns:p14="http://schemas.microsoft.com/office/powerpoint/2010/main" val="3523767973"/>
       </p:ext>
     </p:extLst>
   </p:cSld>
   <p:clrMapOvr>
     <a:masterClrMapping/>
   </p:clrMapOvr>
-  <p:timing>
-    <p:tnLst>
-      <p:par>
-        <p:cTn id="1" dur="indefinite" restart="never" nodeType="tmRoot"/>
-      </p:par>
-    </p:tnLst>
-  </p:timing>
 </p:sld>
 </file>
 
@@ -5242,17 +5567,24 @@
           <a:lstStyle/>
           <a:p>
             <a:r>
-              <a:rPr lang="en-US" dirty="0" err="1" smtClean="0"/>
+              <a:rPr lang="en-US" dirty="0" err="1"/>
               <a:t>Acessibilidade</a:t>
             </a:r>
             <a:r>
-              <a:rPr lang="en-US" dirty="0" smtClean="0"/>
+              <a:rPr lang="en-US" dirty="0"/>
               <a:t> vs. </a:t>
             </a:r>
             <a:r>
               <a:rPr lang="en-US" dirty="0" err="1" smtClean="0"/>
               <a:t>Usabilidade</a:t>
             </a:r>
+            <a:r>
+              <a:rPr lang="en-US" dirty="0" smtClean="0"/>
+              <a:t/>
+            </a:r>
+            <a:br>
+              <a:rPr lang="en-US" dirty="0" smtClean="0"/>
+            </a:br>
             <a:endParaRPr lang="pt-PT" dirty="0"/>
           </a:p>
         </p:txBody>
@@ -5269,9 +5601,7 @@
         </p:nvSpPr>
         <p:spPr/>
         <p:txBody>
-          <a:bodyPr>
-            <a:normAutofit/>
-          </a:bodyPr>
+          <a:bodyPr/>
           <a:lstStyle/>
           <a:p>
             <a:pPr marL="0" indent="0">
@@ -5279,125 +5609,58 @@
             </a:pPr>
             <a:r>
               <a:rPr lang="en-US" dirty="0" smtClean="0"/>
-              <a:t>“</a:t>
-            </a:r>
-            <a:r>
-              <a:rPr lang="en-US" i="1" dirty="0" smtClean="0"/>
-              <a:t>Accessibility </a:t>
-            </a:r>
-            <a:r>
-              <a:rPr lang="en-US" i="1" dirty="0"/>
-              <a:t>is about ensuring an equivalent user experience for people with disabilities, including people with age-related </a:t>
-            </a:r>
-            <a:r>
-              <a:rPr lang="en-US" i="1" dirty="0" smtClean="0"/>
-              <a:t>impairments.</a:t>
-            </a:r>
-          </a:p>
-          <a:p>
-            <a:pPr marL="0" indent="0">
+              <a:t>“In</a:t>
+            </a:r>
+            <a:r>
+              <a:rPr lang="en-US" dirty="0"/>
+              <a:t> software engineering, usability is the degree to which a software can be used by specified consumers to achieve quantified objectives with effectiveness, efficiency, and satisfaction in a quantified context of </a:t>
+            </a:r>
+            <a:r>
+              <a:rPr lang="en-US" dirty="0" smtClean="0"/>
+              <a:t>use”</a:t>
+            </a:r>
+          </a:p>
+          <a:p>
+            <a:pPr marL="0" indent="0" algn="r">
               <a:buNone/>
             </a:pPr>
             <a:r>
-              <a:rPr lang="en-US" i="1" dirty="0" smtClean="0"/>
-              <a:t>…Thus </a:t>
-            </a:r>
-            <a:r>
-              <a:rPr lang="en-US" i="1" dirty="0"/>
-              <a:t>accessibility includes both</a:t>
-            </a:r>
-            <a:r>
-              <a:rPr lang="en-US" i="1" dirty="0" smtClean="0"/>
-              <a:t>:</a:t>
-            </a:r>
-            <a:endParaRPr lang="en-US" i="1" dirty="0"/>
-          </a:p>
-          <a:p>
-            <a:pPr lvl="1"/>
-            <a:r>
-              <a:rPr lang="en-US" i="1" dirty="0"/>
-              <a:t>Requirements that are more specific to people with </a:t>
-            </a:r>
-            <a:r>
-              <a:rPr lang="en-US" i="1" dirty="0" smtClean="0"/>
-              <a:t>disabilities;…</a:t>
-            </a:r>
-            <a:endParaRPr lang="en-US" i="1" dirty="0"/>
-          </a:p>
-          <a:p>
-            <a:pPr lvl="1"/>
-            <a:r>
-              <a:rPr lang="en-US" i="1" dirty="0"/>
-              <a:t>Requirements that are also general usability </a:t>
-            </a:r>
-            <a:r>
-              <a:rPr lang="en-US" i="1" dirty="0" smtClean="0"/>
-              <a:t>principles…</a:t>
-            </a:r>
-            <a:endParaRPr lang="en-US" i="1" dirty="0"/>
-          </a:p>
-          <a:p>
-            <a:pPr marL="0" indent="0">
-              <a:buNone/>
-            </a:pPr>
-            <a:r>
-              <a:rPr lang="en-US" i="1" dirty="0"/>
-              <a:t>Websites, web tools, and other products that meet accessibility goals are more usable for everyone</a:t>
-            </a:r>
-            <a:r>
-              <a:rPr lang="en-US" i="1" dirty="0" smtClean="0"/>
-              <a:t>.</a:t>
-            </a:r>
-            <a:r>
-              <a:rPr lang="en-US" dirty="0" smtClean="0"/>
-              <a:t>”</a:t>
-            </a:r>
-          </a:p>
-          <a:p>
-            <a:pPr marL="0" indent="0" algn="r">
-              <a:buNone/>
-            </a:pPr>
+              <a:rPr lang="en-US" sz="1200" dirty="0" smtClean="0"/>
+              <a:t>Wikipedia, </a:t>
+            </a:r>
             <a:r>
               <a:rPr lang="en-US" sz="1200" dirty="0"/>
-              <a:t>W3C - Web </a:t>
-            </a:r>
-            <a:r>
-              <a:rPr lang="en-US" sz="1200" dirty="0"/>
-              <a:t>Accessibility and Usability Working </a:t>
-            </a:r>
-            <a:r>
-              <a:rPr lang="en-US" sz="1200" dirty="0" smtClean="0"/>
-              <a:t>Together</a:t>
-            </a:r>
-            <a:r>
-              <a:rPr lang="en-US" sz="1200" dirty="0"/>
-              <a:t>, &lt;</a:t>
+              <a:t>&lt;</a:t>
             </a:r>
             <a:r>
               <a:rPr lang="en-US" sz="1200" dirty="0">
-                <a:hlinkClick r:id="rId3"/>
+                <a:hlinkClick r:id="rId2"/>
               </a:rPr>
-              <a:t>https://www.w3.org/WAI/intro/usable</a:t>
+              <a:t>https://en.wikipedia.org/wiki/Usability</a:t>
             </a:r>
             <a:r>
               <a:rPr lang="en-US" sz="1200" dirty="0"/>
               <a:t>&gt;, </a:t>
             </a:r>
             <a:r>
-              <a:rPr lang="en-US" sz="1200" dirty="0" err="1" smtClean="0"/>
+              <a:rPr lang="en-US" sz="1200" dirty="0" err="1"/>
               <a:t>acedido</a:t>
             </a:r>
             <a:r>
+              <a:rPr lang="en-US" sz="1200" dirty="0"/>
+              <a:t> </a:t>
+            </a:r>
+            <a:r>
+              <a:rPr lang="en-US" sz="1200" dirty="0" err="1"/>
+              <a:t>em</a:t>
+            </a:r>
+            <a:r>
+              <a:rPr lang="en-US" sz="1200" dirty="0"/>
+              <a:t> </a:t>
+            </a:r>
+            <a:r>
               <a:rPr lang="en-US" sz="1200" dirty="0" smtClean="0"/>
-              <a:t> </a:t>
-            </a:r>
-            <a:r>
-              <a:rPr lang="en-US" sz="1200" dirty="0" err="1" smtClean="0"/>
-              <a:t>em</a:t>
-            </a:r>
-            <a:r>
-              <a:rPr lang="en-US" sz="1200" dirty="0" smtClean="0"/>
-              <a:t> 2016-04-13</a:t>
+              <a:t>2016-04-13</a:t>
             </a:r>
             <a:endParaRPr lang="en-US" sz="1200" dirty="0"/>
           </a:p>
@@ -5406,7 +5669,7 @@
     </p:spTree>
     <p:extLst>
       <p:ext uri="{BB962C8B-B14F-4D97-AF65-F5344CB8AC3E}">
-        <p14:creationId xmlns:p14="http://schemas.microsoft.com/office/powerpoint/2010/main" val="3523767973"/>
+        <p14:creationId xmlns:p14="http://schemas.microsoft.com/office/powerpoint/2010/main" val="1244781140"/>
       </p:ext>
     </p:extLst>
   </p:cSld>
@@ -5451,8 +5714,11 @@
             <a:pPr lvl="0"/>
             <a:r>
               <a:rPr lang="pt-PT" noProof="0" dirty="0" smtClean="0"/>
-              <a:t>Aplicabilidade (5min)</a:t>
-            </a:r>
+              <a:t>Aplicações</a:t>
+            </a:r>
+            <a:br>
+              <a:rPr lang="pt-PT" noProof="0" dirty="0" smtClean="0"/>
+            </a:br>
             <a:endParaRPr lang="pt-PT" noProof="0" dirty="0"/>
           </a:p>
         </p:txBody>
@@ -5475,49 +5741,16 @@
           <a:lstStyle/>
           <a:p>
             <a:r>
-              <a:rPr lang="en-US" noProof="0" dirty="0" err="1" smtClean="0"/>
-              <a:t>Paralelo</a:t>
-            </a:r>
-            <a:r>
-              <a:rPr lang="en-US" noProof="0" dirty="0" smtClean="0"/>
-              <a:t> API -&gt; HAL /</a:t>
-            </a:r>
-            <a:r>
-              <a:rPr lang="en-US" baseline="0" noProof="0" dirty="0" smtClean="0"/>
-              <a:t> UA -&gt; WCAG</a:t>
-            </a:r>
-            <a:endParaRPr lang="pt-PT" noProof="0" dirty="0" smtClean="0"/>
-          </a:p>
-          <a:p>
-            <a:r>
               <a:rPr lang="pt-PT" noProof="0" dirty="0" smtClean="0"/>
-              <a:t>Vantagens para o site:</a:t>
-            </a:r>
-          </a:p>
-          <a:p>
-            <a:pPr lvl="1"/>
-            <a:r>
-              <a:rPr lang="pt-PT" noProof="0" dirty="0" err="1" smtClean="0"/>
-              <a:t>Crawlers</a:t>
+              <a:t>Casos </a:t>
             </a:r>
             <a:r>
               <a:rPr lang="pt-PT" noProof="0" dirty="0" smtClean="0"/>
-              <a:t> portam-se como </a:t>
-            </a:r>
-            <a:r>
-              <a:rPr lang="pt-PT" noProof="0" dirty="0" err="1" smtClean="0"/>
-              <a:t>UAs</a:t>
-            </a:r>
-            <a:endParaRPr lang="pt-PT" noProof="0" dirty="0" smtClean="0"/>
-          </a:p>
-          <a:p>
+              <a:t>práticos mau e </a:t>
+            </a:r>
             <a:r>
               <a:rPr lang="pt-PT" noProof="0" dirty="0" smtClean="0"/>
-              <a:t>Casos práticos mau e bom - exploração com </a:t>
-            </a:r>
-            <a:r>
-              <a:rPr lang="pt-PT" noProof="0" dirty="0" err="1" smtClean="0"/>
-              <a:t>iPad</a:t>
+              <a:t>bom</a:t>
             </a:r>
             <a:endParaRPr lang="pt-PT" noProof="0" dirty="0" smtClean="0"/>
           </a:p>
@@ -5530,8 +5763,44 @@
           <a:p>
             <a:r>
               <a:rPr lang="pt-PT" noProof="0" dirty="0" smtClean="0"/>
-              <a:t>Exemplo de marcação HTML</a:t>
-            </a:r>
+              <a:t>Exemplo de marcação </a:t>
+            </a:r>
+            <a:r>
+              <a:rPr lang="pt-PT" noProof="0" dirty="0" smtClean="0"/>
+              <a:t>HTML</a:t>
+            </a:r>
+          </a:p>
+          <a:p>
+            <a:pPr marL="0" indent="0">
+              <a:buNone/>
+            </a:pPr>
+            <a:endParaRPr lang="en-US" dirty="0"/>
+          </a:p>
+          <a:p>
+            <a:pPr marL="0" indent="0">
+              <a:buNone/>
+            </a:pPr>
+            <a:endParaRPr lang="en-US" noProof="0" dirty="0" smtClean="0"/>
+          </a:p>
+          <a:p>
+            <a:pPr marL="0" indent="0">
+              <a:buNone/>
+            </a:pPr>
+            <a:endParaRPr lang="en-US" dirty="0"/>
+          </a:p>
+          <a:p>
+            <a:pPr marL="0" indent="0" algn="ctr">
+              <a:buNone/>
+            </a:pPr>
+            <a:r>
+              <a:rPr lang="en-US" noProof="0" dirty="0" smtClean="0"/>
+              <a:t>Obrigado pela </a:t>
+            </a:r>
+            <a:r>
+              <a:rPr lang="en-US" noProof="0" dirty="0" err="1" smtClean="0"/>
+              <a:t>atenção</a:t>
+            </a:r>
+            <a:endParaRPr lang="pt-PT" noProof="0" dirty="0" smtClean="0"/>
           </a:p>
         </p:txBody>
       </p:sp>
@@ -5580,58 +5849,25 @@
           <a:bodyPr/>
           <a:lstStyle/>
           <a:p>
-            <a:pPr lvl="0"/>
-            <a:r>
-              <a:rPr lang="pt-PT" noProof="0" dirty="0" smtClean="0"/>
-              <a:t>Contribuições em Portugal (5min)</a:t>
-            </a:r>
-            <a:endParaRPr lang="pt-PT" noProof="0" dirty="0"/>
-          </a:p>
-        </p:txBody>
-      </p:sp>
-      <p:sp>
-        <p:nvSpPr>
-          <p:cNvPr id="3" name="Content Placeholder 2"/>
-          <p:cNvSpPr>
-            <a:spLocks noGrp="1"/>
-          </p:cNvSpPr>
-          <p:nvPr>
-            <p:ph idx="1"/>
-          </p:nvPr>
-        </p:nvSpPr>
-        <p:spPr/>
-        <p:txBody>
-          <a:bodyPr/>
-          <a:lstStyle/>
-          <a:p>
-            <a:r>
-              <a:rPr lang="pt-PT" noProof="0" dirty="0" smtClean="0"/>
-              <a:t>FCT - Unidade Acesso</a:t>
-            </a:r>
-          </a:p>
-          <a:p>
-            <a:r>
-              <a:rPr lang="pt-PT" noProof="0" dirty="0" smtClean="0"/>
-              <a:t>UP - </a:t>
-            </a:r>
-            <a:r>
-              <a:rPr lang="pt-PT" noProof="0" dirty="0" err="1" smtClean="0"/>
-              <a:t>Places</a:t>
-            </a:r>
-            <a:r>
-              <a:rPr lang="pt-PT" noProof="0" dirty="0" smtClean="0"/>
-              <a:t>, Plataforma de Acessibilidade</a:t>
-            </a:r>
-          </a:p>
-          <a:p>
-            <a:endParaRPr lang="pt-PT" noProof="0" dirty="0" smtClean="0"/>
+            <a:r>
+              <a:rPr lang="en-US" dirty="0" err="1" smtClean="0"/>
+              <a:t>Anexos</a:t>
+            </a:r>
+            <a:r>
+              <a:rPr lang="en-US" dirty="0" smtClean="0"/>
+              <a:t/>
+            </a:r>
+            <a:br>
+              <a:rPr lang="en-US" dirty="0" smtClean="0"/>
+            </a:br>
+            <a:endParaRPr lang="pt-PT" dirty="0"/>
           </a:p>
         </p:txBody>
       </p:sp>
     </p:spTree>
     <p:extLst>
       <p:ext uri="{BB962C8B-B14F-4D97-AF65-F5344CB8AC3E}">
-        <p14:creationId xmlns:p14="http://schemas.microsoft.com/office/powerpoint/2010/main" val="1789695018"/>
+        <p14:creationId xmlns:p14="http://schemas.microsoft.com/office/powerpoint/2010/main" val="609431213"/>
       </p:ext>
     </p:extLst>
   </p:cSld>

</xml_diff>